<commit_message>
Added more slides to the How section
</commit_message>
<xml_diff>
--- a/The diversity of plaques in London.pptx
+++ b/The diversity of plaques in London.pptx
@@ -5,10 +5,10 @@
     <p:sldMasterId id="2147483660" r:id="rId4"/>
   </p:sldMasterIdLst>
   <p:notesMasterIdLst>
-    <p:notesMasterId r:id="rId13"/>
+    <p:notesMasterId r:id="rId14"/>
   </p:notesMasterIdLst>
   <p:handoutMasterIdLst>
-    <p:handoutMasterId r:id="rId14"/>
+    <p:handoutMasterId r:id="rId15"/>
   </p:handoutMasterIdLst>
   <p:sldIdLst>
     <p:sldId id="268" r:id="rId5"/>
@@ -17,8 +17,9 @@
     <p:sldId id="271" r:id="rId8"/>
     <p:sldId id="272" r:id="rId9"/>
     <p:sldId id="273" r:id="rId10"/>
-    <p:sldId id="275" r:id="rId11"/>
-    <p:sldId id="274" r:id="rId12"/>
+    <p:sldId id="274" r:id="rId11"/>
+    <p:sldId id="275" r:id="rId12"/>
+    <p:sldId id="276" r:id="rId13"/>
   </p:sldIdLst>
   <p:sldSz cx="12192000" cy="6858000"/>
   <p:notesSz cx="6858000" cy="9144000"/>
@@ -131,7 +132,7 @@
 <file path=ppt/revisionInfo.xml><?xml version="1.0" encoding="utf-8"?>
 <p1510:revInfo xmlns:a="http://schemas.openxmlformats.org/drawingml/2006/main" xmlns:r="http://schemas.openxmlformats.org/officeDocument/2006/relationships" xmlns:p1510="http://schemas.microsoft.com/office/powerpoint/2015/10/main">
   <p1510:revLst>
-    <p1510:client id="{D3D5E6CE-530E-46B9-9897-545816A29C54}" v="17" dt="2020-07-07T20:08:07.773"/>
+    <p1510:client id="{3EF2237C-C954-4D3A-BC32-427C31654D90}" v="4" dt="2020-07-09T11:40:33.759"/>
   </p1510:revLst>
 </p1510:revInfo>
 </file>
@@ -230,7 +231,7 @@
           <a:p>
             <a:fld id="{7C0AA17F-CB06-445B-ACD3-321E84E51A80}" type="datetimeFigureOut">
               <a:rPr lang="en-US" smtClean="0"/>
-              <a:t>7/7/2020</a:t>
+              <a:t>7/9/2020</a:t>
             </a:fld>
             <a:endParaRPr lang="en-US" dirty="0"/>
           </a:p>
@@ -407,7 +408,7 @@
           <a:p>
             <a:fld id="{B06141C0-BF72-4A20-AFA7-D05563D549B7}" type="datetimeFigureOut">
               <a:rPr lang="en-US" smtClean="0"/>
-              <a:t>7/7/2020</a:t>
+              <a:t>7/9/2020</a:t>
             </a:fld>
             <a:endParaRPr lang="en-US" dirty="0"/>
           </a:p>
@@ -860,7 +861,7 @@
           <a:p>
             <a:fld id="{984B7D2A-0DF8-424B-9572-B79AEBB2D9DC}" type="datetimeFigureOut">
               <a:rPr lang="en-US" noProof="0" smtClean="0"/>
-              <a:t>7/7/2020</a:t>
+              <a:t>7/9/2020</a:t>
             </a:fld>
             <a:endParaRPr lang="en-US" noProof="0" dirty="0"/>
           </a:p>
@@ -1187,7 +1188,7 @@
           <a:p>
             <a:fld id="{984B7D2A-0DF8-424B-9572-B79AEBB2D9DC}" type="datetimeFigureOut">
               <a:rPr lang="en-US" noProof="0" smtClean="0"/>
-              <a:t>7/7/2020</a:t>
+              <a:t>7/9/2020</a:t>
             </a:fld>
             <a:endParaRPr lang="en-US" noProof="0" dirty="0"/>
           </a:p>
@@ -1348,7 +1349,7 @@
           <a:p>
             <a:fld id="{984B7D2A-0DF8-424B-9572-B79AEBB2D9DC}" type="datetimeFigureOut">
               <a:rPr lang="en-US" noProof="0" smtClean="0"/>
-              <a:t>7/7/2020</a:t>
+              <a:t>7/9/2020</a:t>
             </a:fld>
             <a:endParaRPr lang="en-US" noProof="0" dirty="0"/>
           </a:p>
@@ -1476,7 +1477,7 @@
           <a:p>
             <a:fld id="{984B7D2A-0DF8-424B-9572-B79AEBB2D9DC}" type="datetimeFigureOut">
               <a:rPr lang="en-US" noProof="0" smtClean="0"/>
-              <a:t>7/7/2020</a:t>
+              <a:t>7/9/2020</a:t>
             </a:fld>
             <a:endParaRPr lang="en-US" noProof="0" dirty="0"/>
           </a:p>
@@ -1795,7 +1796,7 @@
           <a:p>
             <a:fld id="{984B7D2A-0DF8-424B-9572-B79AEBB2D9DC}" type="datetimeFigureOut">
               <a:rPr lang="en-US" noProof="0" smtClean="0"/>
-              <a:t>7/7/2020</a:t>
+              <a:t>7/9/2020</a:t>
             </a:fld>
             <a:endParaRPr lang="en-US" noProof="0" dirty="0"/>
           </a:p>
@@ -2091,7 +2092,7 @@
           <a:p>
             <a:fld id="{984B7D2A-0DF8-424B-9572-B79AEBB2D9DC}" type="datetimeFigureOut">
               <a:rPr lang="en-US" noProof="0" smtClean="0"/>
-              <a:t>7/7/2020</a:t>
+              <a:t>7/9/2020</a:t>
             </a:fld>
             <a:endParaRPr lang="en-US" noProof="0" dirty="0"/>
           </a:p>
@@ -2325,7 +2326,7 @@
           <a:p>
             <a:fld id="{984B7D2A-0DF8-424B-9572-B79AEBB2D9DC}" type="datetimeFigureOut">
               <a:rPr lang="en-US" noProof="0" smtClean="0"/>
-              <a:t>7/7/2020</a:t>
+              <a:t>7/9/2020</a:t>
             </a:fld>
             <a:endParaRPr lang="en-US" noProof="0" dirty="0"/>
           </a:p>
@@ -3006,7 +3007,7 @@
           <a:p>
             <a:fld id="{984B7D2A-0DF8-424B-9572-B79AEBB2D9DC}" type="datetimeFigureOut">
               <a:rPr lang="en-US" noProof="0" smtClean="0"/>
-              <a:t>7/7/2020</a:t>
+              <a:t>7/9/2020</a:t>
             </a:fld>
             <a:endParaRPr lang="en-US" noProof="0" dirty="0"/>
           </a:p>
@@ -3327,7 +3328,7 @@
           <a:p>
             <a:fld id="{984B7D2A-0DF8-424B-9572-B79AEBB2D9DC}" type="datetimeFigureOut">
               <a:rPr lang="en-US" noProof="0" smtClean="0"/>
-              <a:t>7/7/2020</a:t>
+              <a:t>7/9/2020</a:t>
             </a:fld>
             <a:endParaRPr lang="en-US" noProof="0" dirty="0"/>
           </a:p>
@@ -3955,7 +3956,7 @@
           <a:p>
             <a:fld id="{984B7D2A-0DF8-424B-9572-B79AEBB2D9DC}" type="datetimeFigureOut">
               <a:rPr lang="en-US" noProof="0" smtClean="0"/>
-              <a:t>7/7/2020</a:t>
+              <a:t>7/9/2020</a:t>
             </a:fld>
             <a:endParaRPr lang="en-US" noProof="0" dirty="0"/>
           </a:p>
@@ -4407,7 +4408,7 @@
           <a:p>
             <a:fld id="{984B7D2A-0DF8-424B-9572-B79AEBB2D9DC}" type="datetimeFigureOut">
               <a:rPr lang="en-US" noProof="0" smtClean="0"/>
-              <a:t>7/7/2020</a:t>
+              <a:t>7/9/2020</a:t>
             </a:fld>
             <a:endParaRPr lang="en-US" noProof="0" dirty="0"/>
           </a:p>
@@ -4805,7 +4806,7 @@
           <a:p>
             <a:fld id="{984B7D2A-0DF8-424B-9572-B79AEBB2D9DC}" type="datetimeFigureOut">
               <a:rPr lang="en-US" noProof="0" smtClean="0"/>
-              <a:t>7/7/2020</a:t>
+              <a:t>7/9/2020</a:t>
             </a:fld>
             <a:endParaRPr lang="en-US" noProof="0" dirty="0"/>
           </a:p>
@@ -5095,7 +5096,7 @@
           <a:p>
             <a:fld id="{984B7D2A-0DF8-424B-9572-B79AEBB2D9DC}" type="datetimeFigureOut">
               <a:rPr lang="en-US" noProof="0" smtClean="0"/>
-              <a:t>7/7/2020</a:t>
+              <a:t>7/9/2020</a:t>
             </a:fld>
             <a:endParaRPr lang="en-US" noProof="0" dirty="0"/>
           </a:p>
@@ -6159,19 +6160,15 @@
         </p:nvSpPr>
         <p:spPr>
           <a:xfrm>
-            <a:off x="685801" y="3027601"/>
-            <a:ext cx="6121399" cy="3921600"/>
+            <a:off x="655808" y="1935801"/>
+            <a:ext cx="3813793" cy="4292600"/>
           </a:xfrm>
         </p:spPr>
         <p:txBody>
-          <a:bodyPr/>
+          <a:bodyPr>
+            <a:normAutofit/>
+          </a:bodyPr>
           <a:lstStyle/>
-          <a:p>
-            <a:r>
-              <a:rPr lang="en-GB" dirty="0"/>
-              <a:t>Initially I used the ethnicity field which signified BAME individual as shown in the pie chart.</a:t>
-            </a:r>
-          </a:p>
           <a:p>
             <a:r>
               <a:rPr lang="en-GB" dirty="0"/>
@@ -6199,100 +6196,19 @@
             </a:r>
             <a:r>
               <a:rPr lang="en-GB" dirty="0"/>
-              <a:t> database.</a:t>
-            </a:r>
-          </a:p>
-        </p:txBody>
-      </p:sp>
-      <p:pic>
-        <p:nvPicPr>
-          <p:cNvPr id="4" name="Picture 3">
-            <a:extLst>
-              <a:ext uri="{FF2B5EF4-FFF2-40B4-BE49-F238E27FC236}">
-                <a16:creationId xmlns:a16="http://schemas.microsoft.com/office/drawing/2014/main" id="{E2568036-87D1-44E0-9113-9FF2043B2A42}"/>
-              </a:ext>
-            </a:extLst>
-          </p:cNvPr>
-          <p:cNvPicPr>
-            <a:picLocks noChangeAspect="1"/>
-          </p:cNvPicPr>
-          <p:nvPr/>
-        </p:nvPicPr>
-        <p:blipFill rotWithShape="1">
-          <a:blip r:embed="rId2"/>
-          <a:srcRect l="71146" t="28198" r="7187" b="19315"/>
-          <a:stretch/>
-        </p:blipFill>
-        <p:spPr>
-          <a:xfrm>
-            <a:off x="7493001" y="2182811"/>
-            <a:ext cx="3733800" cy="3500439"/>
-          </a:xfrm>
-          <a:prstGeom prst="rect">
-            <a:avLst/>
-          </a:prstGeom>
-        </p:spPr>
-      </p:pic>
-    </p:spTree>
-    <p:extLst>
-      <p:ext uri="{BB962C8B-B14F-4D97-AF65-F5344CB8AC3E}">
-        <p14:creationId xmlns:p14="http://schemas.microsoft.com/office/powerpoint/2010/main" val="3942239564"/>
-      </p:ext>
-    </p:extLst>
-  </p:cSld>
-  <p:clrMapOvr>
-    <a:masterClrMapping/>
-  </p:clrMapOvr>
-</p:sld>
-</file>
-
-<file path=ppt/slides/slide7.xml><?xml version="1.0" encoding="utf-8"?>
-<p:sld xmlns:a="http://schemas.openxmlformats.org/drawingml/2006/main" xmlns:r="http://schemas.openxmlformats.org/officeDocument/2006/relationships" xmlns:p="http://schemas.openxmlformats.org/presentationml/2006/main">
-  <p:cSld>
-    <p:spTree>
-      <p:nvGrpSpPr>
-        <p:cNvPr id="1" name=""/>
-        <p:cNvGrpSpPr/>
-        <p:nvPr/>
-      </p:nvGrpSpPr>
-      <p:grpSpPr>
-        <a:xfrm>
-          <a:off x="0" y="0"/>
-          <a:ext cx="0" cy="0"/>
-          <a:chOff x="0" y="0"/>
-          <a:chExt cx="0" cy="0"/>
-        </a:xfrm>
-      </p:grpSpPr>
-      <p:sp>
-        <p:nvSpPr>
-          <p:cNvPr id="4" name="Text Placeholder 3">
-            <a:extLst>
-              <a:ext uri="{FF2B5EF4-FFF2-40B4-BE49-F238E27FC236}">
-                <a16:creationId xmlns:a16="http://schemas.microsoft.com/office/drawing/2014/main" id="{4E59FE72-6645-4450-A922-CBCD090BBB1E}"/>
-              </a:ext>
-            </a:extLst>
-          </p:cNvPr>
-          <p:cNvSpPr>
-            <a:spLocks noGrp="1"/>
-          </p:cNvSpPr>
-          <p:nvPr>
-            <p:ph type="body" sz="half" idx="2"/>
-          </p:nvPr>
-        </p:nvSpPr>
-        <p:spPr>
-          <a:xfrm>
-            <a:off x="2364370" y="5616485"/>
-            <a:ext cx="7334250" cy="1010888"/>
-          </a:xfrm>
-        </p:spPr>
-        <p:txBody>
-          <a:bodyPr/>
-          <a:lstStyle/>
-          <a:p>
-            <a:pPr algn="ctr"/>
+              <a:t> database for individual on the plaques.</a:t>
+            </a:r>
+          </a:p>
+          <a:p>
             <a:r>
               <a:rPr lang="en-GB" dirty="0"/>
-              <a:t>This also reinforces the lack of ethnicity between those commemorated by the plaques in London. </a:t>
+              <a:t>Not all entries had ethnicity fields as a property so the chart could be unreliable if there are correlations to the entry being there e.g. if the entry is more likely to be there if the individual is say White British.</a:t>
+            </a:r>
+          </a:p>
+          <a:p>
+            <a:r>
+              <a:rPr lang="en-GB" dirty="0"/>
+              <a:t>The chart shows the overwhelming majority of those commemorated are British/English.</a:t>
             </a:r>
           </a:p>
         </p:txBody>
@@ -6302,7 +6218,7 @@
           <p:cNvPr id="5" name="Group 4">
             <a:extLst>
               <a:ext uri="{FF2B5EF4-FFF2-40B4-BE49-F238E27FC236}">
-                <a16:creationId xmlns:a16="http://schemas.microsoft.com/office/drawing/2014/main" id="{AAE237B6-95E6-47AF-BE1D-41725A0D4E04}"/>
+                <a16:creationId xmlns:a16="http://schemas.microsoft.com/office/drawing/2014/main" id="{53810FE8-716C-420B-88FF-9064AB67D7A3}"/>
               </a:ext>
             </a:extLst>
           </p:cNvPr>
@@ -6311,8 +6227,8 @@
         </p:nvGrpSpPr>
         <p:grpSpPr>
           <a:xfrm>
-            <a:off x="1492250" y="341842"/>
-            <a:ext cx="9207500" cy="5093758"/>
+            <a:off x="4567115" y="1935800"/>
+            <a:ext cx="6959600" cy="4292600"/>
             <a:chOff x="800100" y="3568700"/>
             <a:chExt cx="5961187" cy="3111500"/>
           </a:xfrm>
@@ -6322,7 +6238,7 @@
             <p:cNvPr id="6" name="Rectangle 5">
               <a:extLst>
                 <a:ext uri="{FF2B5EF4-FFF2-40B4-BE49-F238E27FC236}">
-                  <a16:creationId xmlns:a16="http://schemas.microsoft.com/office/drawing/2014/main" id="{732BBDC2-6ABC-4650-8872-0F7602C5703F}"/>
+                  <a16:creationId xmlns:a16="http://schemas.microsoft.com/office/drawing/2014/main" id="{6213E599-8E1E-4329-AE79-3D7D9C4351C7}"/>
                 </a:ext>
               </a:extLst>
             </p:cNvPr>
@@ -6374,7 +6290,7 @@
             <p:cNvPr id="7" name="Picture 6" descr="A screenshot of a cell phone&#10;&#10;Description automatically generated">
               <a:extLst>
                 <a:ext uri="{FF2B5EF4-FFF2-40B4-BE49-F238E27FC236}">
-                  <a16:creationId xmlns:a16="http://schemas.microsoft.com/office/drawing/2014/main" id="{2603AC03-F790-4602-848E-63A6D9D8F7E9}"/>
+                  <a16:creationId xmlns:a16="http://schemas.microsoft.com/office/drawing/2014/main" id="{9782A791-14F1-40F1-ABB2-B9171CF91FE7}"/>
                 </a:ext>
               </a:extLst>
             </p:cNvPr>
@@ -6403,7 +6319,149 @@
     </p:spTree>
     <p:extLst>
       <p:ext uri="{BB962C8B-B14F-4D97-AF65-F5344CB8AC3E}">
-        <p14:creationId xmlns:p14="http://schemas.microsoft.com/office/powerpoint/2010/main" val="1024065367"/>
+        <p14:creationId xmlns:p14="http://schemas.microsoft.com/office/powerpoint/2010/main" val="3942239564"/>
+      </p:ext>
+    </p:extLst>
+  </p:cSld>
+  <p:clrMapOvr>
+    <a:masterClrMapping/>
+  </p:clrMapOvr>
+</p:sld>
+</file>
+
+<file path=ppt/slides/slide7.xml><?xml version="1.0" encoding="utf-8"?>
+<p:sld xmlns:a="http://schemas.openxmlformats.org/drawingml/2006/main" xmlns:r="http://schemas.openxmlformats.org/officeDocument/2006/relationships" xmlns:p="http://schemas.openxmlformats.org/presentationml/2006/main">
+  <p:cSld>
+    <p:spTree>
+      <p:nvGrpSpPr>
+        <p:cNvPr id="1" name=""/>
+        <p:cNvGrpSpPr/>
+        <p:nvPr/>
+      </p:nvGrpSpPr>
+      <p:grpSpPr>
+        <a:xfrm>
+          <a:off x="0" y="0"/>
+          <a:ext cx="0" cy="0"/>
+          <a:chOff x="0" y="0"/>
+          <a:chExt cx="0" cy="0"/>
+        </a:xfrm>
+      </p:grpSpPr>
+      <p:sp>
+        <p:nvSpPr>
+          <p:cNvPr id="2" name="Title 1">
+            <a:extLst>
+              <a:ext uri="{FF2B5EF4-FFF2-40B4-BE49-F238E27FC236}">
+                <a16:creationId xmlns:a16="http://schemas.microsoft.com/office/drawing/2014/main" id="{C0274CF3-D2F5-4319-AC4C-7E33DBCD5888}"/>
+              </a:ext>
+            </a:extLst>
+          </p:cNvPr>
+          <p:cNvSpPr>
+            <a:spLocks noGrp="1"/>
+          </p:cNvSpPr>
+          <p:nvPr>
+            <p:ph type="title"/>
+          </p:nvPr>
+        </p:nvSpPr>
+        <p:spPr/>
+        <p:txBody>
+          <a:bodyPr/>
+          <a:lstStyle/>
+          <a:p>
+            <a:r>
+              <a:rPr lang="en-GB" dirty="0"/>
+              <a:t>How – individuals with links to the slave trade</a:t>
+            </a:r>
+          </a:p>
+        </p:txBody>
+      </p:sp>
+      <p:sp>
+        <p:nvSpPr>
+          <p:cNvPr id="3" name="Content Placeholder 2">
+            <a:extLst>
+              <a:ext uri="{FF2B5EF4-FFF2-40B4-BE49-F238E27FC236}">
+                <a16:creationId xmlns:a16="http://schemas.microsoft.com/office/drawing/2014/main" id="{A461D00C-DD94-43C2-B1B9-7571434046AC}"/>
+              </a:ext>
+            </a:extLst>
+          </p:cNvPr>
+          <p:cNvSpPr>
+            <a:spLocks noGrp="1"/>
+          </p:cNvSpPr>
+          <p:nvPr>
+            <p:ph idx="1"/>
+          </p:nvPr>
+        </p:nvSpPr>
+        <p:spPr/>
+        <p:txBody>
+          <a:bodyPr/>
+          <a:lstStyle/>
+          <a:p>
+            <a:r>
+              <a:rPr lang="en-GB" dirty="0"/>
+              <a:t>To identify bad actors I made a scoring system taking into account the following:</a:t>
+            </a:r>
+          </a:p>
+          <a:p>
+            <a:pPr lvl="1"/>
+            <a:r>
+              <a:rPr lang="en-GB" dirty="0"/>
+              <a:t>The presence of certain words on their Wikipedia pages</a:t>
+            </a:r>
+          </a:p>
+          <a:p>
+            <a:pPr lvl="1"/>
+            <a:r>
+              <a:rPr lang="en-GB" dirty="0"/>
+              <a:t>Whether they appear on the slave owner list on Wikipedia or </a:t>
+            </a:r>
+            <a:r>
+              <a:rPr lang="en-GB" dirty="0" err="1"/>
+              <a:t>Wikidata</a:t>
+            </a:r>
+            <a:endParaRPr lang="en-GB" dirty="0"/>
+          </a:p>
+          <a:p>
+            <a:pPr lvl="1"/>
+            <a:r>
+              <a:rPr lang="en-GB" dirty="0"/>
+              <a:t>Whether they appear on the abolitionist list on Wikipedia</a:t>
+            </a:r>
+          </a:p>
+          <a:p>
+            <a:pPr lvl="1"/>
+            <a:r>
+              <a:rPr lang="en-GB" dirty="0"/>
+              <a:t>Ethnicity</a:t>
+            </a:r>
+          </a:p>
+          <a:p>
+            <a:pPr lvl="1"/>
+            <a:r>
+              <a:rPr lang="en-GB" dirty="0"/>
+              <a:t>Birth period</a:t>
+            </a:r>
+          </a:p>
+          <a:p>
+            <a:r>
+              <a:rPr lang="en-GB" dirty="0"/>
+              <a:t>The above criteria gave both positive and negative scores (higher the score the worse).</a:t>
+            </a:r>
+          </a:p>
+          <a:p>
+            <a:r>
+              <a:rPr lang="en-GB" dirty="0"/>
+              <a:t>Words such as ‘poet’/’author’/’composer’ appearing on the Wikipedia pages reduced the score, assuming the correlation that most poets/writers/… were against slavery.</a:t>
+            </a:r>
+          </a:p>
+          <a:p>
+            <a:pPr lvl="1"/>
+            <a:endParaRPr lang="en-GB" dirty="0"/>
+          </a:p>
+        </p:txBody>
+      </p:sp>
+    </p:spTree>
+    <p:extLst>
+      <p:ext uri="{BB962C8B-B14F-4D97-AF65-F5344CB8AC3E}">
+        <p14:creationId xmlns:p14="http://schemas.microsoft.com/office/powerpoint/2010/main" val="3328646044"/>
       </p:ext>
     </p:extLst>
   </p:cSld>
@@ -6435,7 +6493,7 @@
           <p:cNvPr id="2" name="Title 1">
             <a:extLst>
               <a:ext uri="{FF2B5EF4-FFF2-40B4-BE49-F238E27FC236}">
-                <a16:creationId xmlns:a16="http://schemas.microsoft.com/office/drawing/2014/main" id="{C0274CF3-D2F5-4319-AC4C-7E33DBCD5888}"/>
+                <a16:creationId xmlns:a16="http://schemas.microsoft.com/office/drawing/2014/main" id="{EE3D967C-B230-48CC-8F84-7CDBF7898431}"/>
               </a:ext>
             </a:extLst>
           </p:cNvPr>
@@ -6453,7 +6511,7 @@
           <a:p>
             <a:r>
               <a:rPr lang="en-GB" dirty="0"/>
-              <a:t>How – individual with links to the slave trade</a:t>
+              <a:t>How – individuals with links to the slave trade</a:t>
             </a:r>
           </a:p>
         </p:txBody>
@@ -6463,7 +6521,7 @@
           <p:cNvPr id="3" name="Content Placeholder 2">
             <a:extLst>
               <a:ext uri="{FF2B5EF4-FFF2-40B4-BE49-F238E27FC236}">
-                <a16:creationId xmlns:a16="http://schemas.microsoft.com/office/drawing/2014/main" id="{A461D00C-DD94-43C2-B1B9-7571434046AC}"/>
+                <a16:creationId xmlns:a16="http://schemas.microsoft.com/office/drawing/2014/main" id="{6487CF09-47FB-43BD-9B8F-F3F4BC98C3D9}"/>
               </a:ext>
             </a:extLst>
           </p:cNvPr>
@@ -6481,7 +6539,7 @@
           <a:p>
             <a:r>
               <a:rPr lang="en-GB" dirty="0"/>
-              <a:t>To identify bad actors</a:t>
+              <a:t>The </a:t>
             </a:r>
           </a:p>
         </p:txBody>
@@ -6489,7 +6547,90 @@
     </p:spTree>
     <p:extLst>
       <p:ext uri="{BB962C8B-B14F-4D97-AF65-F5344CB8AC3E}">
-        <p14:creationId xmlns:p14="http://schemas.microsoft.com/office/powerpoint/2010/main" val="3328646044"/>
+        <p14:creationId xmlns:p14="http://schemas.microsoft.com/office/powerpoint/2010/main" val="2964064638"/>
+      </p:ext>
+    </p:extLst>
+  </p:cSld>
+  <p:clrMapOvr>
+    <a:masterClrMapping/>
+  </p:clrMapOvr>
+</p:sld>
+</file>
+
+<file path=ppt/slides/slide9.xml><?xml version="1.0" encoding="utf-8"?>
+<p:sld xmlns:a="http://schemas.openxmlformats.org/drawingml/2006/main" xmlns:r="http://schemas.openxmlformats.org/officeDocument/2006/relationships" xmlns:p="http://schemas.openxmlformats.org/presentationml/2006/main">
+  <p:cSld>
+    <p:spTree>
+      <p:nvGrpSpPr>
+        <p:cNvPr id="1" name=""/>
+        <p:cNvGrpSpPr/>
+        <p:nvPr/>
+      </p:nvGrpSpPr>
+      <p:grpSpPr>
+        <a:xfrm>
+          <a:off x="0" y="0"/>
+          <a:ext cx="0" cy="0"/>
+          <a:chOff x="0" y="0"/>
+          <a:chExt cx="0" cy="0"/>
+        </a:xfrm>
+      </p:grpSpPr>
+      <p:sp>
+        <p:nvSpPr>
+          <p:cNvPr id="2" name="Title 1">
+            <a:extLst>
+              <a:ext uri="{FF2B5EF4-FFF2-40B4-BE49-F238E27FC236}">
+                <a16:creationId xmlns:a16="http://schemas.microsoft.com/office/drawing/2014/main" id="{714C7195-C384-49F5-A35D-E7A85AA14257}"/>
+              </a:ext>
+            </a:extLst>
+          </p:cNvPr>
+          <p:cNvSpPr>
+            <a:spLocks noGrp="1"/>
+          </p:cNvSpPr>
+          <p:nvPr>
+            <p:ph type="title"/>
+          </p:nvPr>
+        </p:nvSpPr>
+        <p:spPr/>
+        <p:txBody>
+          <a:bodyPr/>
+          <a:lstStyle/>
+          <a:p>
+            <a:r>
+              <a:rPr lang="en-GB" dirty="0"/>
+              <a:t>Conclusion</a:t>
+            </a:r>
+          </a:p>
+        </p:txBody>
+      </p:sp>
+      <p:sp>
+        <p:nvSpPr>
+          <p:cNvPr id="3" name="Content Placeholder 2">
+            <a:extLst>
+              <a:ext uri="{FF2B5EF4-FFF2-40B4-BE49-F238E27FC236}">
+                <a16:creationId xmlns:a16="http://schemas.microsoft.com/office/drawing/2014/main" id="{F2619B6D-1867-4860-9893-EE653B091F62}"/>
+              </a:ext>
+            </a:extLst>
+          </p:cNvPr>
+          <p:cNvSpPr>
+            <a:spLocks noGrp="1"/>
+          </p:cNvSpPr>
+          <p:nvPr>
+            <p:ph idx="1"/>
+          </p:nvPr>
+        </p:nvSpPr>
+        <p:spPr/>
+        <p:txBody>
+          <a:bodyPr/>
+          <a:lstStyle/>
+          <a:p>
+            <a:endParaRPr lang="en-GB"/>
+          </a:p>
+        </p:txBody>
+      </p:sp>
+    </p:spTree>
+    <p:extLst>
+      <p:ext uri="{BB962C8B-B14F-4D97-AF65-F5344CB8AC3E}">
+        <p14:creationId xmlns:p14="http://schemas.microsoft.com/office/powerpoint/2010/main" val="741771949"/>
       </p:ext>
     </p:extLst>
   </p:cSld>
@@ -7309,23 +7450,6 @@
 </file>
 
 <file path=customXml/item1.xml><?xml version="1.0" encoding="utf-8"?>
-<?mso-contentType ?>
-<FormTemplates xmlns="http://schemas.microsoft.com/sharepoint/v3/contenttype/forms">
-  <Display>DocumentLibraryForm</Display>
-  <Edit>DocumentLibraryForm</Edit>
-  <New>DocumentLibraryForm</New>
-</FormTemplates>
-</file>
-
-<file path=customXml/item2.xml><?xml version="1.0" encoding="utf-8"?>
-<p:properties xmlns:p="http://schemas.microsoft.com/office/2006/metadata/properties" xmlns:xsi="http://www.w3.org/2001/XMLSchema-instance" xmlns:pc="http://schemas.microsoft.com/office/infopath/2007/PartnerControls">
-  <documentManagement>
-    <MediaServiceKeyPoints xmlns="71af3243-3dd4-4a8d-8c0d-dd76da1f02a5" xsi:nil="true"/>
-  </documentManagement>
-</p:properties>
-</file>
-
-<file path=customXml/item3.xml><?xml version="1.0" encoding="utf-8"?>
 <ct:contentTypeSchema xmlns:ct="http://schemas.microsoft.com/office/2006/metadata/contentType" xmlns:ma="http://schemas.microsoft.com/office/2006/metadata/properties/metaAttributes" ct:_="" ma:_="" ma:contentTypeName="Document" ma:contentTypeID="0x01010079F111ED35F8CC479449609E8A0923A6" ma:contentTypeVersion="11" ma:contentTypeDescription="Create a new document." ma:contentTypeScope="" ma:versionID="96291512c1ee715ab617f4c07df79fc1">
   <xsd:schema xmlns:xsd="http://www.w3.org/2001/XMLSchema" xmlns:xs="http://www.w3.org/2001/XMLSchema" xmlns:p="http://schemas.microsoft.com/office/2006/metadata/properties" xmlns:ns2="71af3243-3dd4-4a8d-8c0d-dd76da1f02a5" xmlns:ns3="16c05727-aa75-4e4a-9b5f-8a80a1165891" targetNamespace="http://schemas.microsoft.com/office/2006/metadata/properties" ma:root="true" ma:fieldsID="8256c27c40ca5c40ce1cf6c44f0205df" ns2:_="" ns3:_="">
     <xsd:import namespace="71af3243-3dd4-4a8d-8c0d-dd76da1f02a5"/>
@@ -7536,25 +7660,24 @@
 </ct:contentTypeSchema>
 </file>
 
-<file path=customXml/itemProps1.xml><?xml version="1.0" encoding="utf-8"?>
-<ds:datastoreItem xmlns:ds="http://schemas.openxmlformats.org/officeDocument/2006/customXml" ds:itemID="{38C25A74-1E0C-4362-AFA3-6197BD285F3A}">
-  <ds:schemaRefs>
-    <ds:schemaRef ds:uri="http://schemas.microsoft.com/sharepoint/v3/contenttype/forms"/>
-  </ds:schemaRefs>
-</ds:datastoreItem>
+<file path=customXml/item2.xml><?xml version="1.0" encoding="utf-8"?>
+<p:properties xmlns:p="http://schemas.microsoft.com/office/2006/metadata/properties" xmlns:xsi="http://www.w3.org/2001/XMLSchema-instance" xmlns:pc="http://schemas.microsoft.com/office/infopath/2007/PartnerControls">
+  <documentManagement>
+    <MediaServiceKeyPoints xmlns="71af3243-3dd4-4a8d-8c0d-dd76da1f02a5" xsi:nil="true"/>
+  </documentManagement>
+</p:properties>
 </file>
 
-<file path=customXml/itemProps2.xml><?xml version="1.0" encoding="utf-8"?>
-<ds:datastoreItem xmlns:ds="http://schemas.openxmlformats.org/officeDocument/2006/customXml" ds:itemID="{0EC94942-C689-461B-8649-1FD863C6BA2B}">
-  <ds:schemaRefs>
-    <ds:schemaRef ds:uri="http://schemas.microsoft.com/office/2006/metadata/properties"/>
-    <ds:schemaRef ds:uri="http://schemas.microsoft.com/office/infopath/2007/PartnerControls"/>
-    <ds:schemaRef ds:uri="71af3243-3dd4-4a8d-8c0d-dd76da1f02a5"/>
-  </ds:schemaRefs>
-</ds:datastoreItem>
+<file path=customXml/item3.xml><?xml version="1.0" encoding="utf-8"?>
+<?mso-contentType ?>
+<FormTemplates xmlns="http://schemas.microsoft.com/sharepoint/v3/contenttype/forms">
+  <Display>DocumentLibraryForm</Display>
+  <Edit>DocumentLibraryForm</Edit>
+  <New>DocumentLibraryForm</New>
+</FormTemplates>
 </file>
 
-<file path=customXml/itemProps3.xml><?xml version="1.0" encoding="utf-8"?>
+<file path=customXml/itemProps1.xml><?xml version="1.0" encoding="utf-8"?>
 <ds:datastoreItem xmlns:ds="http://schemas.openxmlformats.org/officeDocument/2006/customXml" ds:itemID="{096277B9-27DA-47CA-9593-62E4BB44ABEA}">
   <ds:schemaRefs>
     <ds:schemaRef ds:uri="http://schemas.microsoft.com/office/2006/metadata/contentType"/>
@@ -7571,4 +7694,22 @@
     <ds:schemaRef ds:uri="http://schemas.microsoft.com/internal/obd"/>
   </ds:schemaRefs>
 </ds:datastoreItem>
+</file>
+
+<file path=customXml/itemProps2.xml><?xml version="1.0" encoding="utf-8"?>
+<ds:datastoreItem xmlns:ds="http://schemas.openxmlformats.org/officeDocument/2006/customXml" ds:itemID="{0EC94942-C689-461B-8649-1FD863C6BA2B}">
+  <ds:schemaRefs>
+    <ds:schemaRef ds:uri="http://schemas.microsoft.com/office/2006/metadata/properties"/>
+    <ds:schemaRef ds:uri="http://schemas.microsoft.com/office/infopath/2007/PartnerControls"/>
+    <ds:schemaRef ds:uri="71af3243-3dd4-4a8d-8c0d-dd76da1f02a5"/>
+  </ds:schemaRefs>
+</ds:datastoreItem>
+</file>
+
+<file path=customXml/itemProps3.xml><?xml version="1.0" encoding="utf-8"?>
+<ds:datastoreItem xmlns:ds="http://schemas.openxmlformats.org/officeDocument/2006/customXml" ds:itemID="{38C25A74-1E0C-4362-AFA3-6197BD285F3A}">
+  <ds:schemaRefs>
+    <ds:schemaRef ds:uri="http://schemas.microsoft.com/sharepoint/v3/contenttype/forms"/>
+  </ds:schemaRefs>
+</ds:datastoreItem>
 </file>
</xml_diff>

<commit_message>
Added the results slide to the pp
</commit_message>
<xml_diff>
--- a/The diversity of plaques in London.pptx
+++ b/The diversity of plaques in London.pptx
@@ -133,6 +133,7 @@
 <p1510:revInfo xmlns:a="http://schemas.openxmlformats.org/drawingml/2006/main" xmlns:r="http://schemas.openxmlformats.org/officeDocument/2006/relationships" xmlns:p1510="http://schemas.microsoft.com/office/powerpoint/2015/10/main">
   <p1510:revLst>
     <p1510:client id="{3EF2237C-C954-4D3A-BC32-427C31654D90}" v="4" dt="2020-07-09T11:40:33.759"/>
+    <p1510:client id="{BD7FA2E4-BE5F-4912-B99F-0599FCD48A39}" v="2" dt="2020-07-09T18:25:49.422"/>
   </p1510:revLst>
 </p1510:revInfo>
 </file>
@@ -5742,37 +5743,44 @@
             <p:ph idx="1"/>
           </p:nvPr>
         </p:nvSpPr>
-        <p:spPr/>
-        <p:txBody>
-          <a:bodyPr/>
+        <p:spPr>
+          <a:xfrm>
+            <a:off x="1206501" y="1869600"/>
+            <a:ext cx="4127499" cy="3921600"/>
+          </a:xfrm>
+        </p:spPr>
+        <p:txBody>
+          <a:bodyPr>
+            <a:normAutofit/>
+          </a:bodyPr>
           <a:lstStyle/>
           <a:p>
             <a:r>
-              <a:rPr lang="en-GB" dirty="0"/>
+              <a:rPr lang="en-GB" sz="2400" dirty="0"/>
               <a:t>Why</a:t>
             </a:r>
           </a:p>
           <a:p>
             <a:r>
-              <a:rPr lang="en-GB" dirty="0"/>
+              <a:rPr lang="en-GB" sz="2400" dirty="0"/>
               <a:t>Who + What</a:t>
             </a:r>
           </a:p>
           <a:p>
             <a:r>
-              <a:rPr lang="en-GB" dirty="0"/>
+              <a:rPr lang="en-GB" sz="2400" dirty="0"/>
               <a:t>Where</a:t>
             </a:r>
           </a:p>
           <a:p>
             <a:r>
-              <a:rPr lang="en-GB" dirty="0"/>
+              <a:rPr lang="en-GB" sz="2400" dirty="0"/>
               <a:t>When</a:t>
             </a:r>
           </a:p>
           <a:p>
             <a:r>
-              <a:rPr lang="en-GB" dirty="0"/>
+              <a:rPr lang="en-GB" sz="2400" dirty="0"/>
               <a:t>How</a:t>
             </a:r>
           </a:p>
@@ -6076,7 +6084,7 @@
           <a:p>
             <a:r>
               <a:rPr lang="en-GB" dirty="0"/>
-              <a:t>Work on the report was done from: 11-06-2020 to 07-07-2020</a:t>
+              <a:t>Work on the report was done from: 11-06-2020 to 09-07-2020</a:t>
             </a:r>
           </a:p>
           <a:p>
@@ -6532,14 +6540,222 @@
             <p:ph idx="1"/>
           </p:nvPr>
         </p:nvSpPr>
-        <p:spPr/>
-        <p:txBody>
-          <a:bodyPr/>
+        <p:spPr>
+          <a:xfrm>
+            <a:off x="685801" y="1869601"/>
+            <a:ext cx="10134599" cy="3921600"/>
+          </a:xfrm>
+        </p:spPr>
+        <p:txBody>
+          <a:bodyPr>
+            <a:normAutofit lnSpcReduction="10000"/>
+          </a:bodyPr>
           <a:lstStyle/>
           <a:p>
             <a:r>
               <a:rPr lang="en-GB" dirty="0"/>
-              <a:t>The </a:t>
+              <a:t>The results from this test finding those with the highest chance to links with slavery follow:</a:t>
+            </a:r>
+          </a:p>
+          <a:p>
+            <a:pPr marL="457200" lvl="1" indent="0">
+              <a:buNone/>
+            </a:pPr>
+            <a:r>
+              <a:rPr lang="en-GB" dirty="0">
+                <a:highlight>
+                  <a:srgbClr val="700000"/>
+                </a:highlight>
+              </a:rPr>
+              <a:t>Robert Milligan</a:t>
+            </a:r>
+            <a:br>
+              <a:rPr lang="en-GB" dirty="0"/>
+            </a:br>
+            <a:r>
+              <a:rPr lang="en-GB" dirty="0"/>
+              <a:t>William Ewart Gladstone</a:t>
+            </a:r>
+            <a:br>
+              <a:rPr lang="en-GB" dirty="0"/>
+            </a:br>
+            <a:r>
+              <a:rPr lang="en-GB" dirty="0">
+                <a:highlight>
+                  <a:srgbClr val="700000"/>
+                </a:highlight>
+              </a:rPr>
+              <a:t>Admiral Sir Edward Codrington RN GCB FRS</a:t>
+            </a:r>
+            <a:br>
+              <a:rPr lang="en-GB" dirty="0"/>
+            </a:br>
+            <a:r>
+              <a:rPr lang="en-GB" dirty="0">
+                <a:highlight>
+                  <a:srgbClr val="700000"/>
+                </a:highlight>
+              </a:rPr>
+              <a:t>Simón Bolívar</a:t>
+            </a:r>
+            <a:br>
+              <a:rPr lang="en-GB" dirty="0"/>
+            </a:br>
+            <a:r>
+              <a:rPr lang="en-GB" dirty="0">
+                <a:highlight>
+                  <a:srgbClr val="700000"/>
+                </a:highlight>
+              </a:rPr>
+              <a:t>John Gladstone FRSE</a:t>
+            </a:r>
+            <a:br>
+              <a:rPr lang="en-GB" dirty="0"/>
+            </a:br>
+            <a:r>
+              <a:rPr lang="en-GB" dirty="0"/>
+              <a:t>Quintin Hogg</a:t>
+            </a:r>
+            <a:br>
+              <a:rPr lang="en-GB" dirty="0"/>
+            </a:br>
+            <a:r>
+              <a:rPr lang="en-GB" dirty="0">
+                <a:highlight>
+                  <a:srgbClr val="700000"/>
+                </a:highlight>
+              </a:rPr>
+              <a:t>George Whitefield</a:t>
+            </a:r>
+            <a:br>
+              <a:rPr lang="en-GB" dirty="0"/>
+            </a:br>
+            <a:r>
+              <a:rPr lang="en-GB" dirty="0"/>
+              <a:t>Richard Cobden</a:t>
+            </a:r>
+            <a:br>
+              <a:rPr lang="en-GB" dirty="0"/>
+            </a:br>
+            <a:r>
+              <a:rPr lang="en-GB" dirty="0"/>
+              <a:t>Dr James Wilson</a:t>
+            </a:r>
+            <a:br>
+              <a:rPr lang="en-GB" dirty="0"/>
+            </a:br>
+            <a:r>
+              <a:rPr lang="en-GB" dirty="0"/>
+              <a:t>William Murray, 1st Earl of Mansfield</a:t>
+            </a:r>
+            <a:br>
+              <a:rPr lang="en-GB" dirty="0"/>
+            </a:br>
+            <a:r>
+              <a:rPr lang="en-GB" dirty="0"/>
+              <a:t>John Graves Simcoe</a:t>
+            </a:r>
+            <a:br>
+              <a:rPr lang="en-GB" dirty="0"/>
+            </a:br>
+            <a:r>
+              <a:rPr lang="en-GB" dirty="0">
+                <a:highlight>
+                  <a:srgbClr val="700000"/>
+                </a:highlight>
+              </a:rPr>
+              <a:t>Thomas Drayton</a:t>
+            </a:r>
+            <a:br>
+              <a:rPr lang="en-GB" dirty="0"/>
+            </a:br>
+            <a:r>
+              <a:rPr lang="en-GB" dirty="0"/>
+              <a:t>Sir Lt Gen Thomas </a:t>
+            </a:r>
+            <a:r>
+              <a:rPr lang="en-GB" dirty="0" err="1"/>
+              <a:t>Picton</a:t>
+            </a:r>
+            <a:r>
+              <a:rPr lang="en-GB" dirty="0"/>
+              <a:t> GCB</a:t>
+            </a:r>
+            <a:br>
+              <a:rPr lang="en-GB" dirty="0"/>
+            </a:br>
+            <a:r>
+              <a:rPr lang="en-GB" dirty="0">
+                <a:highlight>
+                  <a:srgbClr val="700000"/>
+                </a:highlight>
+              </a:rPr>
+              <a:t>Sir Francis Drake</a:t>
+            </a:r>
+            <a:br>
+              <a:rPr lang="en-GB" dirty="0"/>
+            </a:br>
+            <a:r>
+              <a:rPr lang="en-GB" dirty="0"/>
+              <a:t>John Hancock</a:t>
+            </a:r>
+          </a:p>
+        </p:txBody>
+      </p:sp>
+      <p:sp>
+        <p:nvSpPr>
+          <p:cNvPr id="4" name="TextBox 3">
+            <a:extLst>
+              <a:ext uri="{FF2B5EF4-FFF2-40B4-BE49-F238E27FC236}">
+                <a16:creationId xmlns:a16="http://schemas.microsoft.com/office/drawing/2014/main" id="{514B3DE0-8D04-46D1-936F-661F37E9A81F}"/>
+              </a:ext>
+            </a:extLst>
+          </p:cNvPr>
+          <p:cNvSpPr txBox="1"/>
+          <p:nvPr/>
+        </p:nvSpPr>
+        <p:spPr>
+          <a:xfrm>
+            <a:off x="6096000" y="3118188"/>
+            <a:ext cx="4394200" cy="2031325"/>
+          </a:xfrm>
+          <a:prstGeom prst="rect">
+            <a:avLst/>
+          </a:prstGeom>
+          <a:noFill/>
+        </p:spPr>
+        <p:txBody>
+          <a:bodyPr wrap="square" rtlCol="0">
+            <a:spAutoFit/>
+          </a:bodyPr>
+          <a:lstStyle/>
+          <a:p>
+            <a:r>
+              <a:rPr lang="en-GB" dirty="0"/>
+              <a:t>Key:</a:t>
+            </a:r>
+          </a:p>
+          <a:p>
+            <a:r>
+              <a:rPr lang="en-GB" dirty="0"/>
+              <a:t>	</a:t>
+            </a:r>
+            <a:r>
+              <a:rPr lang="en-GB" dirty="0">
+                <a:highlight>
+                  <a:srgbClr val="700000"/>
+                </a:highlight>
+              </a:rPr>
+              <a:t>Slave trader/owned slaves</a:t>
+            </a:r>
+          </a:p>
+          <a:p>
+            <a:endParaRPr lang="en-GB" dirty="0"/>
+          </a:p>
+          <a:p>
+            <a:r>
+              <a:rPr lang="en-GB" dirty="0"/>
+              <a:t> That is not to say that the other names certainly deserve a place but they are not slave traders/owners from the Wikipedia search I conducted.</a:t>
             </a:r>
           </a:p>
         </p:txBody>
@@ -6623,7 +6839,22 @@
           <a:bodyPr/>
           <a:lstStyle/>
           <a:p>
-            <a:endParaRPr lang="en-GB"/>
+            <a:r>
+              <a:rPr lang="en-GB" dirty="0"/>
+              <a:t>There is not a large diversity of those commemorated by plaques in London</a:t>
+            </a:r>
+          </a:p>
+          <a:p>
+            <a:r>
+              <a:rPr lang="en-GB" dirty="0"/>
+              <a:t>The bad actor scoring system does effectively filter down the number of possible candidates, reducing the time needed for a human to check those commemorated.</a:t>
+            </a:r>
+          </a:p>
+          <a:p>
+            <a:r>
+              <a:rPr lang="en-GB" dirty="0"/>
+              <a:t>The scoring system still needs a human to validate the choices – often the links are more complicated e.g. money/slaves inherited from family which the simply model cannot differentiate.</a:t>
+            </a:r>
           </a:p>
         </p:txBody>
       </p:sp>
@@ -7661,20 +7892,20 @@
 </file>
 
 <file path=customXml/item2.xml><?xml version="1.0" encoding="utf-8"?>
-<p:properties xmlns:p="http://schemas.microsoft.com/office/2006/metadata/properties" xmlns:xsi="http://www.w3.org/2001/XMLSchema-instance" xmlns:pc="http://schemas.microsoft.com/office/infopath/2007/PartnerControls">
-  <documentManagement>
-    <MediaServiceKeyPoints xmlns="71af3243-3dd4-4a8d-8c0d-dd76da1f02a5" xsi:nil="true"/>
-  </documentManagement>
-</p:properties>
-</file>
-
-<file path=customXml/item3.xml><?xml version="1.0" encoding="utf-8"?>
 <?mso-contentType ?>
 <FormTemplates xmlns="http://schemas.microsoft.com/sharepoint/v3/contenttype/forms">
   <Display>DocumentLibraryForm</Display>
   <Edit>DocumentLibraryForm</Edit>
   <New>DocumentLibraryForm</New>
 </FormTemplates>
+</file>
+
+<file path=customXml/item3.xml><?xml version="1.0" encoding="utf-8"?>
+<p:properties xmlns:p="http://schemas.microsoft.com/office/2006/metadata/properties" xmlns:xsi="http://www.w3.org/2001/XMLSchema-instance" xmlns:pc="http://schemas.microsoft.com/office/infopath/2007/PartnerControls">
+  <documentManagement>
+    <MediaServiceKeyPoints xmlns="71af3243-3dd4-4a8d-8c0d-dd76da1f02a5" xsi:nil="true"/>
+  </documentManagement>
+</p:properties>
 </file>
 
 <file path=customXml/itemProps1.xml><?xml version="1.0" encoding="utf-8"?>
@@ -7697,6 +7928,14 @@
 </file>
 
 <file path=customXml/itemProps2.xml><?xml version="1.0" encoding="utf-8"?>
+<ds:datastoreItem xmlns:ds="http://schemas.openxmlformats.org/officeDocument/2006/customXml" ds:itemID="{38C25A74-1E0C-4362-AFA3-6197BD285F3A}">
+  <ds:schemaRefs>
+    <ds:schemaRef ds:uri="http://schemas.microsoft.com/sharepoint/v3/contenttype/forms"/>
+  </ds:schemaRefs>
+</ds:datastoreItem>
+</file>
+
+<file path=customXml/itemProps3.xml><?xml version="1.0" encoding="utf-8"?>
 <ds:datastoreItem xmlns:ds="http://schemas.openxmlformats.org/officeDocument/2006/customXml" ds:itemID="{0EC94942-C689-461B-8649-1FD863C6BA2B}">
   <ds:schemaRefs>
     <ds:schemaRef ds:uri="http://schemas.microsoft.com/office/2006/metadata/properties"/>
@@ -7704,12 +7943,4 @@
     <ds:schemaRef ds:uri="71af3243-3dd4-4a8d-8c0d-dd76da1f02a5"/>
   </ds:schemaRefs>
 </ds:datastoreItem>
-</file>
-
-<file path=customXml/itemProps3.xml><?xml version="1.0" encoding="utf-8"?>
-<ds:datastoreItem xmlns:ds="http://schemas.openxmlformats.org/officeDocument/2006/customXml" ds:itemID="{38C25A74-1E0C-4362-AFA3-6197BD285F3A}">
-  <ds:schemaRefs>
-    <ds:schemaRef ds:uri="http://schemas.microsoft.com/sharepoint/v3/contenttype/forms"/>
-  </ds:schemaRefs>
-</ds:datastoreItem>
 </file>
</xml_diff>

<commit_message>
Added images to the slides
</commit_message>
<xml_diff>
--- a/The diversity of plaques in London.pptx
+++ b/The diversity of plaques in London.pptx
@@ -133,7 +133,7 @@
 <p1510:revInfo xmlns:a="http://schemas.openxmlformats.org/drawingml/2006/main" xmlns:r="http://schemas.openxmlformats.org/officeDocument/2006/relationships" xmlns:p1510="http://schemas.microsoft.com/office/powerpoint/2015/10/main">
   <p1510:revLst>
     <p1510:client id="{3EF2237C-C954-4D3A-BC32-427C31654D90}" v="4" dt="2020-07-09T11:40:33.759"/>
-    <p1510:client id="{BD7FA2E4-BE5F-4912-B99F-0599FCD48A39}" v="2" dt="2020-07-09T18:25:49.422"/>
+    <p1510:client id="{BD7FA2E4-BE5F-4912-B99F-0599FCD48A39}" v="7" dt="2020-07-09T18:49:41.120"/>
   </p1510:revLst>
 </p1510:revInfo>
 </file>
@@ -5786,6 +5786,53 @@
           </a:p>
         </p:txBody>
       </p:sp>
+      <p:pic>
+        <p:nvPicPr>
+          <p:cNvPr id="1026" name="Picture 2">
+            <a:extLst>
+              <a:ext uri="{FF2B5EF4-FFF2-40B4-BE49-F238E27FC236}">
+                <a16:creationId xmlns:a16="http://schemas.microsoft.com/office/drawing/2014/main" id="{8ED130F5-AA77-426A-86C4-B628A6622A71}"/>
+              </a:ext>
+            </a:extLst>
+          </p:cNvPr>
+          <p:cNvPicPr>
+            <a:picLocks noChangeAspect="1" noChangeArrowheads="1"/>
+          </p:cNvPicPr>
+          <p:nvPr/>
+        </p:nvPicPr>
+        <p:blipFill>
+          <a:blip r:embed="rId2">
+            <a:extLst>
+              <a:ext uri="{28A0092B-C50C-407E-A947-70E740481C1C}">
+                <a14:useLocalDpi xmlns:a14="http://schemas.microsoft.com/office/drawing/2010/main" val="0"/>
+              </a:ext>
+            </a:extLst>
+          </a:blip>
+          <a:srcRect/>
+          <a:stretch>
+            <a:fillRect/>
+          </a:stretch>
+        </p:blipFill>
+        <p:spPr bwMode="auto">
+          <a:xfrm>
+            <a:off x="4406900" y="1066800"/>
+            <a:ext cx="6096000" cy="4572000"/>
+          </a:xfrm>
+          <a:prstGeom prst="rect">
+            <a:avLst/>
+          </a:prstGeom>
+          <a:noFill/>
+          <a:extLst>
+            <a:ext uri="{909E8E84-426E-40DD-AFC4-6F175D3DCCD1}">
+              <a14:hiddenFill xmlns:a14="http://schemas.microsoft.com/office/drawing/2010/main">
+                <a:solidFill>
+                  <a:srgbClr val="FFFFFF"/>
+                </a:solidFill>
+              </a14:hiddenFill>
+            </a:ext>
+          </a:extLst>
+        </p:spPr>
+      </p:pic>
     </p:spTree>
     <p:extLst>
       <p:ext uri="{BB962C8B-B14F-4D97-AF65-F5344CB8AC3E}">
@@ -5930,9 +5977,16 @@
             <p:ph type="title"/>
           </p:nvPr>
         </p:nvSpPr>
-        <p:spPr/>
-        <p:txBody>
-          <a:bodyPr/>
+        <p:spPr>
+          <a:xfrm>
+            <a:off x="685801" y="609600"/>
+            <a:ext cx="10840914" cy="1260000"/>
+          </a:xfrm>
+        </p:spPr>
+        <p:txBody>
+          <a:bodyPr anchor="ctr">
+            <a:normAutofit/>
+          </a:bodyPr>
           <a:lstStyle/>
           <a:p>
             <a:r>
@@ -5942,6 +5996,59 @@
           </a:p>
         </p:txBody>
       </p:sp>
+      <p:pic>
+        <p:nvPicPr>
+          <p:cNvPr id="2050" name="Picture 2">
+            <a:extLst>
+              <a:ext uri="{FF2B5EF4-FFF2-40B4-BE49-F238E27FC236}">
+                <a16:creationId xmlns:a16="http://schemas.microsoft.com/office/drawing/2014/main" id="{AC170033-D6BB-4622-85E6-629D29675E57}"/>
+              </a:ext>
+            </a:extLst>
+          </p:cNvPr>
+          <p:cNvPicPr>
+            <a:picLocks noChangeAspect="1" noChangeArrowheads="1"/>
+          </p:cNvPicPr>
+          <p:nvPr/>
+        </p:nvPicPr>
+        <p:blipFill rotWithShape="1">
+          <a:blip r:embed="rId2">
+            <a:extLst>
+              <a:ext uri="{28A0092B-C50C-407E-A947-70E740481C1C}">
+                <a14:useLocalDpi xmlns:a14="http://schemas.microsoft.com/office/drawing/2010/main" val="0"/>
+              </a:ext>
+            </a:extLst>
+          </a:blip>
+          <a:srcRect l="1219" r="2393" b="2"/>
+          <a:stretch/>
+        </p:blipFill>
+        <p:spPr bwMode="auto">
+          <a:xfrm>
+            <a:off x="685802" y="1869600"/>
+            <a:ext cx="5040000" cy="3921601"/>
+          </a:xfrm>
+          <a:prstGeom prst="roundRect">
+            <a:avLst>
+              <a:gd name="adj" fmla="val 1970"/>
+            </a:avLst>
+          </a:prstGeom>
+          <a:solidFill>
+            <a:srgbClr val="FFFFFF"/>
+          </a:solidFill>
+          <a:ln w="28575">
+            <a:noFill/>
+          </a:ln>
+          <a:effectLst/>
+          <a:extLst>
+            <a:ext uri="{909E8E84-426E-40DD-AFC4-6F175D3DCCD1}">
+              <a14:hiddenFill xmlns:a14="http://schemas.microsoft.com/office/drawing/2010/main">
+                <a:solidFill>
+                  <a:srgbClr val="FFFFFF"/>
+                </a:solidFill>
+              </a14:hiddenFill>
+            </a:ext>
+          </a:extLst>
+        </p:spPr>
+      </p:pic>
       <p:sp>
         <p:nvSpPr>
           <p:cNvPr id="3" name="Content Placeholder 2">
@@ -5955,12 +6062,19 @@
             <a:spLocks noGrp="1"/>
           </p:cNvSpPr>
           <p:nvPr>
-            <p:ph idx="1"/>
-          </p:nvPr>
-        </p:nvSpPr>
-        <p:spPr/>
-        <p:txBody>
-          <a:bodyPr/>
+            <p:ph sz="half" idx="2"/>
+          </p:nvPr>
+        </p:nvSpPr>
+        <p:spPr>
+          <a:xfrm>
+            <a:off x="6488644" y="1869601"/>
+            <a:ext cx="5040000" cy="3921600"/>
+          </a:xfrm>
+        </p:spPr>
+        <p:txBody>
+          <a:bodyPr anchor="t">
+            <a:normAutofit/>
+          </a:bodyPr>
           <a:lstStyle/>
           <a:p>
             <a:r>
@@ -5969,7 +6083,7 @@
             </a:r>
             <a:r>
               <a:rPr lang="en-GB" dirty="0">
-                <a:hlinkClick r:id="rId2"/>
+                <a:hlinkClick r:id="rId3"/>
               </a:rPr>
               <a:t>http://openplaques.org/</a:t>
             </a:r>
@@ -6035,9 +6149,16 @@
             <p:ph type="title"/>
           </p:nvPr>
         </p:nvSpPr>
-        <p:spPr/>
-        <p:txBody>
-          <a:bodyPr/>
+        <p:spPr>
+          <a:xfrm>
+            <a:off x="685801" y="609600"/>
+            <a:ext cx="10840914" cy="1260000"/>
+          </a:xfrm>
+        </p:spPr>
+        <p:txBody>
+          <a:bodyPr anchor="ctr">
+            <a:normAutofit/>
+          </a:bodyPr>
           <a:lstStyle/>
           <a:p>
             <a:r>
@@ -6060,12 +6181,19 @@
             <a:spLocks noGrp="1"/>
           </p:cNvSpPr>
           <p:nvPr>
-            <p:ph idx="1"/>
-          </p:nvPr>
-        </p:nvSpPr>
-        <p:spPr/>
-        <p:txBody>
-          <a:bodyPr/>
+            <p:ph sz="half" idx="1"/>
+          </p:nvPr>
+        </p:nvSpPr>
+        <p:spPr>
+          <a:xfrm>
+            <a:off x="685802" y="1869600"/>
+            <a:ext cx="5040000" cy="3921601"/>
+          </a:xfrm>
+        </p:spPr>
+        <p:txBody>
+          <a:bodyPr anchor="t">
+            <a:normAutofit/>
+          </a:bodyPr>
           <a:lstStyle/>
           <a:p>
             <a:r>
@@ -6092,6 +6220,42 @@
           </a:p>
         </p:txBody>
       </p:sp>
+      <p:pic>
+        <p:nvPicPr>
+          <p:cNvPr id="4" name="Picture 3">
+            <a:extLst>
+              <a:ext uri="{FF2B5EF4-FFF2-40B4-BE49-F238E27FC236}">
+                <a16:creationId xmlns:a16="http://schemas.microsoft.com/office/drawing/2014/main" id="{C37D857B-B344-4A79-BAF0-E753659B60EA}"/>
+              </a:ext>
+            </a:extLst>
+          </p:cNvPr>
+          <p:cNvPicPr>
+            <a:picLocks noChangeAspect="1"/>
+          </p:cNvPicPr>
+          <p:nvPr/>
+        </p:nvPicPr>
+        <p:blipFill rotWithShape="1">
+          <a:blip r:embed="rId2"/>
+          <a:srcRect l="2835" r="3023" b="-2"/>
+          <a:stretch/>
+        </p:blipFill>
+        <p:spPr>
+          <a:xfrm>
+            <a:off x="6488644" y="1869601"/>
+            <a:ext cx="5040000" cy="3921600"/>
+          </a:xfrm>
+          <a:prstGeom prst="roundRect">
+            <a:avLst>
+              <a:gd name="adj" fmla="val 2211"/>
+            </a:avLst>
+          </a:prstGeom>
+          <a:noFill/>
+          <a:ln w="28575">
+            <a:noFill/>
+          </a:ln>
+          <a:effectLst/>
+        </p:spPr>
+      </p:pic>
     </p:spTree>
     <p:extLst>
       <p:ext uri="{BB962C8B-B14F-4D97-AF65-F5344CB8AC3E}">
@@ -7892,20 +8056,20 @@
 </file>
 
 <file path=customXml/item2.xml><?xml version="1.0" encoding="utf-8"?>
+<p:properties xmlns:p="http://schemas.microsoft.com/office/2006/metadata/properties" xmlns:xsi="http://www.w3.org/2001/XMLSchema-instance" xmlns:pc="http://schemas.microsoft.com/office/infopath/2007/PartnerControls">
+  <documentManagement>
+    <MediaServiceKeyPoints xmlns="71af3243-3dd4-4a8d-8c0d-dd76da1f02a5" xsi:nil="true"/>
+  </documentManagement>
+</p:properties>
+</file>
+
+<file path=customXml/item3.xml><?xml version="1.0" encoding="utf-8"?>
 <?mso-contentType ?>
 <FormTemplates xmlns="http://schemas.microsoft.com/sharepoint/v3/contenttype/forms">
   <Display>DocumentLibraryForm</Display>
   <Edit>DocumentLibraryForm</Edit>
   <New>DocumentLibraryForm</New>
 </FormTemplates>
-</file>
-
-<file path=customXml/item3.xml><?xml version="1.0" encoding="utf-8"?>
-<p:properties xmlns:p="http://schemas.microsoft.com/office/2006/metadata/properties" xmlns:xsi="http://www.w3.org/2001/XMLSchema-instance" xmlns:pc="http://schemas.microsoft.com/office/infopath/2007/PartnerControls">
-  <documentManagement>
-    <MediaServiceKeyPoints xmlns="71af3243-3dd4-4a8d-8c0d-dd76da1f02a5" xsi:nil="true"/>
-  </documentManagement>
-</p:properties>
 </file>
 
 <file path=customXml/itemProps1.xml><?xml version="1.0" encoding="utf-8"?>
@@ -7928,14 +8092,6 @@
 </file>
 
 <file path=customXml/itemProps2.xml><?xml version="1.0" encoding="utf-8"?>
-<ds:datastoreItem xmlns:ds="http://schemas.openxmlformats.org/officeDocument/2006/customXml" ds:itemID="{38C25A74-1E0C-4362-AFA3-6197BD285F3A}">
-  <ds:schemaRefs>
-    <ds:schemaRef ds:uri="http://schemas.microsoft.com/sharepoint/v3/contenttype/forms"/>
-  </ds:schemaRefs>
-</ds:datastoreItem>
-</file>
-
-<file path=customXml/itemProps3.xml><?xml version="1.0" encoding="utf-8"?>
 <ds:datastoreItem xmlns:ds="http://schemas.openxmlformats.org/officeDocument/2006/customXml" ds:itemID="{0EC94942-C689-461B-8649-1FD863C6BA2B}">
   <ds:schemaRefs>
     <ds:schemaRef ds:uri="http://schemas.microsoft.com/office/2006/metadata/properties"/>
@@ -7943,4 +8099,12 @@
     <ds:schemaRef ds:uri="71af3243-3dd4-4a8d-8c0d-dd76da1f02a5"/>
   </ds:schemaRefs>
 </ds:datastoreItem>
+</file>
+
+<file path=customXml/itemProps3.xml><?xml version="1.0" encoding="utf-8"?>
+<ds:datastoreItem xmlns:ds="http://schemas.openxmlformats.org/officeDocument/2006/customXml" ds:itemID="{38C25A74-1E0C-4362-AFA3-6197BD285F3A}">
+  <ds:schemaRefs>
+    <ds:schemaRef ds:uri="http://schemas.microsoft.com/sharepoint/v3/contenttype/forms"/>
+  </ds:schemaRefs>
+</ds:datastoreItem>
 </file>
</xml_diff>

<commit_message>
Update The diversity of plaques in London.pptx
</commit_message>
<xml_diff>
--- a/The diversity of plaques in London.pptx
+++ b/The diversity of plaques in London.pptx
@@ -5,22 +5,21 @@
     <p:sldMasterId id="2147483660" r:id="rId4"/>
   </p:sldMasterIdLst>
   <p:notesMasterIdLst>
-    <p:notesMasterId r:id="rId15"/>
+    <p:notesMasterId r:id="rId14"/>
   </p:notesMasterIdLst>
   <p:handoutMasterIdLst>
-    <p:handoutMasterId r:id="rId16"/>
+    <p:handoutMasterId r:id="rId15"/>
   </p:handoutMasterIdLst>
   <p:sldIdLst>
     <p:sldId id="268" r:id="rId5"/>
-    <p:sldId id="269" r:id="rId6"/>
-    <p:sldId id="270" r:id="rId7"/>
-    <p:sldId id="271" r:id="rId8"/>
-    <p:sldId id="272" r:id="rId9"/>
-    <p:sldId id="273" r:id="rId10"/>
-    <p:sldId id="274" r:id="rId11"/>
-    <p:sldId id="277" r:id="rId12"/>
-    <p:sldId id="275" r:id="rId13"/>
-    <p:sldId id="276" r:id="rId14"/>
+    <p:sldId id="270" r:id="rId6"/>
+    <p:sldId id="271" r:id="rId7"/>
+    <p:sldId id="272" r:id="rId8"/>
+    <p:sldId id="273" r:id="rId9"/>
+    <p:sldId id="274" r:id="rId10"/>
+    <p:sldId id="277" r:id="rId11"/>
+    <p:sldId id="275" r:id="rId12"/>
+    <p:sldId id="276" r:id="rId13"/>
   </p:sldIdLst>
   <p:sldSz cx="12192000" cy="6858000"/>
   <p:notesSz cx="6858000" cy="9144000"/>
@@ -134,6 +133,7 @@
 <p1510:revInfo xmlns:a="http://schemas.openxmlformats.org/drawingml/2006/main" xmlns:r="http://schemas.openxmlformats.org/officeDocument/2006/relationships" xmlns:p1510="http://schemas.microsoft.com/office/powerpoint/2015/10/main">
   <p1510:revLst>
     <p1510:client id="{8DC4D9C7-08E6-458A-80DC-FC5B06C7F9BB}" v="6" dt="2020-07-12T20:20:36.021"/>
+    <p1510:client id="{DB9CFE14-85CC-4C14-96E8-E61B1D0CD012}" v="4" dt="2020-07-13T08:56:33.606"/>
   </p1510:revLst>
 </p1510:revInfo>
 </file>
@@ -232,7 +232,7 @@
           <a:p>
             <a:fld id="{7C0AA17F-CB06-445B-ACD3-321E84E51A80}" type="datetimeFigureOut">
               <a:rPr lang="en-US" smtClean="0"/>
-              <a:t>7/12/2020</a:t>
+              <a:t>7/13/2020</a:t>
             </a:fld>
             <a:endParaRPr lang="en-US" dirty="0"/>
           </a:p>
@@ -409,7 +409,7 @@
           <a:p>
             <a:fld id="{B06141C0-BF72-4A20-AFA7-D05563D549B7}" type="datetimeFigureOut">
               <a:rPr lang="en-US" smtClean="0"/>
-              <a:t>7/12/2020</a:t>
+              <a:t>7/13/2020</a:t>
             </a:fld>
             <a:endParaRPr lang="en-US" dirty="0"/>
           </a:p>
@@ -862,7 +862,7 @@
           <a:p>
             <a:fld id="{984B7D2A-0DF8-424B-9572-B79AEBB2D9DC}" type="datetimeFigureOut">
               <a:rPr lang="en-US" noProof="0" smtClean="0"/>
-              <a:t>7/12/2020</a:t>
+              <a:t>7/13/2020</a:t>
             </a:fld>
             <a:endParaRPr lang="en-US" noProof="0" dirty="0"/>
           </a:p>
@@ -1189,7 +1189,7 @@
           <a:p>
             <a:fld id="{984B7D2A-0DF8-424B-9572-B79AEBB2D9DC}" type="datetimeFigureOut">
               <a:rPr lang="en-US" noProof="0" smtClean="0"/>
-              <a:t>7/12/2020</a:t>
+              <a:t>7/13/2020</a:t>
             </a:fld>
             <a:endParaRPr lang="en-US" noProof="0" dirty="0"/>
           </a:p>
@@ -1350,7 +1350,7 @@
           <a:p>
             <a:fld id="{984B7D2A-0DF8-424B-9572-B79AEBB2D9DC}" type="datetimeFigureOut">
               <a:rPr lang="en-US" noProof="0" smtClean="0"/>
-              <a:t>7/12/2020</a:t>
+              <a:t>7/13/2020</a:t>
             </a:fld>
             <a:endParaRPr lang="en-US" noProof="0" dirty="0"/>
           </a:p>
@@ -1478,7 +1478,7 @@
           <a:p>
             <a:fld id="{984B7D2A-0DF8-424B-9572-B79AEBB2D9DC}" type="datetimeFigureOut">
               <a:rPr lang="en-US" noProof="0" smtClean="0"/>
-              <a:t>7/12/2020</a:t>
+              <a:t>7/13/2020</a:t>
             </a:fld>
             <a:endParaRPr lang="en-US" noProof="0" dirty="0"/>
           </a:p>
@@ -1797,7 +1797,7 @@
           <a:p>
             <a:fld id="{984B7D2A-0DF8-424B-9572-B79AEBB2D9DC}" type="datetimeFigureOut">
               <a:rPr lang="en-US" noProof="0" smtClean="0"/>
-              <a:t>7/12/2020</a:t>
+              <a:t>7/13/2020</a:t>
             </a:fld>
             <a:endParaRPr lang="en-US" noProof="0" dirty="0"/>
           </a:p>
@@ -2093,7 +2093,7 @@
           <a:p>
             <a:fld id="{984B7D2A-0DF8-424B-9572-B79AEBB2D9DC}" type="datetimeFigureOut">
               <a:rPr lang="en-US" noProof="0" smtClean="0"/>
-              <a:t>7/12/2020</a:t>
+              <a:t>7/13/2020</a:t>
             </a:fld>
             <a:endParaRPr lang="en-US" noProof="0" dirty="0"/>
           </a:p>
@@ -2327,7 +2327,7 @@
           <a:p>
             <a:fld id="{984B7D2A-0DF8-424B-9572-B79AEBB2D9DC}" type="datetimeFigureOut">
               <a:rPr lang="en-US" noProof="0" smtClean="0"/>
-              <a:t>7/12/2020</a:t>
+              <a:t>7/13/2020</a:t>
             </a:fld>
             <a:endParaRPr lang="en-US" noProof="0" dirty="0"/>
           </a:p>
@@ -3008,7 +3008,7 @@
           <a:p>
             <a:fld id="{984B7D2A-0DF8-424B-9572-B79AEBB2D9DC}" type="datetimeFigureOut">
               <a:rPr lang="en-US" noProof="0" smtClean="0"/>
-              <a:t>7/12/2020</a:t>
+              <a:t>7/13/2020</a:t>
             </a:fld>
             <a:endParaRPr lang="en-US" noProof="0" dirty="0"/>
           </a:p>
@@ -3329,7 +3329,7 @@
           <a:p>
             <a:fld id="{984B7D2A-0DF8-424B-9572-B79AEBB2D9DC}" type="datetimeFigureOut">
               <a:rPr lang="en-US" noProof="0" smtClean="0"/>
-              <a:t>7/12/2020</a:t>
+              <a:t>7/13/2020</a:t>
             </a:fld>
             <a:endParaRPr lang="en-US" noProof="0" dirty="0"/>
           </a:p>
@@ -3957,7 +3957,7 @@
           <a:p>
             <a:fld id="{984B7D2A-0DF8-424B-9572-B79AEBB2D9DC}" type="datetimeFigureOut">
               <a:rPr lang="en-US" noProof="0" smtClean="0"/>
-              <a:t>7/12/2020</a:t>
+              <a:t>7/13/2020</a:t>
             </a:fld>
             <a:endParaRPr lang="en-US" noProof="0" dirty="0"/>
           </a:p>
@@ -4409,7 +4409,7 @@
           <a:p>
             <a:fld id="{984B7D2A-0DF8-424B-9572-B79AEBB2D9DC}" type="datetimeFigureOut">
               <a:rPr lang="en-US" noProof="0" smtClean="0"/>
-              <a:t>7/12/2020</a:t>
+              <a:t>7/13/2020</a:t>
             </a:fld>
             <a:endParaRPr lang="en-US" noProof="0" dirty="0"/>
           </a:p>
@@ -4807,7 +4807,7 @@
           <a:p>
             <a:fld id="{984B7D2A-0DF8-424B-9572-B79AEBB2D9DC}" type="datetimeFigureOut">
               <a:rPr lang="en-US" noProof="0" smtClean="0"/>
-              <a:t>7/12/2020</a:t>
+              <a:t>7/13/2020</a:t>
             </a:fld>
             <a:endParaRPr lang="en-US" noProof="0" dirty="0"/>
           </a:p>
@@ -5097,7 +5097,7 @@
           <a:p>
             <a:fld id="{984B7D2A-0DF8-424B-9572-B79AEBB2D9DC}" type="datetimeFigureOut">
               <a:rPr lang="en-US" noProof="0" smtClean="0"/>
-              <a:t>7/12/2020</a:t>
+              <a:t>7/13/2020</a:t>
             </a:fld>
             <a:endParaRPr lang="en-US" noProof="0" dirty="0"/>
           </a:p>
@@ -5692,154 +5692,6 @@
 </p:sld>
 </file>
 
-<file path=ppt/slides/slide10.xml><?xml version="1.0" encoding="utf-8"?>
-<p:sld xmlns:a="http://schemas.openxmlformats.org/drawingml/2006/main" xmlns:r="http://schemas.openxmlformats.org/officeDocument/2006/relationships" xmlns:p="http://schemas.openxmlformats.org/presentationml/2006/main">
-  <p:cSld>
-    <p:spTree>
-      <p:nvGrpSpPr>
-        <p:cNvPr id="1" name=""/>
-        <p:cNvGrpSpPr/>
-        <p:nvPr/>
-      </p:nvGrpSpPr>
-      <p:grpSpPr>
-        <a:xfrm>
-          <a:off x="0" y="0"/>
-          <a:ext cx="0" cy="0"/>
-          <a:chOff x="0" y="0"/>
-          <a:chExt cx="0" cy="0"/>
-        </a:xfrm>
-      </p:grpSpPr>
-      <p:sp>
-        <p:nvSpPr>
-          <p:cNvPr id="2" name="Title 1">
-            <a:extLst>
-              <a:ext uri="{FF2B5EF4-FFF2-40B4-BE49-F238E27FC236}">
-                <a16:creationId xmlns:a16="http://schemas.microsoft.com/office/drawing/2014/main" id="{714C7195-C384-49F5-A35D-E7A85AA14257}"/>
-              </a:ext>
-            </a:extLst>
-          </p:cNvPr>
-          <p:cNvSpPr>
-            <a:spLocks noGrp="1"/>
-          </p:cNvSpPr>
-          <p:nvPr>
-            <p:ph type="title"/>
-          </p:nvPr>
-        </p:nvSpPr>
-        <p:spPr/>
-        <p:txBody>
-          <a:bodyPr/>
-          <a:lstStyle/>
-          <a:p>
-            <a:r>
-              <a:rPr lang="en-GB" dirty="0"/>
-              <a:t>Conclusion</a:t>
-            </a:r>
-          </a:p>
-        </p:txBody>
-      </p:sp>
-      <p:sp>
-        <p:nvSpPr>
-          <p:cNvPr id="3" name="Content Placeholder 2">
-            <a:extLst>
-              <a:ext uri="{FF2B5EF4-FFF2-40B4-BE49-F238E27FC236}">
-                <a16:creationId xmlns:a16="http://schemas.microsoft.com/office/drawing/2014/main" id="{F2619B6D-1867-4860-9893-EE653B091F62}"/>
-              </a:ext>
-            </a:extLst>
-          </p:cNvPr>
-          <p:cNvSpPr>
-            <a:spLocks noGrp="1"/>
-          </p:cNvSpPr>
-          <p:nvPr>
-            <p:ph idx="1"/>
-          </p:nvPr>
-        </p:nvSpPr>
-        <p:spPr/>
-        <p:txBody>
-          <a:bodyPr/>
-          <a:lstStyle/>
-          <a:p>
-            <a:r>
-              <a:rPr lang="en-GB" dirty="0"/>
-              <a:t>There is not a large diversity </a:t>
-            </a:r>
-            <a:r>
-              <a:rPr lang="en-GB" dirty="0">
-                <a:highlight>
-                  <a:srgbClr val="00FF00"/>
-                </a:highlight>
-              </a:rPr>
-              <a:t>of nationality for </a:t>
-            </a:r>
-            <a:r>
-              <a:rPr lang="en-GB" dirty="0"/>
-              <a:t>those commemorated by plaques in London </a:t>
-            </a:r>
-            <a:r>
-              <a:rPr lang="en-GB" dirty="0">
-                <a:highlight>
-                  <a:srgbClr val="00FF00"/>
-                </a:highlight>
-              </a:rPr>
-              <a:t>(n from n were not white British)</a:t>
-            </a:r>
-          </a:p>
-          <a:p>
-            <a:r>
-              <a:rPr lang="en-GB" dirty="0"/>
-              <a:t>The bad actor scoring system does effectively filter down the number of possible candidates, reducing the time needed for a human to check those commemorated. </a:t>
-            </a:r>
-            <a:r>
-              <a:rPr lang="en-GB" dirty="0">
-                <a:highlight>
-                  <a:srgbClr val="00FF00"/>
-                </a:highlight>
-              </a:rPr>
-              <a:t>From x to y</a:t>
-            </a:r>
-          </a:p>
-          <a:p>
-            <a:r>
-              <a:rPr lang="en-GB" dirty="0"/>
-              <a:t>The scoring system still needs a human to validate the choices – often the links are more complicated e.g. money/slaves inherited from family which the </a:t>
-            </a:r>
-            <a:r>
-              <a:rPr lang="en-GB" dirty="0">
-                <a:highlight>
-                  <a:srgbClr val="00FF00"/>
-                </a:highlight>
-              </a:rPr>
-              <a:t>simply </a:t>
-            </a:r>
-            <a:r>
-              <a:rPr lang="en-GB" dirty="0"/>
-              <a:t>model cannot differentiate.</a:t>
-            </a:r>
-          </a:p>
-          <a:p>
-            <a:r>
-              <a:rPr lang="en-GB" dirty="0">
-                <a:highlight>
-                  <a:srgbClr val="00FF00"/>
-                </a:highlight>
-              </a:rPr>
-              <a:t>What did you learn</a:t>
-            </a:r>
-          </a:p>
-        </p:txBody>
-      </p:sp>
-    </p:spTree>
-    <p:extLst>
-      <p:ext uri="{BB962C8B-B14F-4D97-AF65-F5344CB8AC3E}">
-        <p14:creationId xmlns:p14="http://schemas.microsoft.com/office/powerpoint/2010/main" val="741771949"/>
-      </p:ext>
-    </p:extLst>
-  </p:cSld>
-  <p:clrMapOvr>
-    <a:masterClrMapping/>
-  </p:clrMapOvr>
-</p:sld>
-</file>
-
 <file path=ppt/slides/slide2.xml><?xml version="1.0" encoding="utf-8"?>
 <p:sld xmlns:a="http://schemas.openxmlformats.org/drawingml/2006/main" xmlns:r="http://schemas.openxmlformats.org/officeDocument/2006/relationships" xmlns:p="http://schemas.openxmlformats.org/presentationml/2006/main">
   <p:cSld>
@@ -5862,7 +5714,7 @@
           <p:cNvPr id="2" name="Title 1">
             <a:extLst>
               <a:ext uri="{FF2B5EF4-FFF2-40B4-BE49-F238E27FC236}">
-                <a16:creationId xmlns:a16="http://schemas.microsoft.com/office/drawing/2014/main" id="{F123CA23-2637-43B3-ADB0-A9CA025A70B7}"/>
+                <a16:creationId xmlns:a16="http://schemas.microsoft.com/office/drawing/2014/main" id="{7EB17A89-DB4F-4D8B-8DFE-14D86D0CD93F}"/>
               </a:ext>
             </a:extLst>
           </p:cNvPr>
@@ -5880,7 +5732,7 @@
           <a:p>
             <a:r>
               <a:rPr lang="en-GB" dirty="0"/>
-              <a:t>Contents</a:t>
+              <a:t>Introduction/why</a:t>
             </a:r>
           </a:p>
         </p:txBody>
@@ -5890,7 +5742,7 @@
           <p:cNvPr id="3" name="Content Placeholder 2">
             <a:extLst>
               <a:ext uri="{FF2B5EF4-FFF2-40B4-BE49-F238E27FC236}">
-                <a16:creationId xmlns:a16="http://schemas.microsoft.com/office/drawing/2014/main" id="{0823FA37-D6C7-473E-BA6A-899009E7C85C}"/>
+                <a16:creationId xmlns:a16="http://schemas.microsoft.com/office/drawing/2014/main" id="{257AABDC-3B4E-4FE2-BFA6-C1FEC02F2448}"/>
               </a:ext>
             </a:extLst>
           </p:cNvPr>
@@ -5901,55 +5753,167 @@
             <p:ph idx="1"/>
           </p:nvPr>
         </p:nvSpPr>
-        <p:spPr>
-          <a:xfrm>
-            <a:off x="1206501" y="1869600"/>
-            <a:ext cx="4127499" cy="3921600"/>
-          </a:xfrm>
-        </p:spPr>
+        <p:spPr/>
         <p:txBody>
           <a:bodyPr>
-            <a:normAutofit/>
+            <a:normAutofit fontScale="77500" lnSpcReduction="20000"/>
           </a:bodyPr>
           <a:lstStyle/>
           <a:p>
             <a:r>
-              <a:rPr lang="en-GB" sz="2400" dirty="0"/>
-              <a:t>Why</a:t>
-            </a:r>
-          </a:p>
-          <a:p>
-            <a:r>
-              <a:rPr lang="en-GB" sz="2400" dirty="0"/>
-              <a:t>Who + What</a:t>
-            </a:r>
-          </a:p>
-          <a:p>
-            <a:r>
-              <a:rPr lang="en-GB" sz="2400" dirty="0"/>
-              <a:t>Where</a:t>
-            </a:r>
-          </a:p>
-          <a:p>
-            <a:r>
-              <a:rPr lang="en-GB" sz="2400" dirty="0"/>
-              <a:t>When</a:t>
-            </a:r>
-          </a:p>
-          <a:p>
-            <a:r>
-              <a:rPr lang="en-GB" sz="2400" dirty="0"/>
-              <a:t>How</a:t>
-            </a:r>
+              <a:rPr lang="en-GB" dirty="0"/>
+              <a:t>The recent interest in the ‘Black </a:t>
+            </a:r>
+            <a:r>
+              <a:rPr lang="en-GB" dirty="0">
+                <a:highlight>
+                  <a:srgbClr val="00FF00"/>
+                </a:highlight>
+              </a:rPr>
+              <a:t>Lives </a:t>
+            </a:r>
+            <a:r>
+              <a:rPr lang="en-GB" dirty="0"/>
+              <a:t>Matter’ movement has led to the scrutiny of many public stat</a:t>
+            </a:r>
+            <a:r>
+              <a:rPr lang="en-GB" dirty="0">
+                <a:highlight>
+                  <a:srgbClr val="00FF00"/>
+                </a:highlight>
+              </a:rPr>
+              <a:t>ues </a:t>
+            </a:r>
+            <a:r>
+              <a:rPr lang="en-GB" dirty="0"/>
+              <a:t>and monuments as to whether the attributed person deserves to be kept up due to </a:t>
+            </a:r>
+            <a:r>
+              <a:rPr lang="en-GB" dirty="0">
+                <a:highlight>
+                  <a:srgbClr val="00FF00"/>
+                </a:highlight>
+              </a:rPr>
+              <a:t>their </a:t>
+            </a:r>
+            <a:r>
+              <a:rPr lang="en-GB" dirty="0"/>
+              <a:t>links to the slave trade and racism.</a:t>
+            </a:r>
+          </a:p>
+          <a:p>
+            <a:r>
+              <a:rPr lang="en-GB" dirty="0"/>
+              <a:t>Plaques are in the public domain and thus should also undergo the same scrutiny.</a:t>
+            </a:r>
+          </a:p>
+          <a:p>
+            <a:r>
+              <a:rPr lang="en-GB" dirty="0"/>
+              <a:t>It is also of interest to see the ethnic diversity of those commemorated on the plaques.</a:t>
+            </a:r>
+          </a:p>
+          <a:p>
+            <a:endParaRPr lang="en-GB" dirty="0"/>
+          </a:p>
+          <a:p>
+            <a:r>
+              <a:rPr lang="en-US" dirty="0"/>
+              <a:t>What are Open Plaques, how many, linked to a database which means can use coding and </a:t>
+            </a:r>
+            <a:r>
+              <a:rPr lang="en-US" dirty="0" err="1"/>
+              <a:t>xxxx</a:t>
+            </a:r>
+            <a:r>
+              <a:rPr lang="en-US" dirty="0"/>
+              <a:t> to </a:t>
+            </a:r>
+            <a:r>
+              <a:rPr lang="en-US" dirty="0" err="1"/>
+              <a:t>analyse</a:t>
+            </a:r>
+            <a:endParaRPr lang="en-US" dirty="0"/>
+          </a:p>
+          <a:p>
+            <a:r>
+              <a:rPr lang="en-US" dirty="0"/>
+              <a:t>Why did you do this – </a:t>
+            </a:r>
+            <a:r>
+              <a:rPr lang="en-US" dirty="0" err="1"/>
+              <a:t>i.e</a:t>
+            </a:r>
+            <a:r>
+              <a:rPr lang="en-US" dirty="0"/>
+              <a:t> coding </a:t>
+            </a:r>
+            <a:r>
+              <a:rPr lang="en-US" dirty="0" err="1"/>
+              <a:t>etc</a:t>
+            </a:r>
+            <a:endParaRPr lang="en-US" dirty="0"/>
+          </a:p>
+          <a:p>
+            <a:pPr lvl="1"/>
+            <a:r>
+              <a:rPr lang="en-US" dirty="0"/>
+              <a:t>Learn about workflow</a:t>
+            </a:r>
+          </a:p>
+          <a:p>
+            <a:pPr lvl="1"/>
+            <a:r>
+              <a:rPr lang="en-US" dirty="0"/>
+              <a:t>Learn about web scrapping</a:t>
+            </a:r>
+          </a:p>
+          <a:p>
+            <a:pPr lvl="1"/>
+            <a:r>
+              <a:rPr lang="en-US" dirty="0"/>
+              <a:t>Real world useful outcome</a:t>
+            </a:r>
+          </a:p>
+          <a:p>
+            <a:r>
+              <a:rPr lang="en-US" dirty="0"/>
+              <a:t>Who gave you the project, what do they do</a:t>
+            </a:r>
+          </a:p>
+          <a:p>
+            <a:pPr lvl="1"/>
+            <a:r>
+              <a:rPr lang="en-US" dirty="0"/>
+              <a:t>Open plaques – open source database documenting plaques</a:t>
+            </a:r>
+          </a:p>
+          <a:p>
+            <a:pPr lvl="1"/>
+            <a:r>
+              <a:rPr lang="en-US" dirty="0"/>
+              <a:t>Jez</a:t>
+            </a:r>
+          </a:p>
+          <a:p>
+            <a:r>
+              <a:rPr lang="en-US" dirty="0"/>
+              <a:t>Talk about the data you had </a:t>
+            </a:r>
+            <a:r>
+              <a:rPr lang="en-US"/>
+              <a:t>to use</a:t>
+            </a:r>
+            <a:endParaRPr lang="en-US" dirty="0"/>
           </a:p>
         </p:txBody>
       </p:sp>
       <p:pic>
         <p:nvPicPr>
-          <p:cNvPr id="1026" name="Picture 2">
+          <p:cNvPr id="4" name="Picture 2">
             <a:extLst>
               <a:ext uri="{FF2B5EF4-FFF2-40B4-BE49-F238E27FC236}">
-                <a16:creationId xmlns:a16="http://schemas.microsoft.com/office/drawing/2014/main" id="{8ED130F5-AA77-426A-86C4-B628A6622A71}"/>
+                <a16:creationId xmlns:a16="http://schemas.microsoft.com/office/drawing/2014/main" id="{C38AE75C-279C-4ABF-81D0-B65B02DAD117}"/>
               </a:ext>
             </a:extLst>
           </p:cNvPr>
@@ -5973,8 +5937,8 @@
         </p:blipFill>
         <p:spPr bwMode="auto">
           <a:xfrm>
-            <a:off x="4406900" y="1066800"/>
-            <a:ext cx="6096000" cy="4572000"/>
+            <a:off x="8559800" y="282574"/>
+            <a:ext cx="1752600" cy="1314450"/>
           </a:xfrm>
           <a:prstGeom prst="rect">
             <a:avLst/>
@@ -5994,7 +5958,7 @@
     </p:spTree>
     <p:extLst>
       <p:ext uri="{BB962C8B-B14F-4D97-AF65-F5344CB8AC3E}">
-        <p14:creationId xmlns:p14="http://schemas.microsoft.com/office/powerpoint/2010/main" val="3944932536"/>
+        <p14:creationId xmlns:p14="http://schemas.microsoft.com/office/powerpoint/2010/main" val="604038080"/>
       </p:ext>
     </p:extLst>
   </p:cSld>
@@ -6005,234 +5969,6 @@
 </file>
 
 <file path=ppt/slides/slide3.xml><?xml version="1.0" encoding="utf-8"?>
-<p:sld xmlns:a="http://schemas.openxmlformats.org/drawingml/2006/main" xmlns:r="http://schemas.openxmlformats.org/officeDocument/2006/relationships" xmlns:p="http://schemas.openxmlformats.org/presentationml/2006/main">
-  <p:cSld>
-    <p:spTree>
-      <p:nvGrpSpPr>
-        <p:cNvPr id="1" name=""/>
-        <p:cNvGrpSpPr/>
-        <p:nvPr/>
-      </p:nvGrpSpPr>
-      <p:grpSpPr>
-        <a:xfrm>
-          <a:off x="0" y="0"/>
-          <a:ext cx="0" cy="0"/>
-          <a:chOff x="0" y="0"/>
-          <a:chExt cx="0" cy="0"/>
-        </a:xfrm>
-      </p:grpSpPr>
-      <p:sp>
-        <p:nvSpPr>
-          <p:cNvPr id="2" name="Title 1">
-            <a:extLst>
-              <a:ext uri="{FF2B5EF4-FFF2-40B4-BE49-F238E27FC236}">
-                <a16:creationId xmlns:a16="http://schemas.microsoft.com/office/drawing/2014/main" id="{7EB17A89-DB4F-4D8B-8DFE-14D86D0CD93F}"/>
-              </a:ext>
-            </a:extLst>
-          </p:cNvPr>
-          <p:cNvSpPr>
-            <a:spLocks noGrp="1"/>
-          </p:cNvSpPr>
-          <p:nvPr>
-            <p:ph type="title"/>
-          </p:nvPr>
-        </p:nvSpPr>
-        <p:spPr/>
-        <p:txBody>
-          <a:bodyPr/>
-          <a:lstStyle/>
-          <a:p>
-            <a:r>
-              <a:rPr lang="en-GB" dirty="0"/>
-              <a:t>Why</a:t>
-            </a:r>
-          </a:p>
-        </p:txBody>
-      </p:sp>
-      <p:sp>
-        <p:nvSpPr>
-          <p:cNvPr id="3" name="Content Placeholder 2">
-            <a:extLst>
-              <a:ext uri="{FF2B5EF4-FFF2-40B4-BE49-F238E27FC236}">
-                <a16:creationId xmlns:a16="http://schemas.microsoft.com/office/drawing/2014/main" id="{257AABDC-3B4E-4FE2-BFA6-C1FEC02F2448}"/>
-              </a:ext>
-            </a:extLst>
-          </p:cNvPr>
-          <p:cNvSpPr>
-            <a:spLocks noGrp="1"/>
-          </p:cNvSpPr>
-          <p:nvPr>
-            <p:ph idx="1"/>
-          </p:nvPr>
-        </p:nvSpPr>
-        <p:spPr/>
-        <p:txBody>
-          <a:bodyPr>
-            <a:normAutofit fontScale="77500" lnSpcReduction="20000"/>
-          </a:bodyPr>
-          <a:lstStyle/>
-          <a:p>
-            <a:r>
-              <a:rPr lang="en-GB" dirty="0"/>
-              <a:t>The recent interest in the ‘Black </a:t>
-            </a:r>
-            <a:r>
-              <a:rPr lang="en-GB" dirty="0">
-                <a:highlight>
-                  <a:srgbClr val="00FF00"/>
-                </a:highlight>
-              </a:rPr>
-              <a:t>Lives </a:t>
-            </a:r>
-            <a:r>
-              <a:rPr lang="en-GB" dirty="0"/>
-              <a:t>Matter’ movement has led to the scrutiny of many public stat</a:t>
-            </a:r>
-            <a:r>
-              <a:rPr lang="en-GB" dirty="0">
-                <a:highlight>
-                  <a:srgbClr val="00FF00"/>
-                </a:highlight>
-              </a:rPr>
-              <a:t>ues </a:t>
-            </a:r>
-            <a:r>
-              <a:rPr lang="en-GB" dirty="0"/>
-              <a:t>and monuments as to whether the attributed person deserves to be kept up due to </a:t>
-            </a:r>
-            <a:r>
-              <a:rPr lang="en-GB" dirty="0">
-                <a:highlight>
-                  <a:srgbClr val="00FF00"/>
-                </a:highlight>
-              </a:rPr>
-              <a:t>their </a:t>
-            </a:r>
-            <a:r>
-              <a:rPr lang="en-GB" dirty="0"/>
-              <a:t>links to the slave trade and racism.</a:t>
-            </a:r>
-          </a:p>
-          <a:p>
-            <a:r>
-              <a:rPr lang="en-GB" dirty="0"/>
-              <a:t>Plaques are in the public domain and thus should also undergo the same scrutiny.</a:t>
-            </a:r>
-          </a:p>
-          <a:p>
-            <a:r>
-              <a:rPr lang="en-GB" dirty="0"/>
-              <a:t>It is also of interest to see the ethnic diversity of those commemorated on the plaques.</a:t>
-            </a:r>
-          </a:p>
-          <a:p>
-            <a:r>
-              <a:rPr lang="en-US" dirty="0"/>
-              <a:t>What are Open Plaques, how many, linked to a database which means can use coding and </a:t>
-            </a:r>
-            <a:r>
-              <a:rPr lang="en-US" dirty="0" err="1"/>
-              <a:t>xxxx</a:t>
-            </a:r>
-            <a:r>
-              <a:rPr lang="en-US" dirty="0"/>
-              <a:t> to </a:t>
-            </a:r>
-            <a:r>
-              <a:rPr lang="en-US" dirty="0" err="1"/>
-              <a:t>analyse</a:t>
-            </a:r>
-            <a:endParaRPr lang="en-US" dirty="0"/>
-          </a:p>
-          <a:p>
-            <a:r>
-              <a:rPr lang="en-US" dirty="0"/>
-              <a:t>Why did you do this – </a:t>
-            </a:r>
-            <a:r>
-              <a:rPr lang="en-US" dirty="0" err="1"/>
-              <a:t>i.e</a:t>
-            </a:r>
-            <a:r>
-              <a:rPr lang="en-US" dirty="0"/>
-              <a:t> coding </a:t>
-            </a:r>
-            <a:r>
-              <a:rPr lang="en-US" dirty="0" err="1"/>
-              <a:t>etc</a:t>
-            </a:r>
-            <a:endParaRPr lang="en-US" dirty="0"/>
-          </a:p>
-          <a:p>
-            <a:pPr lvl="1"/>
-            <a:r>
-              <a:rPr lang="en-US" dirty="0"/>
-              <a:t>Learn about workflow</a:t>
-            </a:r>
-          </a:p>
-          <a:p>
-            <a:pPr lvl="1"/>
-            <a:r>
-              <a:rPr lang="en-US" dirty="0"/>
-              <a:t>Learn about web scrapping</a:t>
-            </a:r>
-          </a:p>
-          <a:p>
-            <a:pPr lvl="1"/>
-            <a:r>
-              <a:rPr lang="en-US" dirty="0"/>
-              <a:t>Real world useful outcome</a:t>
-            </a:r>
-          </a:p>
-          <a:p>
-            <a:r>
-              <a:rPr lang="en-US" dirty="0"/>
-              <a:t>Who gave you the project, what do they do</a:t>
-            </a:r>
-          </a:p>
-          <a:p>
-            <a:pPr lvl="1"/>
-            <a:r>
-              <a:rPr lang="en-US" dirty="0"/>
-              <a:t>Open plaques – open source database documenting plaques</a:t>
-            </a:r>
-          </a:p>
-          <a:p>
-            <a:pPr lvl="1"/>
-            <a:r>
-              <a:rPr lang="en-US" dirty="0"/>
-              <a:t>Jez</a:t>
-            </a:r>
-          </a:p>
-          <a:p>
-            <a:r>
-              <a:rPr lang="en-US" dirty="0"/>
-              <a:t>Talk about the data you had to use</a:t>
-            </a:r>
-          </a:p>
-          <a:p>
-            <a:pPr lvl="1"/>
-            <a:r>
-              <a:rPr lang="en-US" dirty="0"/>
-              <a:t>s</a:t>
-            </a:r>
-          </a:p>
-        </p:txBody>
-      </p:sp>
-    </p:spTree>
-    <p:extLst>
-      <p:ext uri="{BB962C8B-B14F-4D97-AF65-F5344CB8AC3E}">
-        <p14:creationId xmlns:p14="http://schemas.microsoft.com/office/powerpoint/2010/main" val="604038080"/>
-      </p:ext>
-    </p:extLst>
-  </p:cSld>
-  <p:clrMapOvr>
-    <a:masterClrMapping/>
-  </p:clrMapOvr>
-</p:sld>
-</file>
-
-<file path=ppt/slides/slide4.xml><?xml version="1.0" encoding="utf-8"?>
 <p:sld xmlns:a="http://schemas.openxmlformats.org/drawingml/2006/main" xmlns:r="http://schemas.openxmlformats.org/officeDocument/2006/relationships" xmlns:p="http://schemas.openxmlformats.org/presentationml/2006/main">
   <p:cSld>
     <p:spTree>
@@ -6440,7 +6176,7 @@
 </p:sld>
 </file>
 
-<file path=ppt/slides/slide5.xml><?xml version="1.0" encoding="utf-8"?>
+<file path=ppt/slides/slide4.xml><?xml version="1.0" encoding="utf-8"?>
 <p:sld xmlns:a="http://schemas.openxmlformats.org/drawingml/2006/main" xmlns:r="http://schemas.openxmlformats.org/officeDocument/2006/relationships" xmlns:p="http://schemas.openxmlformats.org/presentationml/2006/main">
   <p:cSld>
     <p:spTree>
@@ -6620,7 +6356,7 @@
 </p:sld>
 </file>
 
-<file path=ppt/slides/slide6.xml><?xml version="1.0" encoding="utf-8"?>
+<file path=ppt/slides/slide5.xml><?xml version="1.0" encoding="utf-8"?>
 <p:sld xmlns:a="http://schemas.openxmlformats.org/drawingml/2006/main" xmlns:r="http://schemas.openxmlformats.org/officeDocument/2006/relationships" xmlns:p="http://schemas.openxmlformats.org/presentationml/2006/main">
   <p:cSld>
     <p:spTree>
@@ -6898,6 +6634,145 @@
 </p:sld>
 </file>
 
+<file path=ppt/slides/slide6.xml><?xml version="1.0" encoding="utf-8"?>
+<p:sld xmlns:a="http://schemas.openxmlformats.org/drawingml/2006/main" xmlns:r="http://schemas.openxmlformats.org/officeDocument/2006/relationships" xmlns:p="http://schemas.openxmlformats.org/presentationml/2006/main">
+  <p:cSld>
+    <p:spTree>
+      <p:nvGrpSpPr>
+        <p:cNvPr id="1" name=""/>
+        <p:cNvGrpSpPr/>
+        <p:nvPr/>
+      </p:nvGrpSpPr>
+      <p:grpSpPr>
+        <a:xfrm>
+          <a:off x="0" y="0"/>
+          <a:ext cx="0" cy="0"/>
+          <a:chOff x="0" y="0"/>
+          <a:chExt cx="0" cy="0"/>
+        </a:xfrm>
+      </p:grpSpPr>
+      <p:sp>
+        <p:nvSpPr>
+          <p:cNvPr id="2" name="Title 1">
+            <a:extLst>
+              <a:ext uri="{FF2B5EF4-FFF2-40B4-BE49-F238E27FC236}">
+                <a16:creationId xmlns:a16="http://schemas.microsoft.com/office/drawing/2014/main" id="{C0274CF3-D2F5-4319-AC4C-7E33DBCD5888}"/>
+              </a:ext>
+            </a:extLst>
+          </p:cNvPr>
+          <p:cNvSpPr>
+            <a:spLocks noGrp="1"/>
+          </p:cNvSpPr>
+          <p:nvPr>
+            <p:ph type="title"/>
+          </p:nvPr>
+        </p:nvSpPr>
+        <p:spPr/>
+        <p:txBody>
+          <a:bodyPr/>
+          <a:lstStyle/>
+          <a:p>
+            <a:r>
+              <a:rPr lang="en-GB" dirty="0"/>
+              <a:t>How – individuals with links to the slave trade</a:t>
+            </a:r>
+          </a:p>
+        </p:txBody>
+      </p:sp>
+      <p:sp>
+        <p:nvSpPr>
+          <p:cNvPr id="3" name="Content Placeholder 2">
+            <a:extLst>
+              <a:ext uri="{FF2B5EF4-FFF2-40B4-BE49-F238E27FC236}">
+                <a16:creationId xmlns:a16="http://schemas.microsoft.com/office/drawing/2014/main" id="{A461D00C-DD94-43C2-B1B9-7571434046AC}"/>
+              </a:ext>
+            </a:extLst>
+          </p:cNvPr>
+          <p:cNvSpPr>
+            <a:spLocks noGrp="1"/>
+          </p:cNvSpPr>
+          <p:nvPr>
+            <p:ph idx="1"/>
+          </p:nvPr>
+        </p:nvSpPr>
+        <p:spPr/>
+        <p:txBody>
+          <a:bodyPr>
+            <a:normAutofit/>
+          </a:bodyPr>
+          <a:lstStyle/>
+          <a:p>
+            <a:r>
+              <a:rPr lang="en-GB" dirty="0"/>
+              <a:t>To identify bad actors I made a scoring system, </a:t>
+            </a:r>
+            <a:r>
+              <a:rPr lang="en-GB" dirty="0">
+                <a:highlight>
+                  <a:srgbClr val="00FF00"/>
+                </a:highlight>
+              </a:rPr>
+              <a:t>using python, </a:t>
+            </a:r>
+            <a:r>
+              <a:rPr lang="en-GB" dirty="0"/>
+              <a:t>taking into account the following:</a:t>
+            </a:r>
+          </a:p>
+          <a:p>
+            <a:pPr lvl="1"/>
+            <a:r>
+              <a:rPr lang="en-GB"/>
+              <a:t> </a:t>
+            </a:r>
+            <a:endParaRPr lang="en-GB" dirty="0"/>
+          </a:p>
+          <a:p>
+            <a:r>
+              <a:rPr lang="en-GB" dirty="0"/>
+              <a:t>The above criteria gave both positive and negative scores (higher the score the worse). </a:t>
+            </a:r>
+            <a:r>
+              <a:rPr lang="en-GB" dirty="0">
+                <a:highlight>
+                  <a:srgbClr val="00FF00"/>
+                </a:highlight>
+              </a:rPr>
+              <a:t>List scores and formula? I thought you included plantation etc, Didn’t you analyse the known slave owners to pick up key words</a:t>
+            </a:r>
+          </a:p>
+          <a:p>
+            <a:r>
+              <a:rPr lang="en-GB" dirty="0"/>
+              <a:t>Words such as ‘poet’/’author’/’composer’ appearing on the Wikipedia pages reduced the score, assuming the correlation that most poets/writers/… were against slavery.</a:t>
+            </a:r>
+          </a:p>
+          <a:p>
+            <a:pPr lvl="1"/>
+            <a:r>
+              <a:rPr lang="en-GB" dirty="0">
+                <a:highlight>
+                  <a:srgbClr val="00FF00"/>
+                </a:highlight>
+              </a:rPr>
+              <a:t>How did to test this, how did you pick the words Mention Hodge in a funny slide and problems</a:t>
+            </a:r>
+          </a:p>
+        </p:txBody>
+      </p:sp>
+    </p:spTree>
+    <p:extLst>
+      <p:ext uri="{BB962C8B-B14F-4D97-AF65-F5344CB8AC3E}">
+        <p14:creationId xmlns:p14="http://schemas.microsoft.com/office/powerpoint/2010/main" val="3328646044"/>
+      </p:ext>
+    </p:extLst>
+  </p:cSld>
+  <p:clrMapOvr>
+    <a:masterClrMapping/>
+  </p:clrMapOvr>
+</p:sld>
+</file>
+
 <file path=ppt/slides/slide7.xml><?xml version="1.0" encoding="utf-8"?>
 <p:sld xmlns:a="http://schemas.openxmlformats.org/drawingml/2006/main" xmlns:r="http://schemas.openxmlformats.org/officeDocument/2006/relationships" xmlns:p="http://schemas.openxmlformats.org/presentationml/2006/main">
   <p:cSld>
@@ -6920,7 +6795,7 @@
           <p:cNvPr id="2" name="Title 1">
             <a:extLst>
               <a:ext uri="{FF2B5EF4-FFF2-40B4-BE49-F238E27FC236}">
-                <a16:creationId xmlns:a16="http://schemas.microsoft.com/office/drawing/2014/main" id="{C0274CF3-D2F5-4319-AC4C-7E33DBCD5888}"/>
+                <a16:creationId xmlns:a16="http://schemas.microsoft.com/office/drawing/2014/main" id="{5CDED59E-F0AE-43CB-8CC9-723917652411}"/>
               </a:ext>
             </a:extLst>
           </p:cNvPr>
@@ -6928,7 +6803,7 @@
             <a:spLocks noGrp="1"/>
           </p:cNvSpPr>
           <p:nvPr>
-            <p:ph type="title"/>
+            <p:ph type="ctrTitle"/>
           </p:nvPr>
         </p:nvSpPr>
         <p:spPr/>
@@ -6936,19 +6811,16 @@
           <a:bodyPr/>
           <a:lstStyle/>
           <a:p>
-            <a:r>
-              <a:rPr lang="en-GB" dirty="0"/>
-              <a:t>How – individuals with links to the slave trade</a:t>
-            </a:r>
-          </a:p>
-        </p:txBody>
-      </p:sp>
-      <p:sp>
-        <p:nvSpPr>
-          <p:cNvPr id="3" name="Content Placeholder 2">
+            <a:endParaRPr lang="en-GB"/>
+          </a:p>
+        </p:txBody>
+      </p:sp>
+      <p:sp>
+        <p:nvSpPr>
+          <p:cNvPr id="3" name="Subtitle 2">
             <a:extLst>
               <a:ext uri="{FF2B5EF4-FFF2-40B4-BE49-F238E27FC236}">
-                <a16:creationId xmlns:a16="http://schemas.microsoft.com/office/drawing/2014/main" id="{A461D00C-DD94-43C2-B1B9-7571434046AC}"/>
+                <a16:creationId xmlns:a16="http://schemas.microsoft.com/office/drawing/2014/main" id="{E311F9D6-07A3-425B-AE76-D8975E31BF34}"/>
               </a:ext>
             </a:extLst>
           </p:cNvPr>
@@ -6956,118 +6828,22 @@
             <a:spLocks noGrp="1"/>
           </p:cNvSpPr>
           <p:nvPr>
-            <p:ph idx="1"/>
+            <p:ph type="subTitle" idx="1"/>
           </p:nvPr>
         </p:nvSpPr>
         <p:spPr/>
         <p:txBody>
-          <a:bodyPr>
-            <a:normAutofit lnSpcReduction="10000"/>
-          </a:bodyPr>
+          <a:bodyPr/>
           <a:lstStyle/>
           <a:p>
-            <a:r>
-              <a:rPr lang="en-GB" dirty="0"/>
-              <a:t>To identify bad actors I made a scoring system, </a:t>
-            </a:r>
-            <a:r>
-              <a:rPr lang="en-GB" dirty="0">
-                <a:highlight>
-                  <a:srgbClr val="00FF00"/>
-                </a:highlight>
-              </a:rPr>
-              <a:t>using python, </a:t>
-            </a:r>
-            <a:r>
-              <a:rPr lang="en-GB" dirty="0"/>
-              <a:t>taking into account the following:</a:t>
-            </a:r>
-          </a:p>
-          <a:p>
-            <a:pPr lvl="1"/>
-            <a:r>
-              <a:rPr lang="en-GB" dirty="0"/>
-              <a:t>The presence of certain words on their Wikipedia pages </a:t>
-            </a:r>
-            <a:r>
-              <a:rPr lang="en-GB" dirty="0">
-                <a:highlight>
-                  <a:srgbClr val="00FF00"/>
-                </a:highlight>
-              </a:rPr>
-              <a:t>list</a:t>
-            </a:r>
-          </a:p>
-          <a:p>
-            <a:pPr lvl="1"/>
-            <a:r>
-              <a:rPr lang="en-GB" dirty="0"/>
-              <a:t>Whether they appear on the slave owner list on Wikipedia or </a:t>
-            </a:r>
-            <a:r>
-              <a:rPr lang="en-GB" dirty="0" err="1"/>
-              <a:t>Wikidata</a:t>
-            </a:r>
-            <a:endParaRPr lang="en-GB" dirty="0"/>
-          </a:p>
-          <a:p>
-            <a:pPr lvl="1"/>
-            <a:r>
-              <a:rPr lang="en-GB" dirty="0"/>
-              <a:t>Whether they appear on the abolitionist list on Wikipedia</a:t>
-            </a:r>
-          </a:p>
-          <a:p>
-            <a:pPr lvl="1"/>
-            <a:r>
-              <a:rPr lang="en-GB" dirty="0"/>
-              <a:t>Ethnicity</a:t>
-            </a:r>
-          </a:p>
-          <a:p>
-            <a:pPr lvl="1"/>
-            <a:r>
-              <a:rPr lang="en-GB" dirty="0"/>
-              <a:t>Birth period</a:t>
-            </a:r>
-          </a:p>
-          <a:p>
-            <a:r>
-              <a:rPr lang="en-GB" dirty="0"/>
-              <a:t>The above criteria gave both positive and negative scores (higher the score the worse). </a:t>
-            </a:r>
-            <a:r>
-              <a:rPr lang="en-GB" dirty="0">
-                <a:highlight>
-                  <a:srgbClr val="00FF00"/>
-                </a:highlight>
-              </a:rPr>
-              <a:t>List scores and formula? I thought you included plantation etc, Didn’t you analyse the known slave owners to pick up key words</a:t>
-            </a:r>
-          </a:p>
-          <a:p>
-            <a:r>
-              <a:rPr lang="en-GB" dirty="0"/>
-              <a:t>Words such as ‘poet’/’author’/’composer’ appearing on the Wikipedia pages reduced the score, assuming the correlation that most poets/writers/… were against slavery.</a:t>
-            </a:r>
-          </a:p>
-          <a:p>
-            <a:pPr lvl="1"/>
-            <a:r>
-              <a:rPr lang="en-GB" dirty="0">
-                <a:highlight>
-                  <a:srgbClr val="00FF00"/>
-                </a:highlight>
-              </a:rPr>
-              <a:t>How did to test this, how did you pick the words Mention Hodge in a funny slide and problems</a:t>
-            </a:r>
+            <a:endParaRPr lang="en-GB"/>
           </a:p>
         </p:txBody>
       </p:sp>
     </p:spTree>
     <p:extLst>
       <p:ext uri="{BB962C8B-B14F-4D97-AF65-F5344CB8AC3E}">
-        <p14:creationId xmlns:p14="http://schemas.microsoft.com/office/powerpoint/2010/main" val="3328646044"/>
+        <p14:creationId xmlns:p14="http://schemas.microsoft.com/office/powerpoint/2010/main" val="829031331"/>
       </p:ext>
     </p:extLst>
   </p:cSld>
@@ -7099,7 +6875,7 @@
           <p:cNvPr id="2" name="Title 1">
             <a:extLst>
               <a:ext uri="{FF2B5EF4-FFF2-40B4-BE49-F238E27FC236}">
-                <a16:creationId xmlns:a16="http://schemas.microsoft.com/office/drawing/2014/main" id="{5CDED59E-F0AE-43CB-8CC9-723917652411}"/>
+                <a16:creationId xmlns:a16="http://schemas.microsoft.com/office/drawing/2014/main" id="{EE3D967C-B230-48CC-8F84-7CDBF7898431}"/>
               </a:ext>
             </a:extLst>
           </p:cNvPr>
@@ -7107,7 +6883,7 @@
             <a:spLocks noGrp="1"/>
           </p:cNvSpPr>
           <p:nvPr>
-            <p:ph type="ctrTitle"/>
+            <p:ph type="title"/>
           </p:nvPr>
         </p:nvSpPr>
         <p:spPr/>
@@ -7115,16 +6891,19 @@
           <a:bodyPr/>
           <a:lstStyle/>
           <a:p>
-            <a:endParaRPr lang="en-GB"/>
-          </a:p>
-        </p:txBody>
-      </p:sp>
-      <p:sp>
-        <p:nvSpPr>
-          <p:cNvPr id="3" name="Subtitle 2">
+            <a:r>
+              <a:rPr lang="en-GB" dirty="0"/>
+              <a:t>How – individuals with links to the slave trade</a:t>
+            </a:r>
+          </a:p>
+        </p:txBody>
+      </p:sp>
+      <p:sp>
+        <p:nvSpPr>
+          <p:cNvPr id="3" name="Content Placeholder 2">
             <a:extLst>
               <a:ext uri="{FF2B5EF4-FFF2-40B4-BE49-F238E27FC236}">
-                <a16:creationId xmlns:a16="http://schemas.microsoft.com/office/drawing/2014/main" id="{E311F9D6-07A3-425B-AE76-D8975E31BF34}"/>
+                <a16:creationId xmlns:a16="http://schemas.microsoft.com/office/drawing/2014/main" id="{6487CF09-47FB-43BD-9B8F-F3F4BC98C3D9}"/>
               </a:ext>
             </a:extLst>
           </p:cNvPr>
@@ -7132,22 +6911,261 @@
             <a:spLocks noGrp="1"/>
           </p:cNvSpPr>
           <p:nvPr>
-            <p:ph type="subTitle" idx="1"/>
-          </p:nvPr>
-        </p:nvSpPr>
-        <p:spPr/>
-        <p:txBody>
-          <a:bodyPr/>
+            <p:ph idx="1"/>
+          </p:nvPr>
+        </p:nvSpPr>
+        <p:spPr>
+          <a:xfrm>
+            <a:off x="685801" y="1869601"/>
+            <a:ext cx="10134599" cy="3921600"/>
+          </a:xfrm>
+        </p:spPr>
+        <p:txBody>
+          <a:bodyPr>
+            <a:normAutofit fontScale="92500" lnSpcReduction="10000"/>
+          </a:bodyPr>
           <a:lstStyle/>
           <a:p>
-            <a:endParaRPr lang="en-GB"/>
+            <a:r>
+              <a:rPr lang="en-GB" dirty="0"/>
+              <a:t>The results from this test finding those with the highest chance to links with slavery follow: </a:t>
+            </a:r>
+            <a:r>
+              <a:rPr lang="en-GB" dirty="0">
+                <a:highlight>
+                  <a:srgbClr val="00FF00"/>
+                </a:highlight>
+              </a:rPr>
+              <a:t>add scores to list, why did you cut off here, total from how many?, range in scores, how did you check</a:t>
+            </a:r>
+          </a:p>
+          <a:p>
+            <a:pPr marL="457200" lvl="1" indent="0">
+              <a:buNone/>
+            </a:pPr>
+            <a:r>
+              <a:rPr lang="en-GB" dirty="0">
+                <a:highlight>
+                  <a:srgbClr val="700000"/>
+                </a:highlight>
+              </a:rPr>
+              <a:t>Robert Milligan</a:t>
+            </a:r>
+            <a:br>
+              <a:rPr lang="en-GB" dirty="0"/>
+            </a:br>
+            <a:r>
+              <a:rPr lang="en-GB" dirty="0"/>
+              <a:t>William Ewart Gladstone</a:t>
+            </a:r>
+            <a:br>
+              <a:rPr lang="en-GB" dirty="0"/>
+            </a:br>
+            <a:r>
+              <a:rPr lang="en-GB" dirty="0">
+                <a:highlight>
+                  <a:srgbClr val="700000"/>
+                </a:highlight>
+              </a:rPr>
+              <a:t>Admiral Sir Edward Codrington RN GCB FRS</a:t>
+            </a:r>
+            <a:br>
+              <a:rPr lang="en-GB" dirty="0"/>
+            </a:br>
+            <a:r>
+              <a:rPr lang="en-GB" dirty="0">
+                <a:highlight>
+                  <a:srgbClr val="700000"/>
+                </a:highlight>
+              </a:rPr>
+              <a:t>Simón Bolívar</a:t>
+            </a:r>
+            <a:br>
+              <a:rPr lang="en-GB" dirty="0"/>
+            </a:br>
+            <a:r>
+              <a:rPr lang="en-GB" dirty="0">
+                <a:highlight>
+                  <a:srgbClr val="700000"/>
+                </a:highlight>
+              </a:rPr>
+              <a:t>John Gladstone FRSE</a:t>
+            </a:r>
+            <a:br>
+              <a:rPr lang="en-GB" dirty="0"/>
+            </a:br>
+            <a:r>
+              <a:rPr lang="en-GB" dirty="0"/>
+              <a:t>Quintin Hogg</a:t>
+            </a:r>
+            <a:br>
+              <a:rPr lang="en-GB" dirty="0"/>
+            </a:br>
+            <a:r>
+              <a:rPr lang="en-GB" dirty="0">
+                <a:highlight>
+                  <a:srgbClr val="700000"/>
+                </a:highlight>
+              </a:rPr>
+              <a:t>George Whitefield</a:t>
+            </a:r>
+            <a:br>
+              <a:rPr lang="en-GB" dirty="0"/>
+            </a:br>
+            <a:r>
+              <a:rPr lang="en-GB" dirty="0"/>
+              <a:t>Richard Cobden</a:t>
+            </a:r>
+            <a:br>
+              <a:rPr lang="en-GB" dirty="0"/>
+            </a:br>
+            <a:r>
+              <a:rPr lang="en-GB" dirty="0"/>
+              <a:t>Dr James Wilson</a:t>
+            </a:r>
+            <a:br>
+              <a:rPr lang="en-GB" dirty="0"/>
+            </a:br>
+            <a:r>
+              <a:rPr lang="en-GB" dirty="0"/>
+              <a:t>William Murray, 1st Earl of Mansfield</a:t>
+            </a:r>
+            <a:br>
+              <a:rPr lang="en-GB" dirty="0"/>
+            </a:br>
+            <a:r>
+              <a:rPr lang="en-GB" dirty="0"/>
+              <a:t>John Graves Simcoe</a:t>
+            </a:r>
+            <a:br>
+              <a:rPr lang="en-GB" dirty="0"/>
+            </a:br>
+            <a:r>
+              <a:rPr lang="en-GB" dirty="0">
+                <a:highlight>
+                  <a:srgbClr val="700000"/>
+                </a:highlight>
+              </a:rPr>
+              <a:t>Thomas Drayton</a:t>
+            </a:r>
+            <a:br>
+              <a:rPr lang="en-GB" dirty="0"/>
+            </a:br>
+            <a:r>
+              <a:rPr lang="en-GB" dirty="0"/>
+              <a:t>Sir Lt Gen Thomas </a:t>
+            </a:r>
+            <a:r>
+              <a:rPr lang="en-GB" dirty="0" err="1"/>
+              <a:t>Picton</a:t>
+            </a:r>
+            <a:r>
+              <a:rPr lang="en-GB" dirty="0"/>
+              <a:t> GCB</a:t>
+            </a:r>
+            <a:br>
+              <a:rPr lang="en-GB" dirty="0"/>
+            </a:br>
+            <a:r>
+              <a:rPr lang="en-GB" dirty="0">
+                <a:highlight>
+                  <a:srgbClr val="700000"/>
+                </a:highlight>
+              </a:rPr>
+              <a:t>Sir Francis Drake</a:t>
+            </a:r>
+            <a:br>
+              <a:rPr lang="en-GB" dirty="0"/>
+            </a:br>
+            <a:r>
+              <a:rPr lang="en-GB" dirty="0"/>
+              <a:t>John Hancock</a:t>
+            </a:r>
+          </a:p>
+        </p:txBody>
+      </p:sp>
+      <p:sp>
+        <p:nvSpPr>
+          <p:cNvPr id="4" name="TextBox 3">
+            <a:extLst>
+              <a:ext uri="{FF2B5EF4-FFF2-40B4-BE49-F238E27FC236}">
+                <a16:creationId xmlns:a16="http://schemas.microsoft.com/office/drawing/2014/main" id="{514B3DE0-8D04-46D1-936F-661F37E9A81F}"/>
+              </a:ext>
+            </a:extLst>
+          </p:cNvPr>
+          <p:cNvSpPr txBox="1"/>
+          <p:nvPr/>
+        </p:nvSpPr>
+        <p:spPr>
+          <a:xfrm>
+            <a:off x="6096000" y="3118188"/>
+            <a:ext cx="4394200" cy="2031325"/>
+          </a:xfrm>
+          <a:prstGeom prst="rect">
+            <a:avLst/>
+          </a:prstGeom>
+          <a:noFill/>
+        </p:spPr>
+        <p:txBody>
+          <a:bodyPr wrap="square" rtlCol="0">
+            <a:spAutoFit/>
+          </a:bodyPr>
+          <a:lstStyle/>
+          <a:p>
+            <a:r>
+              <a:rPr lang="en-GB" dirty="0"/>
+              <a:t>Key:</a:t>
+            </a:r>
+          </a:p>
+          <a:p>
+            <a:r>
+              <a:rPr lang="en-GB" dirty="0"/>
+              <a:t>	</a:t>
+            </a:r>
+            <a:r>
+              <a:rPr lang="en-GB" dirty="0">
+                <a:highlight>
+                  <a:srgbClr val="700000"/>
+                </a:highlight>
+              </a:rPr>
+              <a:t>Slave trader/owned slaves</a:t>
+            </a:r>
+          </a:p>
+          <a:p>
+            <a:endParaRPr lang="en-GB" dirty="0"/>
+          </a:p>
+          <a:p>
+            <a:r>
+              <a:rPr lang="en-GB" dirty="0"/>
+              <a:t> </a:t>
+            </a:r>
+            <a:r>
+              <a:rPr lang="en-GB" dirty="0">
+                <a:highlight>
+                  <a:srgbClr val="00FF00"/>
+                </a:highlight>
+              </a:rPr>
+              <a:t>That is not to say that the other names certainly deserve a place but they are not </a:t>
+            </a:r>
+            <a:r>
+              <a:rPr lang="en-GB" dirty="0"/>
+              <a:t>slave traders/owners from the Wikipedia search I conducted. </a:t>
+            </a:r>
+            <a:r>
+              <a:rPr lang="en-GB" dirty="0">
+                <a:highlight>
+                  <a:srgbClr val="00FF00"/>
+                </a:highlight>
+              </a:rPr>
+              <a:t>Explain/reword</a:t>
+            </a:r>
           </a:p>
         </p:txBody>
       </p:sp>
     </p:spTree>
     <p:extLst>
       <p:ext uri="{BB962C8B-B14F-4D97-AF65-F5344CB8AC3E}">
-        <p14:creationId xmlns:p14="http://schemas.microsoft.com/office/powerpoint/2010/main" val="829031331"/>
+        <p14:creationId xmlns:p14="http://schemas.microsoft.com/office/powerpoint/2010/main" val="2964064638"/>
       </p:ext>
     </p:extLst>
   </p:cSld>
@@ -7179,7 +7197,7 @@
           <p:cNvPr id="2" name="Title 1">
             <a:extLst>
               <a:ext uri="{FF2B5EF4-FFF2-40B4-BE49-F238E27FC236}">
-                <a16:creationId xmlns:a16="http://schemas.microsoft.com/office/drawing/2014/main" id="{EE3D967C-B230-48CC-8F84-7CDBF7898431}"/>
+                <a16:creationId xmlns:a16="http://schemas.microsoft.com/office/drawing/2014/main" id="{714C7195-C384-49F5-A35D-E7A85AA14257}"/>
               </a:ext>
             </a:extLst>
           </p:cNvPr>
@@ -7197,7 +7215,7 @@
           <a:p>
             <a:r>
               <a:rPr lang="en-GB" dirty="0"/>
-              <a:t>How – individuals with links to the slave trade</a:t>
+              <a:t>Conclusion</a:t>
             </a:r>
           </a:p>
         </p:txBody>
@@ -7207,7 +7225,7 @@
           <p:cNvPr id="3" name="Content Placeholder 2">
             <a:extLst>
               <a:ext uri="{FF2B5EF4-FFF2-40B4-BE49-F238E27FC236}">
-                <a16:creationId xmlns:a16="http://schemas.microsoft.com/office/drawing/2014/main" id="{6487CF09-47FB-43BD-9B8F-F3F4BC98C3D9}"/>
+                <a16:creationId xmlns:a16="http://schemas.microsoft.com/office/drawing/2014/main" id="{F2619B6D-1867-4860-9893-EE653B091F62}"/>
               </a:ext>
             </a:extLst>
           </p:cNvPr>
@@ -7218,21 +7236,14 @@
             <p:ph idx="1"/>
           </p:nvPr>
         </p:nvSpPr>
-        <p:spPr>
-          <a:xfrm>
-            <a:off x="685801" y="1869601"/>
-            <a:ext cx="10134599" cy="3921600"/>
-          </a:xfrm>
-        </p:spPr>
-        <p:txBody>
-          <a:bodyPr>
-            <a:normAutofit fontScale="92500" lnSpcReduction="10000"/>
-          </a:bodyPr>
+        <p:spPr/>
+        <p:txBody>
+          <a:bodyPr/>
           <a:lstStyle/>
           <a:p>
             <a:r>
               <a:rPr lang="en-GB" dirty="0"/>
-              <a:t>The results from this test finding those with the highest chance to links with slavery follow: </a:t>
+              <a:t>There is not a large diversity </a:t>
             </a:r>
             <a:r>
               <a:rPr lang="en-GB" dirty="0">
@@ -7240,208 +7251,11 @@
                   <a:srgbClr val="00FF00"/>
                 </a:highlight>
               </a:rPr>
-              <a:t>add scores to list, why did you cut off here, total from how many?, range in scores, how did you check</a:t>
-            </a:r>
-          </a:p>
-          <a:p>
-            <a:pPr marL="457200" lvl="1" indent="0">
-              <a:buNone/>
-            </a:pPr>
-            <a:r>
-              <a:rPr lang="en-GB" dirty="0">
-                <a:highlight>
-                  <a:srgbClr val="700000"/>
-                </a:highlight>
-              </a:rPr>
-              <a:t>Robert Milligan</a:t>
-            </a:r>
-            <a:br>
+              <a:t>of nationality for </a:t>
+            </a:r>
+            <a:r>
               <a:rPr lang="en-GB" dirty="0"/>
-            </a:br>
-            <a:r>
-              <a:rPr lang="en-GB" dirty="0"/>
-              <a:t>William Ewart Gladstone</a:t>
-            </a:r>
-            <a:br>
-              <a:rPr lang="en-GB" dirty="0"/>
-            </a:br>
-            <a:r>
-              <a:rPr lang="en-GB" dirty="0">
-                <a:highlight>
-                  <a:srgbClr val="700000"/>
-                </a:highlight>
-              </a:rPr>
-              <a:t>Admiral Sir Edward Codrington RN GCB FRS</a:t>
-            </a:r>
-            <a:br>
-              <a:rPr lang="en-GB" dirty="0"/>
-            </a:br>
-            <a:r>
-              <a:rPr lang="en-GB" dirty="0">
-                <a:highlight>
-                  <a:srgbClr val="700000"/>
-                </a:highlight>
-              </a:rPr>
-              <a:t>Simón Bolívar</a:t>
-            </a:r>
-            <a:br>
-              <a:rPr lang="en-GB" dirty="0"/>
-            </a:br>
-            <a:r>
-              <a:rPr lang="en-GB" dirty="0">
-                <a:highlight>
-                  <a:srgbClr val="700000"/>
-                </a:highlight>
-              </a:rPr>
-              <a:t>John Gladstone FRSE</a:t>
-            </a:r>
-            <a:br>
-              <a:rPr lang="en-GB" dirty="0"/>
-            </a:br>
-            <a:r>
-              <a:rPr lang="en-GB" dirty="0"/>
-              <a:t>Quintin Hogg</a:t>
-            </a:r>
-            <a:br>
-              <a:rPr lang="en-GB" dirty="0"/>
-            </a:br>
-            <a:r>
-              <a:rPr lang="en-GB" dirty="0">
-                <a:highlight>
-                  <a:srgbClr val="700000"/>
-                </a:highlight>
-              </a:rPr>
-              <a:t>George Whitefield</a:t>
-            </a:r>
-            <a:br>
-              <a:rPr lang="en-GB" dirty="0"/>
-            </a:br>
-            <a:r>
-              <a:rPr lang="en-GB" dirty="0"/>
-              <a:t>Richard Cobden</a:t>
-            </a:r>
-            <a:br>
-              <a:rPr lang="en-GB" dirty="0"/>
-            </a:br>
-            <a:r>
-              <a:rPr lang="en-GB" dirty="0"/>
-              <a:t>Dr James Wilson</a:t>
-            </a:r>
-            <a:br>
-              <a:rPr lang="en-GB" dirty="0"/>
-            </a:br>
-            <a:r>
-              <a:rPr lang="en-GB" dirty="0"/>
-              <a:t>William Murray, 1st Earl of Mansfield</a:t>
-            </a:r>
-            <a:br>
-              <a:rPr lang="en-GB" dirty="0"/>
-            </a:br>
-            <a:r>
-              <a:rPr lang="en-GB" dirty="0"/>
-              <a:t>John Graves Simcoe</a:t>
-            </a:r>
-            <a:br>
-              <a:rPr lang="en-GB" dirty="0"/>
-            </a:br>
-            <a:r>
-              <a:rPr lang="en-GB" dirty="0">
-                <a:highlight>
-                  <a:srgbClr val="700000"/>
-                </a:highlight>
-              </a:rPr>
-              <a:t>Thomas Drayton</a:t>
-            </a:r>
-            <a:br>
-              <a:rPr lang="en-GB" dirty="0"/>
-            </a:br>
-            <a:r>
-              <a:rPr lang="en-GB" dirty="0"/>
-              <a:t>Sir Lt Gen Thomas </a:t>
-            </a:r>
-            <a:r>
-              <a:rPr lang="en-GB" dirty="0" err="1"/>
-              <a:t>Picton</a:t>
-            </a:r>
-            <a:r>
-              <a:rPr lang="en-GB" dirty="0"/>
-              <a:t> GCB</a:t>
-            </a:r>
-            <a:br>
-              <a:rPr lang="en-GB" dirty="0"/>
-            </a:br>
-            <a:r>
-              <a:rPr lang="en-GB" dirty="0">
-                <a:highlight>
-                  <a:srgbClr val="700000"/>
-                </a:highlight>
-              </a:rPr>
-              <a:t>Sir Francis Drake</a:t>
-            </a:r>
-            <a:br>
-              <a:rPr lang="en-GB" dirty="0"/>
-            </a:br>
-            <a:r>
-              <a:rPr lang="en-GB" dirty="0"/>
-              <a:t>John Hancock</a:t>
-            </a:r>
-          </a:p>
-        </p:txBody>
-      </p:sp>
-      <p:sp>
-        <p:nvSpPr>
-          <p:cNvPr id="4" name="TextBox 3">
-            <a:extLst>
-              <a:ext uri="{FF2B5EF4-FFF2-40B4-BE49-F238E27FC236}">
-                <a16:creationId xmlns:a16="http://schemas.microsoft.com/office/drawing/2014/main" id="{514B3DE0-8D04-46D1-936F-661F37E9A81F}"/>
-              </a:ext>
-            </a:extLst>
-          </p:cNvPr>
-          <p:cNvSpPr txBox="1"/>
-          <p:nvPr/>
-        </p:nvSpPr>
-        <p:spPr>
-          <a:xfrm>
-            <a:off x="6096000" y="3118188"/>
-            <a:ext cx="4394200" cy="2031325"/>
-          </a:xfrm>
-          <a:prstGeom prst="rect">
-            <a:avLst/>
-          </a:prstGeom>
-          <a:noFill/>
-        </p:spPr>
-        <p:txBody>
-          <a:bodyPr wrap="square" rtlCol="0">
-            <a:spAutoFit/>
-          </a:bodyPr>
-          <a:lstStyle/>
-          <a:p>
-            <a:r>
-              <a:rPr lang="en-GB" dirty="0"/>
-              <a:t>Key:</a:t>
-            </a:r>
-          </a:p>
-          <a:p>
-            <a:r>
-              <a:rPr lang="en-GB" dirty="0"/>
-              <a:t>	</a:t>
-            </a:r>
-            <a:r>
-              <a:rPr lang="en-GB" dirty="0">
-                <a:highlight>
-                  <a:srgbClr val="700000"/>
-                </a:highlight>
-              </a:rPr>
-              <a:t>Slave trader/owned slaves</a:t>
-            </a:r>
-          </a:p>
-          <a:p>
-            <a:endParaRPr lang="en-GB" dirty="0"/>
-          </a:p>
-          <a:p>
-            <a:r>
-              <a:rPr lang="en-GB" dirty="0"/>
-              <a:t> </a:t>
+              <a:t>those commemorated by plaques in London </a:t>
             </a:r>
             <a:r>
               <a:rPr lang="en-GB" dirty="0">
@@ -7449,11 +7263,13 @@
                   <a:srgbClr val="00FF00"/>
                 </a:highlight>
               </a:rPr>
-              <a:t>That is not to say that the other names certainly deserve a place but they are not </a:t>
-            </a:r>
+              <a:t>(n from n were not white British)</a:t>
+            </a:r>
+          </a:p>
+          <a:p>
             <a:r>
               <a:rPr lang="en-GB" dirty="0"/>
-              <a:t>slave traders/owners from the Wikipedia search I conducted. </a:t>
+              <a:t>The bad actor scoring system does effectively filter down the number of possible candidates, reducing the time needed for a human to check those commemorated. </a:t>
             </a:r>
             <a:r>
               <a:rPr lang="en-GB" dirty="0">
@@ -7461,7 +7277,35 @@
                   <a:srgbClr val="00FF00"/>
                 </a:highlight>
               </a:rPr>
-              <a:t>Explain/reword</a:t>
+              <a:t>From x to y</a:t>
+            </a:r>
+          </a:p>
+          <a:p>
+            <a:r>
+              <a:rPr lang="en-GB" dirty="0"/>
+              <a:t>The scoring system still needs a human to validate the choices – often the links are more complicated e.g. money/slaves inherited from family which the </a:t>
+            </a:r>
+            <a:r>
+              <a:rPr lang="en-GB" dirty="0">
+                <a:highlight>
+                  <a:srgbClr val="00FF00"/>
+                </a:highlight>
+              </a:rPr>
+              <a:t>simply </a:t>
+            </a:r>
+            <a:r>
+              <a:rPr lang="en-GB" dirty="0"/>
+              <a:t>model cannot differentiate.</a:t>
+            </a:r>
+          </a:p>
+          <a:p>
+            <a:r>
+              <a:rPr lang="en-GB" dirty="0">
+                <a:highlight>
+                  <a:srgbClr val="00FF00"/>
+                </a:highlight>
+              </a:rPr>
+              <a:t>What did you learn</a:t>
             </a:r>
           </a:p>
         </p:txBody>
@@ -7469,7 +7313,7 @@
     </p:spTree>
     <p:extLst>
       <p:ext uri="{BB962C8B-B14F-4D97-AF65-F5344CB8AC3E}">
-        <p14:creationId xmlns:p14="http://schemas.microsoft.com/office/powerpoint/2010/main" val="2964064638"/>
+        <p14:creationId xmlns:p14="http://schemas.microsoft.com/office/powerpoint/2010/main" val="741771949"/>
       </p:ext>
     </p:extLst>
   </p:cSld>
@@ -8518,15 +8362,9 @@
 <file path=customXml/itemProps3.xml><?xml version="1.0" encoding="utf-8"?>
 <ds:datastoreItem xmlns:ds="http://schemas.openxmlformats.org/officeDocument/2006/customXml" ds:itemID="{0EC94942-C689-461B-8649-1FD863C6BA2B}">
   <ds:schemaRefs>
-    <ds:schemaRef ds:uri="http://schemas.microsoft.com/office/2006/documentManagement/types"/>
+    <ds:schemaRef ds:uri="http://schemas.microsoft.com/office/2006/metadata/properties"/>
     <ds:schemaRef ds:uri="http://schemas.microsoft.com/office/infopath/2007/PartnerControls"/>
-    <ds:schemaRef ds:uri="http://purl.org/dc/elements/1.1/"/>
-    <ds:schemaRef ds:uri="http://schemas.microsoft.com/office/2006/metadata/properties"/>
-    <ds:schemaRef ds:uri="http://purl.org/dc/terms/"/>
-    <ds:schemaRef ds:uri="http://schemas.openxmlformats.org/package/2006/metadata/core-properties"/>
     <ds:schemaRef ds:uri="d9cc2b2a-c808-481a-ab86-5d35f8a2a5f5"/>
-    <ds:schemaRef ds:uri="http://www.w3.org/XML/1998/namespace"/>
-    <ds:schemaRef ds:uri="http://purl.org/dc/dcmitype/"/>
   </ds:schemaRefs>
 </ds:datastoreItem>
 </file>
</xml_diff>

<commit_message>
Added correction and re-arrangement
</commit_message>
<xml_diff>
--- a/The diversity of plaques in London.pptx
+++ b/The diversity of plaques in London.pptx
@@ -5,21 +5,23 @@
     <p:sldMasterId id="2147483660" r:id="rId4"/>
   </p:sldMasterIdLst>
   <p:notesMasterIdLst>
-    <p:notesMasterId r:id="rId14"/>
+    <p:notesMasterId r:id="rId16"/>
   </p:notesMasterIdLst>
   <p:handoutMasterIdLst>
-    <p:handoutMasterId r:id="rId15"/>
+    <p:handoutMasterId r:id="rId17"/>
   </p:handoutMasterIdLst>
   <p:sldIdLst>
     <p:sldId id="268" r:id="rId5"/>
     <p:sldId id="270" r:id="rId6"/>
-    <p:sldId id="271" r:id="rId7"/>
-    <p:sldId id="272" r:id="rId8"/>
+    <p:sldId id="278" r:id="rId7"/>
+    <p:sldId id="279" r:id="rId8"/>
     <p:sldId id="273" r:id="rId9"/>
-    <p:sldId id="274" r:id="rId10"/>
-    <p:sldId id="277" r:id="rId11"/>
-    <p:sldId id="275" r:id="rId12"/>
-    <p:sldId id="276" r:id="rId13"/>
+    <p:sldId id="280" r:id="rId10"/>
+    <p:sldId id="281" r:id="rId11"/>
+    <p:sldId id="274" r:id="rId12"/>
+    <p:sldId id="275" r:id="rId13"/>
+    <p:sldId id="282" r:id="rId14"/>
+    <p:sldId id="276" r:id="rId15"/>
   </p:sldIdLst>
   <p:sldSz cx="12192000" cy="6858000"/>
   <p:notesSz cx="6858000" cy="9144000"/>
@@ -132,8 +134,7 @@
 <file path=ppt/revisionInfo.xml><?xml version="1.0" encoding="utf-8"?>
 <p1510:revInfo xmlns:a="http://schemas.openxmlformats.org/drawingml/2006/main" xmlns:r="http://schemas.openxmlformats.org/officeDocument/2006/relationships" xmlns:p1510="http://schemas.microsoft.com/office/powerpoint/2015/10/main">
   <p1510:revLst>
-    <p1510:client id="{8DC4D9C7-08E6-458A-80DC-FC5B06C7F9BB}" v="6" dt="2020-07-12T20:20:36.021"/>
-    <p1510:client id="{DB9CFE14-85CC-4C14-96E8-E61B1D0CD012}" v="4" dt="2020-07-13T08:56:33.606"/>
+    <p1510:client id="{DB9CFE14-85CC-4C14-96E8-E61B1D0CD012}" v="35" dt="2020-07-13T20:57:07.827"/>
   </p1510:revLst>
 </p1510:revInfo>
 </file>
@@ -5692,6 +5693,268 @@
 </p:sld>
 </file>
 
+<file path=ppt/slides/slide10.xml><?xml version="1.0" encoding="utf-8"?>
+<p:sld xmlns:a="http://schemas.openxmlformats.org/drawingml/2006/main" xmlns:r="http://schemas.openxmlformats.org/officeDocument/2006/relationships" xmlns:p="http://schemas.openxmlformats.org/presentationml/2006/main">
+  <p:cSld>
+    <p:spTree>
+      <p:nvGrpSpPr>
+        <p:cNvPr id="1" name=""/>
+        <p:cNvGrpSpPr/>
+        <p:nvPr/>
+      </p:nvGrpSpPr>
+      <p:grpSpPr>
+        <a:xfrm>
+          <a:off x="0" y="0"/>
+          <a:ext cx="0" cy="0"/>
+          <a:chOff x="0" y="0"/>
+          <a:chExt cx="0" cy="0"/>
+        </a:xfrm>
+      </p:grpSpPr>
+      <p:sp>
+        <p:nvSpPr>
+          <p:cNvPr id="2" name="Title 1">
+            <a:extLst>
+              <a:ext uri="{FF2B5EF4-FFF2-40B4-BE49-F238E27FC236}">
+                <a16:creationId xmlns:a16="http://schemas.microsoft.com/office/drawing/2014/main" id="{50201E95-02C1-4C65-8570-8FD9AD49C26C}"/>
+              </a:ext>
+            </a:extLst>
+          </p:cNvPr>
+          <p:cNvSpPr>
+            <a:spLocks noGrp="1"/>
+          </p:cNvSpPr>
+          <p:nvPr>
+            <p:ph type="title"/>
+          </p:nvPr>
+        </p:nvSpPr>
+        <p:spPr>
+          <a:xfrm>
+            <a:off x="685801" y="609600"/>
+            <a:ext cx="10840914" cy="1260000"/>
+          </a:xfrm>
+        </p:spPr>
+        <p:txBody>
+          <a:bodyPr anchor="ctr">
+            <a:normAutofit/>
+          </a:bodyPr>
+          <a:lstStyle/>
+          <a:p>
+            <a:r>
+              <a:rPr lang="en-GB" dirty="0"/>
+              <a:t>Discussion</a:t>
+            </a:r>
+          </a:p>
+        </p:txBody>
+      </p:sp>
+      <p:pic>
+        <p:nvPicPr>
+          <p:cNvPr id="1026" name="Picture 2" descr="Monument to Hodge the Cat – London, England - Atlas Obscura">
+            <a:extLst>
+              <a:ext uri="{FF2B5EF4-FFF2-40B4-BE49-F238E27FC236}">
+                <a16:creationId xmlns:a16="http://schemas.microsoft.com/office/drawing/2014/main" id="{4F0EE0EE-A3ED-47E0-B7CD-80F59E14847D}"/>
+              </a:ext>
+            </a:extLst>
+          </p:cNvPr>
+          <p:cNvPicPr>
+            <a:picLocks noChangeAspect="1" noChangeArrowheads="1"/>
+          </p:cNvPicPr>
+          <p:nvPr/>
+        </p:nvPicPr>
+        <p:blipFill rotWithShape="1">
+          <a:blip r:embed="rId2">
+            <a:extLst>
+              <a:ext uri="{28A0092B-C50C-407E-A947-70E740481C1C}">
+                <a14:useLocalDpi xmlns:a14="http://schemas.microsoft.com/office/drawing/2010/main" val="0"/>
+              </a:ext>
+            </a:extLst>
+          </a:blip>
+          <a:srcRect r="14216" b="2"/>
+          <a:stretch/>
+        </p:blipFill>
+        <p:spPr bwMode="auto">
+          <a:xfrm>
+            <a:off x="685802" y="1869600"/>
+            <a:ext cx="5040000" cy="3921601"/>
+          </a:xfrm>
+          <a:prstGeom prst="roundRect">
+            <a:avLst>
+              <a:gd name="adj" fmla="val 1970"/>
+            </a:avLst>
+          </a:prstGeom>
+          <a:solidFill>
+            <a:srgbClr val="FFFFFF"/>
+          </a:solidFill>
+          <a:ln w="28575">
+            <a:noFill/>
+          </a:ln>
+          <a:effectLst/>
+          <a:extLst>
+            <a:ext uri="{909E8E84-426E-40DD-AFC4-6F175D3DCCD1}">
+              <a14:hiddenFill xmlns:a14="http://schemas.microsoft.com/office/drawing/2010/main">
+                <a:solidFill>
+                  <a:srgbClr val="FFFFFF"/>
+                </a:solidFill>
+              </a14:hiddenFill>
+            </a:ext>
+          </a:extLst>
+        </p:spPr>
+      </p:pic>
+      <p:sp>
+        <p:nvSpPr>
+          <p:cNvPr id="3" name="Content Placeholder 2">
+            <a:extLst>
+              <a:ext uri="{FF2B5EF4-FFF2-40B4-BE49-F238E27FC236}">
+                <a16:creationId xmlns:a16="http://schemas.microsoft.com/office/drawing/2014/main" id="{F2E490F8-EF2D-4306-9868-F7B5B29C8D2D}"/>
+              </a:ext>
+            </a:extLst>
+          </p:cNvPr>
+          <p:cNvSpPr>
+            <a:spLocks noGrp="1"/>
+          </p:cNvSpPr>
+          <p:nvPr>
+            <p:ph sz="half" idx="2"/>
+          </p:nvPr>
+        </p:nvSpPr>
+        <p:spPr>
+          <a:xfrm>
+            <a:off x="6488644" y="1869601"/>
+            <a:ext cx="5040000" cy="3921600"/>
+          </a:xfrm>
+        </p:spPr>
+        <p:txBody>
+          <a:bodyPr anchor="t">
+            <a:normAutofit/>
+          </a:bodyPr>
+          <a:lstStyle/>
+          <a:p>
+            <a:r>
+              <a:rPr lang="en-GB" dirty="0"/>
+              <a:t>The presence of words as a use of a filter means that the scoring system is slightly bias towards longer Wikipedia pages i.e. more well known people.</a:t>
+            </a:r>
+          </a:p>
+          <a:p>
+            <a:r>
+              <a:rPr lang="en-GB" dirty="0"/>
+              <a:t>False positives have arisen when finding the entries present on the list of slave traders. For example Hodge the cat was one such result because of a mix up between names. No evidence of this cat being a slave trader has been found</a:t>
+            </a:r>
+          </a:p>
+        </p:txBody>
+      </p:sp>
+    </p:spTree>
+    <p:extLst>
+      <p:ext uri="{BB962C8B-B14F-4D97-AF65-F5344CB8AC3E}">
+        <p14:creationId xmlns:p14="http://schemas.microsoft.com/office/powerpoint/2010/main" val="3625034280"/>
+      </p:ext>
+    </p:extLst>
+  </p:cSld>
+  <p:clrMapOvr>
+    <a:masterClrMapping/>
+  </p:clrMapOvr>
+</p:sld>
+</file>
+
+<file path=ppt/slides/slide11.xml><?xml version="1.0" encoding="utf-8"?>
+<p:sld xmlns:a="http://schemas.openxmlformats.org/drawingml/2006/main" xmlns:r="http://schemas.openxmlformats.org/officeDocument/2006/relationships" xmlns:p="http://schemas.openxmlformats.org/presentationml/2006/main">
+  <p:cSld>
+    <p:spTree>
+      <p:nvGrpSpPr>
+        <p:cNvPr id="1" name=""/>
+        <p:cNvGrpSpPr/>
+        <p:nvPr/>
+      </p:nvGrpSpPr>
+      <p:grpSpPr>
+        <a:xfrm>
+          <a:off x="0" y="0"/>
+          <a:ext cx="0" cy="0"/>
+          <a:chOff x="0" y="0"/>
+          <a:chExt cx="0" cy="0"/>
+        </a:xfrm>
+      </p:grpSpPr>
+      <p:sp>
+        <p:nvSpPr>
+          <p:cNvPr id="2" name="Title 1">
+            <a:extLst>
+              <a:ext uri="{FF2B5EF4-FFF2-40B4-BE49-F238E27FC236}">
+                <a16:creationId xmlns:a16="http://schemas.microsoft.com/office/drawing/2014/main" id="{714C7195-C384-49F5-A35D-E7A85AA14257}"/>
+              </a:ext>
+            </a:extLst>
+          </p:cNvPr>
+          <p:cNvSpPr>
+            <a:spLocks noGrp="1"/>
+          </p:cNvSpPr>
+          <p:nvPr>
+            <p:ph type="title"/>
+          </p:nvPr>
+        </p:nvSpPr>
+        <p:spPr/>
+        <p:txBody>
+          <a:bodyPr/>
+          <a:lstStyle/>
+          <a:p>
+            <a:r>
+              <a:rPr lang="en-GB" dirty="0"/>
+              <a:t>Conclusion</a:t>
+            </a:r>
+          </a:p>
+        </p:txBody>
+      </p:sp>
+      <p:sp>
+        <p:nvSpPr>
+          <p:cNvPr id="3" name="Content Placeholder 2">
+            <a:extLst>
+              <a:ext uri="{FF2B5EF4-FFF2-40B4-BE49-F238E27FC236}">
+                <a16:creationId xmlns:a16="http://schemas.microsoft.com/office/drawing/2014/main" id="{F2619B6D-1867-4860-9893-EE653B091F62}"/>
+              </a:ext>
+            </a:extLst>
+          </p:cNvPr>
+          <p:cNvSpPr>
+            <a:spLocks noGrp="1"/>
+          </p:cNvSpPr>
+          <p:nvPr>
+            <p:ph idx="1"/>
+          </p:nvPr>
+        </p:nvSpPr>
+        <p:spPr/>
+        <p:txBody>
+          <a:bodyPr/>
+          <a:lstStyle/>
+          <a:p>
+            <a:r>
+              <a:rPr lang="en-GB" dirty="0"/>
+              <a:t>The bad actor scoring system does effectively filter down the number of possible candidates, reducing the time needed for a human to check those commemorated from 12 thousand to a number determined by a score threshold</a:t>
+            </a:r>
+          </a:p>
+          <a:p>
+            <a:r>
+              <a:rPr lang="en-GB" dirty="0"/>
+              <a:t>The scoring system still needs a human to validate the choices – often the links are more complicated e.g. money/slaves inherited from family which the simple model cannot differentiate.</a:t>
+            </a:r>
+          </a:p>
+          <a:p>
+            <a:r>
+              <a:rPr lang="en-GB" dirty="0"/>
+              <a:t>From this project I learn a lot of new skills from workflow to web scrapping as well as aspect of a real world problem which need to be accounted </a:t>
+            </a:r>
+            <a:r>
+              <a:rPr lang="en-GB"/>
+              <a:t>for.</a:t>
+            </a:r>
+            <a:endParaRPr lang="en-GB" dirty="0"/>
+          </a:p>
+        </p:txBody>
+      </p:sp>
+    </p:spTree>
+    <p:extLst>
+      <p:ext uri="{BB962C8B-B14F-4D97-AF65-F5344CB8AC3E}">
+        <p14:creationId xmlns:p14="http://schemas.microsoft.com/office/powerpoint/2010/main" val="741771949"/>
+      </p:ext>
+    </p:extLst>
+  </p:cSld>
+  <p:clrMapOvr>
+    <a:masterClrMapping/>
+  </p:clrMapOvr>
+</p:sld>
+</file>
+
 <file path=ppt/slides/slide2.xml><?xml version="1.0" encoding="utf-8"?>
 <p:sld xmlns:a="http://schemas.openxmlformats.org/drawingml/2006/main" xmlns:r="http://schemas.openxmlformats.org/officeDocument/2006/relationships" xmlns:p="http://schemas.openxmlformats.org/presentationml/2006/main">
   <p:cSld>
@@ -5756,155 +6019,34 @@
         <p:spPr/>
         <p:txBody>
           <a:bodyPr>
-            <a:normAutofit fontScale="77500" lnSpcReduction="20000"/>
+            <a:normAutofit/>
           </a:bodyPr>
           <a:lstStyle/>
           <a:p>
             <a:r>
               <a:rPr lang="en-GB" dirty="0"/>
-              <a:t>The recent interest in the ‘Black </a:t>
-            </a:r>
-            <a:r>
-              <a:rPr lang="en-GB" dirty="0">
-                <a:highlight>
-                  <a:srgbClr val="00FF00"/>
-                </a:highlight>
-              </a:rPr>
-              <a:t>Lives </a:t>
-            </a:r>
+              <a:t>The recent interest in the ‘Black Lives Matter’ movement has led to the scrutiny of many public statues and monuments as to whether the attributed person deserves to be kept up due to their links to the slave trade and racism. Plaques are in the public domain and thus should also undergo the same scrutiny. It is also of interest to see the ethnic diversity of those commemorated on the plaques.</a:t>
+            </a:r>
+          </a:p>
+          <a:p>
             <a:r>
               <a:rPr lang="en-GB" dirty="0"/>
-              <a:t>Matter’ movement has led to the scrutiny of many public stat</a:t>
-            </a:r>
-            <a:r>
-              <a:rPr lang="en-GB" dirty="0">
-                <a:highlight>
-                  <a:srgbClr val="00FF00"/>
-                </a:highlight>
-              </a:rPr>
-              <a:t>ues </a:t>
-            </a:r>
+              <a:t>The aims of the project are to:</a:t>
+            </a:r>
+          </a:p>
+          <a:p>
+            <a:pPr lvl="1"/>
             <a:r>
               <a:rPr lang="en-GB" dirty="0"/>
-              <a:t>and monuments as to whether the attributed person deserves to be kept up due to </a:t>
-            </a:r>
-            <a:r>
-              <a:rPr lang="en-GB" dirty="0">
-                <a:highlight>
-                  <a:srgbClr val="00FF00"/>
-                </a:highlight>
-              </a:rPr>
-              <a:t>their </a:t>
-            </a:r>
+              <a:t>Analyse the diversity of the plaques found in London</a:t>
+            </a:r>
+          </a:p>
+          <a:p>
+            <a:pPr lvl="1"/>
             <a:r>
               <a:rPr lang="en-GB" dirty="0"/>
-              <a:t>links to the slave trade and racism.</a:t>
-            </a:r>
-          </a:p>
-          <a:p>
-            <a:r>
-              <a:rPr lang="en-GB" dirty="0"/>
-              <a:t>Plaques are in the public domain and thus should also undergo the same scrutiny.</a:t>
-            </a:r>
-          </a:p>
-          <a:p>
-            <a:r>
-              <a:rPr lang="en-GB" dirty="0"/>
-              <a:t>It is also of interest to see the ethnic diversity of those commemorated on the plaques.</a:t>
-            </a:r>
-          </a:p>
-          <a:p>
-            <a:endParaRPr lang="en-GB" dirty="0"/>
-          </a:p>
-          <a:p>
-            <a:r>
-              <a:rPr lang="en-US" dirty="0"/>
-              <a:t>What are Open Plaques, how many, linked to a database which means can use coding and </a:t>
-            </a:r>
-            <a:r>
-              <a:rPr lang="en-US" dirty="0" err="1"/>
-              <a:t>xxxx</a:t>
-            </a:r>
-            <a:r>
-              <a:rPr lang="en-US" dirty="0"/>
-              <a:t> to </a:t>
-            </a:r>
-            <a:r>
-              <a:rPr lang="en-US" dirty="0" err="1"/>
-              <a:t>analyse</a:t>
-            </a:r>
-            <a:endParaRPr lang="en-US" dirty="0"/>
-          </a:p>
-          <a:p>
-            <a:r>
-              <a:rPr lang="en-US" dirty="0"/>
-              <a:t>Why did you do this – </a:t>
-            </a:r>
-            <a:r>
-              <a:rPr lang="en-US" dirty="0" err="1"/>
-              <a:t>i.e</a:t>
-            </a:r>
-            <a:r>
-              <a:rPr lang="en-US" dirty="0"/>
-              <a:t> coding </a:t>
-            </a:r>
-            <a:r>
-              <a:rPr lang="en-US" dirty="0" err="1"/>
-              <a:t>etc</a:t>
-            </a:r>
-            <a:endParaRPr lang="en-US" dirty="0"/>
-          </a:p>
-          <a:p>
-            <a:pPr lvl="1"/>
-            <a:r>
-              <a:rPr lang="en-US" dirty="0"/>
-              <a:t>Learn about workflow</a:t>
-            </a:r>
-          </a:p>
-          <a:p>
-            <a:pPr lvl="1"/>
-            <a:r>
-              <a:rPr lang="en-US" dirty="0"/>
-              <a:t>Learn about web scrapping</a:t>
-            </a:r>
-          </a:p>
-          <a:p>
-            <a:pPr lvl="1"/>
-            <a:r>
-              <a:rPr lang="en-US" dirty="0"/>
-              <a:t>Real world useful outcome</a:t>
-            </a:r>
-          </a:p>
-          <a:p>
-            <a:r>
-              <a:rPr lang="en-US" dirty="0"/>
-              <a:t>Who gave you the project, what do they do</a:t>
-            </a:r>
-          </a:p>
-          <a:p>
-            <a:pPr lvl="1"/>
-            <a:r>
-              <a:rPr lang="en-US" dirty="0"/>
-              <a:t>Open plaques – open source database documenting plaques</a:t>
-            </a:r>
-          </a:p>
-          <a:p>
-            <a:pPr lvl="1"/>
-            <a:r>
-              <a:rPr lang="en-US" dirty="0"/>
-              <a:t>Jez</a:t>
-            </a:r>
-          </a:p>
-          <a:p>
-            <a:r>
-              <a:rPr lang="en-US" dirty="0"/>
-              <a:t>Talk about the data you had </a:t>
-            </a:r>
-            <a:r>
-              <a:rPr lang="en-US"/>
-              <a:t>to use</a:t>
-            </a:r>
-            <a:endParaRPr lang="en-US" dirty="0"/>
+              <a:t>Identify bad actors with links  to the slave trade</a:t>
+            </a:r>
           </a:p>
         </p:txBody>
       </p:sp>
@@ -5937,8 +6079,8 @@
         </p:blipFill>
         <p:spPr bwMode="auto">
           <a:xfrm>
-            <a:off x="8559800" y="282574"/>
-            <a:ext cx="1752600" cy="1314450"/>
+            <a:off x="6515100" y="3325576"/>
+            <a:ext cx="4089400" cy="3067050"/>
           </a:xfrm>
           <a:prstGeom prst="rect">
             <a:avLst/>
@@ -5990,7 +6132,7 @@
           <p:cNvPr id="2" name="Title 1">
             <a:extLst>
               <a:ext uri="{FF2B5EF4-FFF2-40B4-BE49-F238E27FC236}">
-                <a16:creationId xmlns:a16="http://schemas.microsoft.com/office/drawing/2014/main" id="{EA4E3BC5-6ABD-46A8-8F95-D9BBB00103CD}"/>
+                <a16:creationId xmlns:a16="http://schemas.microsoft.com/office/drawing/2014/main" id="{7CA4D433-ED98-495A-A0E5-2A614039B5E2}"/>
               </a:ext>
             </a:extLst>
           </p:cNvPr>
@@ -6001,31 +6143,91 @@
             <p:ph type="title"/>
           </p:nvPr>
         </p:nvSpPr>
-        <p:spPr>
-          <a:xfrm>
-            <a:off x="685801" y="609600"/>
-            <a:ext cx="10840914" cy="1260000"/>
-          </a:xfrm>
-        </p:spPr>
-        <p:txBody>
-          <a:bodyPr anchor="ctr">
-            <a:normAutofit/>
-          </a:bodyPr>
+        <p:spPr/>
+        <p:txBody>
+          <a:bodyPr/>
           <a:lstStyle/>
           <a:p>
             <a:r>
               <a:rPr lang="en-GB" dirty="0"/>
-              <a:t>Who, what, where</a:t>
-            </a:r>
+              <a:t>why</a:t>
+            </a:r>
+          </a:p>
+        </p:txBody>
+      </p:sp>
+      <p:sp>
+        <p:nvSpPr>
+          <p:cNvPr id="3" name="Content Placeholder 2">
+            <a:extLst>
+              <a:ext uri="{FF2B5EF4-FFF2-40B4-BE49-F238E27FC236}">
+                <a16:creationId xmlns:a16="http://schemas.microsoft.com/office/drawing/2014/main" id="{84096143-5111-4BC8-84BE-10873D2B6AEF}"/>
+              </a:ext>
+            </a:extLst>
+          </p:cNvPr>
+          <p:cNvSpPr>
+            <a:spLocks noGrp="1"/>
+          </p:cNvSpPr>
+          <p:nvPr>
+            <p:ph idx="1"/>
+          </p:nvPr>
+        </p:nvSpPr>
+        <p:spPr/>
+        <p:txBody>
+          <a:bodyPr/>
+          <a:lstStyle/>
+          <a:p>
+            <a:r>
+              <a:rPr lang="en-US" dirty="0"/>
+              <a:t>I personally undertook the project to learn new skills</a:t>
+            </a:r>
+          </a:p>
+          <a:p>
+            <a:pPr lvl="1"/>
+            <a:r>
+              <a:rPr lang="en-US" dirty="0"/>
+              <a:t>Learn about workflow e.g. </a:t>
+            </a:r>
+            <a:r>
+              <a:rPr lang="en-US" dirty="0" err="1"/>
+              <a:t>Github</a:t>
+            </a:r>
+            <a:endParaRPr lang="en-US" dirty="0"/>
+          </a:p>
+          <a:p>
+            <a:pPr lvl="1"/>
+            <a:r>
+              <a:rPr lang="en-US" dirty="0"/>
+              <a:t>Learn about web scrapping</a:t>
+            </a:r>
+          </a:p>
+          <a:p>
+            <a:pPr lvl="1"/>
+            <a:r>
+              <a:rPr lang="en-US" dirty="0"/>
+              <a:t>Real world useful outcome</a:t>
+            </a:r>
+          </a:p>
+          <a:p>
+            <a:pPr lvl="1"/>
+            <a:r>
+              <a:rPr lang="en-US" dirty="0"/>
+              <a:t>Interested in the result of the project</a:t>
+            </a:r>
+          </a:p>
+          <a:p>
+            <a:pPr marL="0" indent="0">
+              <a:buNone/>
+            </a:pPr>
+            <a:endParaRPr lang="en-GB" dirty="0"/>
           </a:p>
         </p:txBody>
       </p:sp>
       <p:pic>
         <p:nvPicPr>
-          <p:cNvPr id="2050" name="Picture 2">
+          <p:cNvPr id="4" name="Picture 2">
             <a:extLst>
               <a:ext uri="{FF2B5EF4-FFF2-40B4-BE49-F238E27FC236}">
-                <a16:creationId xmlns:a16="http://schemas.microsoft.com/office/drawing/2014/main" id="{AC170033-D6BB-4622-85E6-629D29675E57}"/>
+                <a16:creationId xmlns:a16="http://schemas.microsoft.com/office/drawing/2014/main" id="{6505D8D3-3B3C-4643-B43E-362355ABCC4B}"/>
               </a:ext>
             </a:extLst>
           </p:cNvPr>
@@ -6047,7 +6249,7 @@
         </p:blipFill>
         <p:spPr bwMode="auto">
           <a:xfrm>
-            <a:off x="685802" y="1869600"/>
+            <a:off x="5946556" y="2446099"/>
             <a:ext cx="5040000" cy="3921601"/>
           </a:xfrm>
           <a:prstGeom prst="roundRect">
@@ -6064,109 +6266,10 @@
           <a:effectLst/>
         </p:spPr>
       </p:pic>
-      <p:sp>
-        <p:nvSpPr>
-          <p:cNvPr id="3" name="Content Placeholder 2">
-            <a:extLst>
-              <a:ext uri="{FF2B5EF4-FFF2-40B4-BE49-F238E27FC236}">
-                <a16:creationId xmlns:a16="http://schemas.microsoft.com/office/drawing/2014/main" id="{775A01C4-C29E-4F6A-AAB7-826A1B6B0F29}"/>
-              </a:ext>
-            </a:extLst>
-          </p:cNvPr>
-          <p:cNvSpPr>
-            <a:spLocks noGrp="1"/>
-          </p:cNvSpPr>
-          <p:nvPr>
-            <p:ph sz="half" idx="2"/>
-          </p:nvPr>
-        </p:nvSpPr>
-        <p:spPr>
-          <a:xfrm>
-            <a:off x="6488644" y="1869601"/>
-            <a:ext cx="5040000" cy="3921600"/>
-          </a:xfrm>
-        </p:spPr>
-        <p:txBody>
-          <a:bodyPr anchor="t">
-            <a:normAutofit lnSpcReduction="10000"/>
-          </a:bodyPr>
-          <a:lstStyle/>
-          <a:p>
-            <a:r>
-              <a:rPr lang="en-GB" dirty="0"/>
-              <a:t>This report will look at individuals commemorated by plaques found in London on the Open Plaque database.</a:t>
-            </a:r>
-          </a:p>
-          <a:p>
-            <a:r>
-              <a:rPr lang="en-GB" dirty="0"/>
-              <a:t>The aim is to investigate the diversity of those commemorated on plaques in London and to identify those who have links to the slave trade.</a:t>
-            </a:r>
-          </a:p>
-          <a:p>
-            <a:r>
-              <a:rPr lang="en-GB" dirty="0">
-                <a:highlight>
-                  <a:srgbClr val="00FF00"/>
-                </a:highlight>
-              </a:rPr>
-              <a:t>What was the data you analysed, what did you do to analyse it</a:t>
-            </a:r>
-          </a:p>
-          <a:p>
-            <a:pPr lvl="1"/>
-            <a:r>
-              <a:rPr lang="en-GB" dirty="0">
-                <a:highlight>
-                  <a:srgbClr val="00FF00"/>
-                </a:highlight>
-              </a:rPr>
-              <a:t>2.7k people</a:t>
-            </a:r>
-          </a:p>
-          <a:p>
-            <a:r>
-              <a:rPr lang="en-GB" dirty="0">
-                <a:highlight>
-                  <a:srgbClr val="00FF00"/>
-                </a:highlight>
-              </a:rPr>
-              <a:t>Describe the range of people, </a:t>
-            </a:r>
-            <a:r>
-              <a:rPr lang="en-GB" dirty="0">
-                <a:highlight>
-                  <a:srgbClr val="FFFF00"/>
-                </a:highlight>
-              </a:rPr>
-              <a:t>an dhow do </a:t>
-            </a:r>
-            <a:r>
-              <a:rPr lang="en-GB" dirty="0">
-                <a:highlight>
-                  <a:srgbClr val="00FF00"/>
-                </a:highlight>
-              </a:rPr>
-              <a:t>they qualify to have a plaque</a:t>
-            </a:r>
-          </a:p>
-          <a:p>
-            <a:pPr lvl="1"/>
-            <a:r>
-              <a:rPr lang="en-GB" dirty="0">
-                <a:highlight>
-                  <a:srgbClr val="00FF00"/>
-                </a:highlight>
-              </a:rPr>
-              <a:t>No specific criteria</a:t>
-            </a:r>
-          </a:p>
-        </p:txBody>
-      </p:sp>
     </p:spTree>
     <p:extLst>
       <p:ext uri="{BB962C8B-B14F-4D97-AF65-F5344CB8AC3E}">
-        <p14:creationId xmlns:p14="http://schemas.microsoft.com/office/powerpoint/2010/main" val="2173436168"/>
+        <p14:creationId xmlns:p14="http://schemas.microsoft.com/office/powerpoint/2010/main" val="4152300843"/>
       </p:ext>
     </p:extLst>
   </p:cSld>
@@ -6198,7 +6301,7 @@
           <p:cNvPr id="2" name="Title 1">
             <a:extLst>
               <a:ext uri="{FF2B5EF4-FFF2-40B4-BE49-F238E27FC236}">
-                <a16:creationId xmlns:a16="http://schemas.microsoft.com/office/drawing/2014/main" id="{A2E64AD2-E6EE-4297-8B75-54EFD2BDD565}"/>
+                <a16:creationId xmlns:a16="http://schemas.microsoft.com/office/drawing/2014/main" id="{4E068321-6063-4C22-A1AD-A65DC277086C}"/>
               </a:ext>
             </a:extLst>
           </p:cNvPr>
@@ -6209,144 +6312,81 @@
             <p:ph type="title"/>
           </p:nvPr>
         </p:nvSpPr>
-        <p:spPr>
-          <a:xfrm>
-            <a:off x="685801" y="609600"/>
-            <a:ext cx="10840914" cy="1260000"/>
-          </a:xfrm>
-        </p:spPr>
-        <p:txBody>
-          <a:bodyPr anchor="ctr">
+        <p:spPr/>
+        <p:txBody>
+          <a:bodyPr/>
+          <a:lstStyle/>
+          <a:p>
+            <a:r>
+              <a:rPr lang="en-GB" dirty="0"/>
+              <a:t>Who/what/where/when</a:t>
+            </a:r>
+          </a:p>
+        </p:txBody>
+      </p:sp>
+      <p:sp>
+        <p:nvSpPr>
+          <p:cNvPr id="3" name="Content Placeholder 2">
+            <a:extLst>
+              <a:ext uri="{FF2B5EF4-FFF2-40B4-BE49-F238E27FC236}">
+                <a16:creationId xmlns:a16="http://schemas.microsoft.com/office/drawing/2014/main" id="{24540B16-2C44-445A-B3C2-9F9A8D51C6B1}"/>
+              </a:ext>
+            </a:extLst>
+          </p:cNvPr>
+          <p:cNvSpPr>
+            <a:spLocks noGrp="1"/>
+          </p:cNvSpPr>
+          <p:nvPr>
+            <p:ph idx="1"/>
+          </p:nvPr>
+        </p:nvSpPr>
+        <p:spPr/>
+        <p:txBody>
+          <a:bodyPr>
             <a:normAutofit/>
           </a:bodyPr>
           <a:lstStyle/>
           <a:p>
             <a:r>
+              <a:rPr lang="en-US" dirty="0"/>
+              <a:t>Open plaques is an open source database documenting</a:t>
+            </a:r>
+            <a:r>
               <a:rPr lang="en-GB" dirty="0"/>
-              <a:t>When</a:t>
-            </a:r>
-          </a:p>
-        </p:txBody>
-      </p:sp>
-      <p:sp>
-        <p:nvSpPr>
-          <p:cNvPr id="3" name="Content Placeholder 2">
-            <a:extLst>
-              <a:ext uri="{FF2B5EF4-FFF2-40B4-BE49-F238E27FC236}">
-                <a16:creationId xmlns:a16="http://schemas.microsoft.com/office/drawing/2014/main" id="{70062A91-7C83-4408-9E20-1EDB7BC20F66}"/>
-              </a:ext>
-            </a:extLst>
-          </p:cNvPr>
-          <p:cNvSpPr>
-            <a:spLocks noGrp="1"/>
-          </p:cNvSpPr>
-          <p:nvPr>
-            <p:ph sz="half" idx="1"/>
-          </p:nvPr>
-        </p:nvSpPr>
-        <p:spPr>
-          <a:xfrm>
-            <a:off x="685802" y="1869600"/>
-            <a:ext cx="5040000" cy="3921601"/>
-          </a:xfrm>
-        </p:spPr>
-        <p:txBody>
-          <a:bodyPr anchor="t">
-            <a:normAutofit/>
-          </a:bodyPr>
-          <a:lstStyle/>
+              <a:t> the historical links between people and places as recorded by commemorative plaques</a:t>
+            </a:r>
+            <a:endParaRPr lang="en-US" dirty="0"/>
+          </a:p>
           <a:p>
             <a:r>
               <a:rPr lang="en-GB" dirty="0"/>
-              <a:t>This report is a side project of the </a:t>
-            </a:r>
-            <a:r>
-              <a:rPr lang="en-GB" dirty="0" err="1"/>
-              <a:t>openplaques</a:t>
-            </a:r>
+              <a:t>This report will look at individuals commemorated by plaques found in London on the Open Plaque database. This includes 2899 plaques entries of individuals, organisations and objects. There is no specific criteria to have a plaque.</a:t>
+            </a:r>
+          </a:p>
+          <a:p>
             <a:r>
               <a:rPr lang="en-GB" dirty="0"/>
-              <a:t> open source </a:t>
-            </a:r>
-            <a:r>
-              <a:rPr lang="en-GB" dirty="0" err="1"/>
-              <a:t>repository.</a:t>
-            </a:r>
-            <a:r>
-              <a:rPr lang="en-GB" dirty="0" err="1">
-                <a:highlight>
-                  <a:srgbClr val="00FF00"/>
-                </a:highlight>
-              </a:rPr>
-              <a:t>link</a:t>
-            </a:r>
-            <a:endParaRPr lang="en-GB" dirty="0">
-              <a:highlight>
-                <a:srgbClr val="00FF00"/>
-              </a:highlight>
-            </a:endParaRPr>
+              <a:t>I used the pandas library with Python along with other web scrapping libraries to get more information about the individuals.</a:t>
+            </a:r>
           </a:p>
           <a:p>
             <a:r>
               <a:rPr lang="en-GB" dirty="0"/>
-              <a:t>Work on the report was done from: 11-06-2020 to 09-07-2020</a:t>
-            </a:r>
-          </a:p>
-          <a:p>
-            <a:r>
-              <a:rPr lang="en-GB" dirty="0">
-                <a:highlight>
-                  <a:srgbClr val="FFFF00"/>
-                </a:highlight>
-              </a:rPr>
-              <a:t>Data covers</a:t>
-            </a:r>
+              <a:t>This project was done in June/July 2020 as a work experience project given to me by Open Plaques.</a:t>
+            </a:r>
+          </a:p>
+          <a:p>
+            <a:endParaRPr lang="en-US" dirty="0"/>
           </a:p>
           <a:p>
             <a:endParaRPr lang="en-GB" dirty="0"/>
           </a:p>
         </p:txBody>
       </p:sp>
-      <p:pic>
-        <p:nvPicPr>
-          <p:cNvPr id="4" name="Picture 3">
-            <a:extLst>
-              <a:ext uri="{FF2B5EF4-FFF2-40B4-BE49-F238E27FC236}">
-                <a16:creationId xmlns:a16="http://schemas.microsoft.com/office/drawing/2014/main" id="{C37D857B-B344-4A79-BAF0-E753659B60EA}"/>
-              </a:ext>
-            </a:extLst>
-          </p:cNvPr>
-          <p:cNvPicPr>
-            <a:picLocks noChangeAspect="1"/>
-          </p:cNvPicPr>
-          <p:nvPr/>
-        </p:nvPicPr>
-        <p:blipFill rotWithShape="1">
-          <a:blip r:embed="rId2"/>
-          <a:srcRect l="2835" r="3023" b="-2"/>
-          <a:stretch/>
-        </p:blipFill>
-        <p:spPr>
-          <a:xfrm>
-            <a:off x="6488644" y="1869601"/>
-            <a:ext cx="5040000" cy="3921600"/>
-          </a:xfrm>
-          <a:prstGeom prst="roundRect">
-            <a:avLst>
-              <a:gd name="adj" fmla="val 2211"/>
-            </a:avLst>
-          </a:prstGeom>
-          <a:noFill/>
-          <a:ln w="28575">
-            <a:noFill/>
-          </a:ln>
-          <a:effectLst/>
-        </p:spPr>
-      </p:pic>
     </p:spTree>
     <p:extLst>
       <p:ext uri="{BB962C8B-B14F-4D97-AF65-F5344CB8AC3E}">
-        <p14:creationId xmlns:p14="http://schemas.microsoft.com/office/powerpoint/2010/main" val="2118411006"/>
+        <p14:creationId xmlns:p14="http://schemas.microsoft.com/office/powerpoint/2010/main" val="2655782359"/>
       </p:ext>
     </p:extLst>
   </p:cSld>
@@ -6420,12 +6460,12 @@
         <p:spPr>
           <a:xfrm>
             <a:off x="655808" y="1935801"/>
-            <a:ext cx="3813793" cy="4292600"/>
+            <a:ext cx="10494792" cy="4292600"/>
           </a:xfrm>
         </p:spPr>
         <p:txBody>
           <a:bodyPr>
-            <a:normAutofit fontScale="92500" lnSpcReduction="10000"/>
+            <a:normAutofit/>
           </a:bodyPr>
           <a:lstStyle/>
           <a:p>
@@ -6447,7 +6487,7 @@
             </a:r>
             <a:r>
               <a:rPr lang="en-GB" dirty="0"/>
-              <a:t> to fetch data from the </a:t>
+              <a:t> to fetch data from </a:t>
             </a:r>
             <a:r>
               <a:rPr lang="en-GB" dirty="0" err="1"/>
@@ -6455,75 +6495,125 @@
             </a:r>
             <a:r>
               <a:rPr lang="en-GB" dirty="0"/>
-              <a:t> database for </a:t>
-            </a:r>
-            <a:r>
-              <a:rPr lang="en-GB" dirty="0">
-                <a:highlight>
-                  <a:srgbClr val="00FF00"/>
-                </a:highlight>
-              </a:rPr>
-              <a:t>the</a:t>
-            </a:r>
+              <a:t>.</a:t>
+            </a:r>
+          </a:p>
+          <a:p>
             <a:r>
               <a:rPr lang="en-GB" dirty="0"/>
-              <a:t> individual on the plaques. </a:t>
-            </a:r>
-            <a:r>
-              <a:rPr lang="en-GB" dirty="0">
-                <a:highlight>
-                  <a:srgbClr val="00FF00"/>
-                </a:highlight>
-              </a:rPr>
-              <a:t>Describe your process/code</a:t>
-            </a:r>
-          </a:p>
-          <a:p>
+              <a:t>The code runs through the entries and searches for an ethnicity field for the corresponding </a:t>
+            </a:r>
+            <a:r>
+              <a:rPr lang="en-GB" dirty="0" err="1"/>
+              <a:t>wikidata</a:t>
+            </a:r>
             <a:r>
               <a:rPr lang="en-GB" dirty="0"/>
-              <a:t>~5% of the entries had ethnicity fields as a property so the chart could be bias if there are correlations </a:t>
-            </a:r>
-            <a:r>
-              <a:rPr lang="en-GB" dirty="0">
-                <a:highlight>
-                  <a:srgbClr val="00FF00"/>
-                </a:highlight>
-              </a:rPr>
-              <a:t>to the entry being there </a:t>
-            </a:r>
+              <a:t> ID</a:t>
+            </a:r>
+          </a:p>
+          <a:p>
             <a:r>
               <a:rPr lang="en-GB" dirty="0"/>
-              <a:t>e.g. if the entry is more likely to be there if the individual is say White British.</a:t>
-            </a:r>
-          </a:p>
-          <a:p>
+              <a:t>Not all entries have an affiliated </a:t>
+            </a:r>
+            <a:r>
+              <a:rPr lang="en-GB" dirty="0" err="1"/>
+              <a:t>wikidata</a:t>
+            </a:r>
             <a:r>
               <a:rPr lang="en-GB" dirty="0"/>
-              <a:t>The chart shows the overwhelming majority of those commemorated are British/English.</a:t>
-            </a:r>
-          </a:p>
-          <a:p>
-            <a:pPr lvl="1"/>
-            <a:r>
-              <a:rPr lang="en-GB" dirty="0"/>
-              <a:t>Stas – total no</a:t>
-            </a:r>
-          </a:p>
-          <a:p>
-            <a:pPr lvl="1"/>
-            <a:r>
-              <a:rPr lang="en-GB" dirty="0"/>
-              <a:t>%</a:t>
-            </a:r>
+              <a:t> ID and a lot fewer have an ethnicity field 8.6%</a:t>
+            </a:r>
+          </a:p>
+        </p:txBody>
+      </p:sp>
+    </p:spTree>
+    <p:extLst>
+      <p:ext uri="{BB962C8B-B14F-4D97-AF65-F5344CB8AC3E}">
+        <p14:creationId xmlns:p14="http://schemas.microsoft.com/office/powerpoint/2010/main" val="3942239564"/>
+      </p:ext>
+    </p:extLst>
+  </p:cSld>
+  <p:clrMapOvr>
+    <a:masterClrMapping/>
+  </p:clrMapOvr>
+</p:sld>
+</file>
+
+<file path=ppt/slides/slide6.xml><?xml version="1.0" encoding="utf-8"?>
+<p:sld xmlns:a="http://schemas.openxmlformats.org/drawingml/2006/main" xmlns:r="http://schemas.openxmlformats.org/officeDocument/2006/relationships" xmlns:p="http://schemas.openxmlformats.org/presentationml/2006/main">
+  <p:cSld>
+    <p:spTree>
+      <p:nvGrpSpPr>
+        <p:cNvPr id="1" name=""/>
+        <p:cNvGrpSpPr/>
+        <p:nvPr/>
+      </p:nvGrpSpPr>
+      <p:grpSpPr>
+        <a:xfrm>
+          <a:off x="0" y="0"/>
+          <a:ext cx="0" cy="0"/>
+          <a:chOff x="0" y="0"/>
+          <a:chExt cx="0" cy="0"/>
+        </a:xfrm>
+      </p:grpSpPr>
+      <p:sp>
+        <p:nvSpPr>
+          <p:cNvPr id="2" name="Title 1">
+            <a:extLst>
+              <a:ext uri="{FF2B5EF4-FFF2-40B4-BE49-F238E27FC236}">
+                <a16:creationId xmlns:a16="http://schemas.microsoft.com/office/drawing/2014/main" id="{43100D72-320A-4A42-8E57-6A184A5A056D}"/>
+              </a:ext>
+            </a:extLst>
+          </p:cNvPr>
+          <p:cNvSpPr>
+            <a:spLocks noGrp="1"/>
+          </p:cNvSpPr>
+          <p:nvPr>
+            <p:ph type="title"/>
+          </p:nvPr>
+        </p:nvSpPr>
+        <p:spPr/>
+        <p:txBody>
+          <a:bodyPr/>
+          <a:lstStyle/>
+          <a:p>
+            <a:endParaRPr lang="en-GB"/>
+          </a:p>
+        </p:txBody>
+      </p:sp>
+      <p:sp>
+        <p:nvSpPr>
+          <p:cNvPr id="3" name="Content Placeholder 2">
+            <a:extLst>
+              <a:ext uri="{FF2B5EF4-FFF2-40B4-BE49-F238E27FC236}">
+                <a16:creationId xmlns:a16="http://schemas.microsoft.com/office/drawing/2014/main" id="{F9290905-8E91-40C3-8D8C-9E009A7925F5}"/>
+              </a:ext>
+            </a:extLst>
+          </p:cNvPr>
+          <p:cNvSpPr>
+            <a:spLocks noGrp="1"/>
+          </p:cNvSpPr>
+          <p:nvPr>
+            <p:ph idx="1"/>
+          </p:nvPr>
+        </p:nvSpPr>
+        <p:spPr/>
+        <p:txBody>
+          <a:bodyPr/>
+          <a:lstStyle/>
+          <a:p>
+            <a:endParaRPr lang="en-GB" dirty="0"/>
           </a:p>
         </p:txBody>
       </p:sp>
       <p:grpSp>
         <p:nvGrpSpPr>
-          <p:cNvPr id="5" name="Group 4">
+          <p:cNvPr id="4" name="Group 3">
             <a:extLst>
               <a:ext uri="{FF2B5EF4-FFF2-40B4-BE49-F238E27FC236}">
-                <a16:creationId xmlns:a16="http://schemas.microsoft.com/office/drawing/2014/main" id="{53810FE8-716C-420B-88FF-9064AB67D7A3}"/>
+                <a16:creationId xmlns:a16="http://schemas.microsoft.com/office/drawing/2014/main" id="{04DFC7D6-D161-4F03-8234-3B8822F19BEB}"/>
               </a:ext>
             </a:extLst>
           </p:cNvPr>
@@ -6532,18 +6622,18 @@
         </p:nvGrpSpPr>
         <p:grpSpPr>
           <a:xfrm>
-            <a:off x="4567115" y="1935800"/>
-            <a:ext cx="6959600" cy="4292600"/>
+            <a:off x="541215" y="411800"/>
+            <a:ext cx="10985500" cy="6090600"/>
             <a:chOff x="800100" y="3568700"/>
             <a:chExt cx="5961187" cy="3111500"/>
           </a:xfrm>
         </p:grpSpPr>
         <p:sp>
           <p:nvSpPr>
-            <p:cNvPr id="6" name="Rectangle 5">
+            <p:cNvPr id="5" name="Rectangle 4">
               <a:extLst>
                 <a:ext uri="{FF2B5EF4-FFF2-40B4-BE49-F238E27FC236}">
-                  <a16:creationId xmlns:a16="http://schemas.microsoft.com/office/drawing/2014/main" id="{6213E599-8E1E-4329-AE79-3D7D9C4351C7}"/>
+                  <a16:creationId xmlns:a16="http://schemas.microsoft.com/office/drawing/2014/main" id="{5009DC33-3E14-4134-ADF6-CC8E3B374B95}"/>
                 </a:ext>
               </a:extLst>
             </p:cNvPr>
@@ -6592,10 +6682,10 @@
         </p:sp>
         <p:pic>
           <p:nvPicPr>
-            <p:cNvPr id="7" name="Picture 6" descr="A screenshot of a cell phone&#10;&#10;Description automatically generated">
+            <p:cNvPr id="6" name="Picture 5" descr="A screenshot of a cell phone&#10;&#10;Description automatically generated">
               <a:extLst>
                 <a:ext uri="{FF2B5EF4-FFF2-40B4-BE49-F238E27FC236}">
-                  <a16:creationId xmlns:a16="http://schemas.microsoft.com/office/drawing/2014/main" id="{9782A791-14F1-40F1-ABB2-B9171CF91FE7}"/>
+                  <a16:creationId xmlns:a16="http://schemas.microsoft.com/office/drawing/2014/main" id="{3E051873-A5A1-4B2D-B43B-FA631DDF3D71}"/>
                 </a:ext>
               </a:extLst>
             </p:cNvPr>
@@ -6624,146 +6714,7 @@
     </p:spTree>
     <p:extLst>
       <p:ext uri="{BB962C8B-B14F-4D97-AF65-F5344CB8AC3E}">
-        <p14:creationId xmlns:p14="http://schemas.microsoft.com/office/powerpoint/2010/main" val="3942239564"/>
-      </p:ext>
-    </p:extLst>
-  </p:cSld>
-  <p:clrMapOvr>
-    <a:masterClrMapping/>
-  </p:clrMapOvr>
-</p:sld>
-</file>
-
-<file path=ppt/slides/slide6.xml><?xml version="1.0" encoding="utf-8"?>
-<p:sld xmlns:a="http://schemas.openxmlformats.org/drawingml/2006/main" xmlns:r="http://schemas.openxmlformats.org/officeDocument/2006/relationships" xmlns:p="http://schemas.openxmlformats.org/presentationml/2006/main">
-  <p:cSld>
-    <p:spTree>
-      <p:nvGrpSpPr>
-        <p:cNvPr id="1" name=""/>
-        <p:cNvGrpSpPr/>
-        <p:nvPr/>
-      </p:nvGrpSpPr>
-      <p:grpSpPr>
-        <a:xfrm>
-          <a:off x="0" y="0"/>
-          <a:ext cx="0" cy="0"/>
-          <a:chOff x="0" y="0"/>
-          <a:chExt cx="0" cy="0"/>
-        </a:xfrm>
-      </p:grpSpPr>
-      <p:sp>
-        <p:nvSpPr>
-          <p:cNvPr id="2" name="Title 1">
-            <a:extLst>
-              <a:ext uri="{FF2B5EF4-FFF2-40B4-BE49-F238E27FC236}">
-                <a16:creationId xmlns:a16="http://schemas.microsoft.com/office/drawing/2014/main" id="{C0274CF3-D2F5-4319-AC4C-7E33DBCD5888}"/>
-              </a:ext>
-            </a:extLst>
-          </p:cNvPr>
-          <p:cNvSpPr>
-            <a:spLocks noGrp="1"/>
-          </p:cNvSpPr>
-          <p:nvPr>
-            <p:ph type="title"/>
-          </p:nvPr>
-        </p:nvSpPr>
-        <p:spPr/>
-        <p:txBody>
-          <a:bodyPr/>
-          <a:lstStyle/>
-          <a:p>
-            <a:r>
-              <a:rPr lang="en-GB" dirty="0"/>
-              <a:t>How – individuals with links to the slave trade</a:t>
-            </a:r>
-          </a:p>
-        </p:txBody>
-      </p:sp>
-      <p:sp>
-        <p:nvSpPr>
-          <p:cNvPr id="3" name="Content Placeholder 2">
-            <a:extLst>
-              <a:ext uri="{FF2B5EF4-FFF2-40B4-BE49-F238E27FC236}">
-                <a16:creationId xmlns:a16="http://schemas.microsoft.com/office/drawing/2014/main" id="{A461D00C-DD94-43C2-B1B9-7571434046AC}"/>
-              </a:ext>
-            </a:extLst>
-          </p:cNvPr>
-          <p:cNvSpPr>
-            <a:spLocks noGrp="1"/>
-          </p:cNvSpPr>
-          <p:nvPr>
-            <p:ph idx="1"/>
-          </p:nvPr>
-        </p:nvSpPr>
-        <p:spPr/>
-        <p:txBody>
-          <a:bodyPr>
-            <a:normAutofit/>
-          </a:bodyPr>
-          <a:lstStyle/>
-          <a:p>
-            <a:r>
-              <a:rPr lang="en-GB" dirty="0"/>
-              <a:t>To identify bad actors I made a scoring system, </a:t>
-            </a:r>
-            <a:r>
-              <a:rPr lang="en-GB" dirty="0">
-                <a:highlight>
-                  <a:srgbClr val="00FF00"/>
-                </a:highlight>
-              </a:rPr>
-              <a:t>using python, </a:t>
-            </a:r>
-            <a:r>
-              <a:rPr lang="en-GB" dirty="0"/>
-              <a:t>taking into account the following:</a:t>
-            </a:r>
-          </a:p>
-          <a:p>
-            <a:pPr lvl="1"/>
-            <a:r>
-              <a:rPr lang="en-GB"/>
-              <a:t> </a:t>
-            </a:r>
-            <a:endParaRPr lang="en-GB" dirty="0"/>
-          </a:p>
-          <a:p>
-            <a:r>
-              <a:rPr lang="en-GB" dirty="0"/>
-              <a:t>The above criteria gave both positive and negative scores (higher the score the worse). </a:t>
-            </a:r>
-            <a:r>
-              <a:rPr lang="en-GB" dirty="0">
-                <a:highlight>
-                  <a:srgbClr val="00FF00"/>
-                </a:highlight>
-              </a:rPr>
-              <a:t>List scores and formula? I thought you included plantation etc, Didn’t you analyse the known slave owners to pick up key words</a:t>
-            </a:r>
-          </a:p>
-          <a:p>
-            <a:r>
-              <a:rPr lang="en-GB" dirty="0"/>
-              <a:t>Words such as ‘poet’/’author’/’composer’ appearing on the Wikipedia pages reduced the score, assuming the correlation that most poets/writers/… were against slavery.</a:t>
-            </a:r>
-          </a:p>
-          <a:p>
-            <a:pPr lvl="1"/>
-            <a:r>
-              <a:rPr lang="en-GB" dirty="0">
-                <a:highlight>
-                  <a:srgbClr val="00FF00"/>
-                </a:highlight>
-              </a:rPr>
-              <a:t>How did to test this, how did you pick the words Mention Hodge in a funny slide and problems</a:t>
-            </a:r>
-          </a:p>
-        </p:txBody>
-      </p:sp>
-    </p:spTree>
-    <p:extLst>
-      <p:ext uri="{BB962C8B-B14F-4D97-AF65-F5344CB8AC3E}">
-        <p14:creationId xmlns:p14="http://schemas.microsoft.com/office/powerpoint/2010/main" val="3328646044"/>
+        <p14:creationId xmlns:p14="http://schemas.microsoft.com/office/powerpoint/2010/main" val="2504295055"/>
       </p:ext>
     </p:extLst>
   </p:cSld>
@@ -6795,7 +6746,7 @@
           <p:cNvPr id="2" name="Title 1">
             <a:extLst>
               <a:ext uri="{FF2B5EF4-FFF2-40B4-BE49-F238E27FC236}">
-                <a16:creationId xmlns:a16="http://schemas.microsoft.com/office/drawing/2014/main" id="{5CDED59E-F0AE-43CB-8CC9-723917652411}"/>
+                <a16:creationId xmlns:a16="http://schemas.microsoft.com/office/drawing/2014/main" id="{EAF0E772-E5C1-4306-BE45-B7D7EAA80B58}"/>
               </a:ext>
             </a:extLst>
           </p:cNvPr>
@@ -6803,7 +6754,7 @@
             <a:spLocks noGrp="1"/>
           </p:cNvSpPr>
           <p:nvPr>
-            <p:ph type="ctrTitle"/>
+            <p:ph type="title"/>
           </p:nvPr>
         </p:nvSpPr>
         <p:spPr/>
@@ -6811,16 +6762,19 @@
           <a:bodyPr/>
           <a:lstStyle/>
           <a:p>
-            <a:endParaRPr lang="en-GB"/>
-          </a:p>
-        </p:txBody>
-      </p:sp>
-      <p:sp>
-        <p:nvSpPr>
-          <p:cNvPr id="3" name="Subtitle 2">
+            <a:r>
+              <a:rPr lang="en-GB" dirty="0"/>
+              <a:t>discussion</a:t>
+            </a:r>
+          </a:p>
+        </p:txBody>
+      </p:sp>
+      <p:sp>
+        <p:nvSpPr>
+          <p:cNvPr id="3" name="Content Placeholder 2">
             <a:extLst>
               <a:ext uri="{FF2B5EF4-FFF2-40B4-BE49-F238E27FC236}">
-                <a16:creationId xmlns:a16="http://schemas.microsoft.com/office/drawing/2014/main" id="{E311F9D6-07A3-425B-AE76-D8975E31BF34}"/>
+                <a16:creationId xmlns:a16="http://schemas.microsoft.com/office/drawing/2014/main" id="{8A822A36-6CCF-4CF9-B46C-DD3C1CD50BD6}"/>
               </a:ext>
             </a:extLst>
           </p:cNvPr>
@@ -6828,7 +6782,7 @@
             <a:spLocks noGrp="1"/>
           </p:cNvSpPr>
           <p:nvPr>
-            <p:ph type="subTitle" idx="1"/>
+            <p:ph idx="1"/>
           </p:nvPr>
         </p:nvSpPr>
         <p:spPr/>
@@ -6836,14 +6790,37 @@
           <a:bodyPr/>
           <a:lstStyle/>
           <a:p>
-            <a:endParaRPr lang="en-GB"/>
+            <a:r>
+              <a:rPr lang="en-GB" dirty="0"/>
+              <a:t>The low proportion of the entries containing ethnicity fields (182) mean that the chart is likely to be bias. This could be due to a correlation between the presence of an entry and the likelihood of that entry being a certain value.</a:t>
+            </a:r>
+          </a:p>
+          <a:p>
+            <a:r>
+              <a:rPr lang="en-GB" dirty="0"/>
+              <a:t>The above condition necessitates that we do not draw conclusions from the chart.</a:t>
+            </a:r>
+          </a:p>
+          <a:p>
+            <a:r>
+              <a:rPr lang="en-GB" dirty="0"/>
+              <a:t>The chart indicates an approximate 50% proportion of non </a:t>
+            </a:r>
+            <a:r>
+              <a:rPr lang="en-GB" dirty="0" err="1"/>
+              <a:t>british</a:t>
+            </a:r>
+            <a:r>
+              <a:rPr lang="en-GB" dirty="0"/>
+              <a:t> nationality which is well above the results of the 2011 census of ~20%</a:t>
+            </a:r>
           </a:p>
         </p:txBody>
       </p:sp>
     </p:spTree>
     <p:extLst>
       <p:ext uri="{BB962C8B-B14F-4D97-AF65-F5344CB8AC3E}">
-        <p14:creationId xmlns:p14="http://schemas.microsoft.com/office/powerpoint/2010/main" val="829031331"/>
+        <p14:creationId xmlns:p14="http://schemas.microsoft.com/office/powerpoint/2010/main" val="2588681866"/>
       </p:ext>
     </p:extLst>
   </p:cSld>
@@ -6875,7 +6852,7 @@
           <p:cNvPr id="2" name="Title 1">
             <a:extLst>
               <a:ext uri="{FF2B5EF4-FFF2-40B4-BE49-F238E27FC236}">
-                <a16:creationId xmlns:a16="http://schemas.microsoft.com/office/drawing/2014/main" id="{EE3D967C-B230-48CC-8F84-7CDBF7898431}"/>
+                <a16:creationId xmlns:a16="http://schemas.microsoft.com/office/drawing/2014/main" id="{C0274CF3-D2F5-4319-AC4C-7E33DBCD5888}"/>
               </a:ext>
             </a:extLst>
           </p:cNvPr>
@@ -6903,7 +6880,7 @@
           <p:cNvPr id="3" name="Content Placeholder 2">
             <a:extLst>
               <a:ext uri="{FF2B5EF4-FFF2-40B4-BE49-F238E27FC236}">
-                <a16:creationId xmlns:a16="http://schemas.microsoft.com/office/drawing/2014/main" id="{6487CF09-47FB-43BD-9B8F-F3F4BC98C3D9}"/>
+                <a16:creationId xmlns:a16="http://schemas.microsoft.com/office/drawing/2014/main" id="{A461D00C-DD94-43C2-B1B9-7571434046AC}"/>
               </a:ext>
             </a:extLst>
           </p:cNvPr>
@@ -6914,250 +6891,79 @@
             <p:ph idx="1"/>
           </p:nvPr>
         </p:nvSpPr>
-        <p:spPr>
-          <a:xfrm>
-            <a:off x="685801" y="1869601"/>
-            <a:ext cx="10134599" cy="3921600"/>
-          </a:xfrm>
-        </p:spPr>
+        <p:spPr/>
         <p:txBody>
           <a:bodyPr>
-            <a:normAutofit fontScale="92500" lnSpcReduction="10000"/>
+            <a:normAutofit lnSpcReduction="10000"/>
           </a:bodyPr>
           <a:lstStyle/>
           <a:p>
             <a:r>
               <a:rPr lang="en-GB" dirty="0"/>
-              <a:t>The results from this test finding those with the highest chance to links with slavery follow: </a:t>
-            </a:r>
-            <a:r>
-              <a:rPr lang="en-GB" dirty="0">
-                <a:highlight>
-                  <a:srgbClr val="00FF00"/>
-                </a:highlight>
-              </a:rPr>
-              <a:t>add scores to list, why did you cut off here, total from how many?, range in scores, how did you check</a:t>
-            </a:r>
-          </a:p>
-          <a:p>
-            <a:pPr marL="457200" lvl="1" indent="0">
-              <a:buNone/>
-            </a:pPr>
-            <a:r>
-              <a:rPr lang="en-GB" dirty="0">
-                <a:highlight>
-                  <a:srgbClr val="700000"/>
-                </a:highlight>
-              </a:rPr>
-              <a:t>Robert Milligan</a:t>
-            </a:r>
-            <a:br>
+              <a:t>To identify bad actors I made a scoring system, using python, taking into account the following:</a:t>
+            </a:r>
+          </a:p>
+          <a:p>
+            <a:pPr lvl="1"/>
+            <a:r>
               <a:rPr lang="en-GB" dirty="0"/>
-            </a:br>
+              <a:t> The presence of certain words on their Wikipedia pages</a:t>
+            </a:r>
+            <a:endParaRPr lang="en-GB" dirty="0">
+              <a:highlight>
+                <a:srgbClr val="00FF00"/>
+              </a:highlight>
+            </a:endParaRPr>
+          </a:p>
+          <a:p>
+            <a:pPr lvl="1"/>
             <a:r>
               <a:rPr lang="en-GB" dirty="0"/>
-              <a:t>William Ewart Gladstone</a:t>
-            </a:r>
-            <a:br>
+              <a:t>Whether they appear on the slave owner list on Wikipedia or </a:t>
+            </a:r>
+            <a:r>
+              <a:rPr lang="en-GB" dirty="0" err="1"/>
+              <a:t>Wikidata</a:t>
+            </a:r>
+            <a:endParaRPr lang="en-GB" dirty="0"/>
+          </a:p>
+          <a:p>
+            <a:pPr lvl="1"/>
+            <a:r>
               <a:rPr lang="en-GB" dirty="0"/>
-            </a:br>
-            <a:r>
-              <a:rPr lang="en-GB" dirty="0">
-                <a:highlight>
-                  <a:srgbClr val="700000"/>
-                </a:highlight>
-              </a:rPr>
-              <a:t>Admiral Sir Edward Codrington RN GCB FRS</a:t>
-            </a:r>
-            <a:br>
+              <a:t>Whether they appear on the abolitionist list on Wikipedia</a:t>
+            </a:r>
+          </a:p>
+          <a:p>
+            <a:pPr lvl="1"/>
+            <a:r>
               <a:rPr lang="en-GB" dirty="0"/>
-            </a:br>
-            <a:r>
-              <a:rPr lang="en-GB" dirty="0">
-                <a:highlight>
-                  <a:srgbClr val="700000"/>
-                </a:highlight>
-              </a:rPr>
-              <a:t>Simón Bolívar</a:t>
-            </a:r>
-            <a:br>
+              <a:t>Ethnicity</a:t>
+            </a:r>
+          </a:p>
+          <a:p>
+            <a:pPr lvl="1"/>
+            <a:r>
               <a:rPr lang="en-GB" dirty="0"/>
-            </a:br>
-            <a:r>
-              <a:rPr lang="en-GB" dirty="0">
-                <a:highlight>
-                  <a:srgbClr val="700000"/>
-                </a:highlight>
-              </a:rPr>
-              <a:t>John Gladstone FRSE</a:t>
-            </a:r>
-            <a:br>
+              <a:t>Birth period</a:t>
+            </a:r>
+          </a:p>
+          <a:p>
+            <a:r>
               <a:rPr lang="en-GB" dirty="0"/>
-            </a:br>
+              <a:t>The above criteria gave both positive and negative scores (higher the score the worse). For example: slave = 10, plantation = 15, anti-slavery = -20.</a:t>
+            </a:r>
+          </a:p>
+          <a:p>
             <a:r>
               <a:rPr lang="en-GB" dirty="0"/>
-              <a:t>Quintin Hogg</a:t>
-            </a:r>
-            <a:br>
+              <a:t>Analysis of know slave owners/traders were used to help come up with this list.</a:t>
+            </a:r>
+          </a:p>
+          <a:p>
+            <a:r>
               <a:rPr lang="en-GB" dirty="0"/>
-            </a:br>
-            <a:r>
-              <a:rPr lang="en-GB" dirty="0">
-                <a:highlight>
-                  <a:srgbClr val="700000"/>
-                </a:highlight>
-              </a:rPr>
-              <a:t>George Whitefield</a:t>
-            </a:r>
-            <a:br>
-              <a:rPr lang="en-GB" dirty="0"/>
-            </a:br>
-            <a:r>
-              <a:rPr lang="en-GB" dirty="0"/>
-              <a:t>Richard Cobden</a:t>
-            </a:r>
-            <a:br>
-              <a:rPr lang="en-GB" dirty="0"/>
-            </a:br>
-            <a:r>
-              <a:rPr lang="en-GB" dirty="0"/>
-              <a:t>Dr James Wilson</a:t>
-            </a:r>
-            <a:br>
-              <a:rPr lang="en-GB" dirty="0"/>
-            </a:br>
-            <a:r>
-              <a:rPr lang="en-GB" dirty="0"/>
-              <a:t>William Murray, 1st Earl of Mansfield</a:t>
-            </a:r>
-            <a:br>
-              <a:rPr lang="en-GB" dirty="0"/>
-            </a:br>
-            <a:r>
-              <a:rPr lang="en-GB" dirty="0"/>
-              <a:t>John Graves Simcoe</a:t>
-            </a:r>
-            <a:br>
-              <a:rPr lang="en-GB" dirty="0"/>
-            </a:br>
-            <a:r>
-              <a:rPr lang="en-GB" dirty="0">
-                <a:highlight>
-                  <a:srgbClr val="700000"/>
-                </a:highlight>
-              </a:rPr>
-              <a:t>Thomas Drayton</a:t>
-            </a:r>
-            <a:br>
-              <a:rPr lang="en-GB" dirty="0"/>
-            </a:br>
-            <a:r>
-              <a:rPr lang="en-GB" dirty="0"/>
-              <a:t>Sir Lt Gen Thomas </a:t>
-            </a:r>
-            <a:r>
-              <a:rPr lang="en-GB" dirty="0" err="1"/>
-              <a:t>Picton</a:t>
-            </a:r>
-            <a:r>
-              <a:rPr lang="en-GB" dirty="0"/>
-              <a:t> GCB</a:t>
-            </a:r>
-            <a:br>
-              <a:rPr lang="en-GB" dirty="0"/>
-            </a:br>
-            <a:r>
-              <a:rPr lang="en-GB" dirty="0">
-                <a:highlight>
-                  <a:srgbClr val="700000"/>
-                </a:highlight>
-              </a:rPr>
-              <a:t>Sir Francis Drake</a:t>
-            </a:r>
-            <a:br>
-              <a:rPr lang="en-GB" dirty="0"/>
-            </a:br>
-            <a:r>
-              <a:rPr lang="en-GB" dirty="0"/>
-              <a:t>John Hancock</a:t>
-            </a:r>
-          </a:p>
-        </p:txBody>
-      </p:sp>
-      <p:sp>
-        <p:nvSpPr>
-          <p:cNvPr id="4" name="TextBox 3">
-            <a:extLst>
-              <a:ext uri="{FF2B5EF4-FFF2-40B4-BE49-F238E27FC236}">
-                <a16:creationId xmlns:a16="http://schemas.microsoft.com/office/drawing/2014/main" id="{514B3DE0-8D04-46D1-936F-661F37E9A81F}"/>
-              </a:ext>
-            </a:extLst>
-          </p:cNvPr>
-          <p:cNvSpPr txBox="1"/>
-          <p:nvPr/>
-        </p:nvSpPr>
-        <p:spPr>
-          <a:xfrm>
-            <a:off x="6096000" y="3118188"/>
-            <a:ext cx="4394200" cy="2031325"/>
-          </a:xfrm>
-          <a:prstGeom prst="rect">
-            <a:avLst/>
-          </a:prstGeom>
-          <a:noFill/>
-        </p:spPr>
-        <p:txBody>
-          <a:bodyPr wrap="square" rtlCol="0">
-            <a:spAutoFit/>
-          </a:bodyPr>
-          <a:lstStyle/>
-          <a:p>
-            <a:r>
-              <a:rPr lang="en-GB" dirty="0"/>
-              <a:t>Key:</a:t>
-            </a:r>
-          </a:p>
-          <a:p>
-            <a:r>
-              <a:rPr lang="en-GB" dirty="0"/>
-              <a:t>	</a:t>
-            </a:r>
-            <a:r>
-              <a:rPr lang="en-GB" dirty="0">
-                <a:highlight>
-                  <a:srgbClr val="700000"/>
-                </a:highlight>
-              </a:rPr>
-              <a:t>Slave trader/owned slaves</a:t>
-            </a:r>
-          </a:p>
-          <a:p>
-            <a:endParaRPr lang="en-GB" dirty="0"/>
-          </a:p>
-          <a:p>
-            <a:r>
-              <a:rPr lang="en-GB" dirty="0"/>
-              <a:t> </a:t>
-            </a:r>
-            <a:r>
-              <a:rPr lang="en-GB" dirty="0">
-                <a:highlight>
-                  <a:srgbClr val="00FF00"/>
-                </a:highlight>
-              </a:rPr>
-              <a:t>That is not to say that the other names certainly deserve a place but they are not </a:t>
-            </a:r>
-            <a:r>
-              <a:rPr lang="en-GB" dirty="0"/>
-              <a:t>slave traders/owners from the Wikipedia search I conducted. </a:t>
-            </a:r>
-            <a:r>
-              <a:rPr lang="en-GB" dirty="0">
-                <a:highlight>
-                  <a:srgbClr val="00FF00"/>
-                </a:highlight>
-              </a:rPr>
-              <a:t>Explain/reword</a:t>
+              <a:t>Words such as ‘poet’/’author’/’composer’ appearing on the Wikipedia pages reduced the score, assuming the correlation that most poets/writers/… were against slavery.</a:t>
             </a:r>
           </a:p>
         </p:txBody>
@@ -7165,7 +6971,7 @@
     </p:spTree>
     <p:extLst>
       <p:ext uri="{BB962C8B-B14F-4D97-AF65-F5344CB8AC3E}">
-        <p14:creationId xmlns:p14="http://schemas.microsoft.com/office/powerpoint/2010/main" val="2964064638"/>
+        <p14:creationId xmlns:p14="http://schemas.microsoft.com/office/powerpoint/2010/main" val="3328646044"/>
       </p:ext>
     </p:extLst>
   </p:cSld>
@@ -7197,7 +7003,7 @@
           <p:cNvPr id="2" name="Title 1">
             <a:extLst>
               <a:ext uri="{FF2B5EF4-FFF2-40B4-BE49-F238E27FC236}">
-                <a16:creationId xmlns:a16="http://schemas.microsoft.com/office/drawing/2014/main" id="{714C7195-C384-49F5-A35D-E7A85AA14257}"/>
+                <a16:creationId xmlns:a16="http://schemas.microsoft.com/office/drawing/2014/main" id="{EE3D967C-B230-48CC-8F84-7CDBF7898431}"/>
               </a:ext>
             </a:extLst>
           </p:cNvPr>
@@ -7215,7 +7021,7 @@
           <a:p>
             <a:r>
               <a:rPr lang="en-GB" dirty="0"/>
-              <a:t>Conclusion</a:t>
+              <a:t>results</a:t>
             </a:r>
           </a:p>
         </p:txBody>
@@ -7225,7 +7031,7 @@
           <p:cNvPr id="3" name="Content Placeholder 2">
             <a:extLst>
               <a:ext uri="{FF2B5EF4-FFF2-40B4-BE49-F238E27FC236}">
-                <a16:creationId xmlns:a16="http://schemas.microsoft.com/office/drawing/2014/main" id="{F2619B6D-1867-4860-9893-EE653B091F62}"/>
+                <a16:creationId xmlns:a16="http://schemas.microsoft.com/office/drawing/2014/main" id="{6487CF09-47FB-43BD-9B8F-F3F4BC98C3D9}"/>
               </a:ext>
             </a:extLst>
           </p:cNvPr>
@@ -7236,76 +7042,264 @@
             <p:ph idx="1"/>
           </p:nvPr>
         </p:nvSpPr>
-        <p:spPr/>
-        <p:txBody>
-          <a:bodyPr/>
+        <p:spPr>
+          <a:xfrm>
+            <a:off x="685801" y="1869600"/>
+            <a:ext cx="10134599" cy="4378799"/>
+          </a:xfrm>
+        </p:spPr>
+        <p:txBody>
+          <a:bodyPr>
+            <a:normAutofit lnSpcReduction="10000"/>
+          </a:bodyPr>
           <a:lstStyle/>
           <a:p>
             <a:r>
               <a:rPr lang="en-GB" dirty="0"/>
-              <a:t>There is not a large diversity </a:t>
+              <a:t>The results from this test of the whole UK (11847 entries) finding those with the highest chance to links with slavery follow. These are the top 15 scores: </a:t>
+            </a:r>
+            <a:endParaRPr lang="en-GB" dirty="0">
+              <a:highlight>
+                <a:srgbClr val="00FF00"/>
+              </a:highlight>
+            </a:endParaRPr>
+          </a:p>
+          <a:p>
+            <a:pPr marL="457200" lvl="1" indent="0">
+              <a:buNone/>
+            </a:pPr>
+            <a:r>
+              <a:rPr lang="en-GB" dirty="0"/>
+              <a:t>110</a:t>
             </a:r>
             <a:r>
               <a:rPr lang="en-GB" dirty="0">
                 <a:highlight>
-                  <a:srgbClr val="00FF00"/>
+                  <a:srgbClr val="700000"/>
                 </a:highlight>
               </a:rPr>
-              <a:t>of nationality for </a:t>
-            </a:r>
-            <a:r>
+              <a:t> Robert Milligan</a:t>
+            </a:r>
+            <a:br>
               <a:rPr lang="en-GB" dirty="0"/>
-              <a:t>those commemorated by plaques in London </a:t>
+            </a:br>
+            <a:r>
+              <a:rPr lang="en-GB" dirty="0"/>
+              <a:t>100 William Ewart Gladstone</a:t>
+            </a:r>
+            <a:br>
+              <a:rPr lang="en-GB" dirty="0"/>
+            </a:br>
+            <a:r>
+              <a:rPr lang="en-GB" dirty="0"/>
+              <a:t>75 </a:t>
             </a:r>
             <a:r>
               <a:rPr lang="en-GB" dirty="0">
                 <a:highlight>
-                  <a:srgbClr val="00FF00"/>
+                  <a:srgbClr val="700000"/>
                 </a:highlight>
               </a:rPr>
-              <a:t>(n from n were not white British)</a:t>
-            </a:r>
-          </a:p>
-          <a:p>
-            <a:r>
+              <a:t>Admiral Sir Edward Codrington RN GCB FRS</a:t>
+            </a:r>
+            <a:br>
               <a:rPr lang="en-GB" dirty="0"/>
-              <a:t>The bad actor scoring system does effectively filter down the number of possible candidates, reducing the time needed for a human to check those commemorated. </a:t>
+            </a:br>
+            <a:r>
+              <a:rPr lang="en-GB" dirty="0"/>
+              <a:t>70 </a:t>
             </a:r>
             <a:r>
               <a:rPr lang="en-GB" dirty="0">
                 <a:highlight>
-                  <a:srgbClr val="00FF00"/>
+                  <a:srgbClr val="700000"/>
                 </a:highlight>
               </a:rPr>
-              <a:t>From x to y</a:t>
-            </a:r>
-          </a:p>
-          <a:p>
-            <a:r>
+              <a:t>Simón Bolívar</a:t>
+            </a:r>
+            <a:br>
               <a:rPr lang="en-GB" dirty="0"/>
-              <a:t>The scoring system still needs a human to validate the choices – often the links are more complicated e.g. money/slaves inherited from family which the </a:t>
+            </a:br>
+            <a:r>
+              <a:rPr lang="en-GB" dirty="0"/>
+              <a:t>70 </a:t>
             </a:r>
             <a:r>
               <a:rPr lang="en-GB" dirty="0">
                 <a:highlight>
-                  <a:srgbClr val="00FF00"/>
+                  <a:srgbClr val="700000"/>
                 </a:highlight>
               </a:rPr>
-              <a:t>simply </a:t>
-            </a:r>
-            <a:r>
+              <a:t>John Gladstone FRSE</a:t>
+            </a:r>
+            <a:br>
               <a:rPr lang="en-GB" dirty="0"/>
-              <a:t>model cannot differentiate.</a:t>
-            </a:r>
-          </a:p>
-          <a:p>
+            </a:br>
+            <a:r>
+              <a:rPr lang="en-GB" dirty="0"/>
+              <a:t>65 Quintin Hogg</a:t>
+            </a:r>
+            <a:br>
+              <a:rPr lang="en-GB" dirty="0"/>
+            </a:br>
+            <a:r>
+              <a:rPr lang="en-GB" dirty="0"/>
+              <a:t>65 </a:t>
+            </a:r>
             <a:r>
               <a:rPr lang="en-GB" dirty="0">
                 <a:highlight>
-                  <a:srgbClr val="00FF00"/>
+                  <a:srgbClr val="700000"/>
                 </a:highlight>
               </a:rPr>
-              <a:t>What did you learn</a:t>
+              <a:t>George Whitefield</a:t>
+            </a:r>
+            <a:br>
+              <a:rPr lang="en-GB" dirty="0"/>
+            </a:br>
+            <a:r>
+              <a:rPr lang="en-GB" dirty="0"/>
+              <a:t>60 Richard Cobden</a:t>
+            </a:r>
+            <a:br>
+              <a:rPr lang="en-GB" dirty="0"/>
+            </a:br>
+            <a:r>
+              <a:rPr lang="en-GB" dirty="0"/>
+              <a:t>60 Dr James Wilson</a:t>
+            </a:r>
+            <a:br>
+              <a:rPr lang="en-GB" dirty="0"/>
+            </a:br>
+            <a:r>
+              <a:rPr lang="en-GB" dirty="0"/>
+              <a:t>60 William Murray, 1st Earl of Mansfield</a:t>
+            </a:r>
+            <a:br>
+              <a:rPr lang="en-GB" dirty="0"/>
+            </a:br>
+            <a:r>
+              <a:rPr lang="en-GB" dirty="0"/>
+              <a:t>55 John Graves Simcoe</a:t>
+            </a:r>
+            <a:br>
+              <a:rPr lang="en-GB" dirty="0"/>
+            </a:br>
+            <a:r>
+              <a:rPr lang="en-GB" dirty="0"/>
+              <a:t>50 </a:t>
+            </a:r>
+            <a:r>
+              <a:rPr lang="en-GB" dirty="0">
+                <a:highlight>
+                  <a:srgbClr val="700000"/>
+                </a:highlight>
+              </a:rPr>
+              <a:t>Thomas Drayton</a:t>
+            </a:r>
+            <a:br>
+              <a:rPr lang="en-GB" dirty="0"/>
+            </a:br>
+            <a:r>
+              <a:rPr lang="en-GB" dirty="0"/>
+              <a:t>50 Sir Lt Gen Thomas </a:t>
+            </a:r>
+            <a:r>
+              <a:rPr lang="en-GB" dirty="0" err="1"/>
+              <a:t>Picton</a:t>
+            </a:r>
+            <a:r>
+              <a:rPr lang="en-GB" dirty="0"/>
+              <a:t> GCB</a:t>
+            </a:r>
+            <a:br>
+              <a:rPr lang="en-GB" dirty="0"/>
+            </a:br>
+            <a:r>
+              <a:rPr lang="en-GB" dirty="0"/>
+              <a:t>50 </a:t>
+            </a:r>
+            <a:r>
+              <a:rPr lang="en-GB" dirty="0">
+                <a:highlight>
+                  <a:srgbClr val="700000"/>
+                </a:highlight>
+              </a:rPr>
+              <a:t>Sir Francis Drake</a:t>
+            </a:r>
+            <a:br>
+              <a:rPr lang="en-GB" dirty="0"/>
+            </a:br>
+            <a:r>
+              <a:rPr lang="en-GB" dirty="0"/>
+              <a:t>50 John Hancock</a:t>
+            </a:r>
+          </a:p>
+          <a:p>
+            <a:pPr marL="457200" lvl="1" indent="0">
+              <a:buNone/>
+            </a:pPr>
+            <a:r>
+              <a:rPr lang="en-GB" dirty="0"/>
+              <a:t>…</a:t>
+            </a:r>
+          </a:p>
+        </p:txBody>
+      </p:sp>
+      <p:sp>
+        <p:nvSpPr>
+          <p:cNvPr id="4" name="TextBox 3">
+            <a:extLst>
+              <a:ext uri="{FF2B5EF4-FFF2-40B4-BE49-F238E27FC236}">
+                <a16:creationId xmlns:a16="http://schemas.microsoft.com/office/drawing/2014/main" id="{514B3DE0-8D04-46D1-936F-661F37E9A81F}"/>
+              </a:ext>
+            </a:extLst>
+          </p:cNvPr>
+          <p:cNvSpPr txBox="1"/>
+          <p:nvPr/>
+        </p:nvSpPr>
+        <p:spPr>
+          <a:xfrm>
+            <a:off x="6096000" y="3118188"/>
+            <a:ext cx="4394200" cy="2031325"/>
+          </a:xfrm>
+          <a:prstGeom prst="rect">
+            <a:avLst/>
+          </a:prstGeom>
+          <a:noFill/>
+        </p:spPr>
+        <p:txBody>
+          <a:bodyPr wrap="square" rtlCol="0">
+            <a:spAutoFit/>
+          </a:bodyPr>
+          <a:lstStyle/>
+          <a:p>
+            <a:r>
+              <a:rPr lang="en-GB" dirty="0"/>
+              <a:t>Key:</a:t>
+            </a:r>
+          </a:p>
+          <a:p>
+            <a:r>
+              <a:rPr lang="en-GB" dirty="0"/>
+              <a:t>	</a:t>
+            </a:r>
+            <a:r>
+              <a:rPr lang="en-GB" dirty="0">
+                <a:highlight>
+                  <a:srgbClr val="700000"/>
+                </a:highlight>
+              </a:rPr>
+              <a:t>Slave trader/owned slaves</a:t>
+            </a:r>
+          </a:p>
+          <a:p>
+            <a:endParaRPr lang="en-GB" dirty="0"/>
+          </a:p>
+          <a:p>
+            <a:r>
+              <a:rPr lang="en-GB" dirty="0"/>
+              <a:t>The names in Red are those which, according to Wikipedia owned or traded slaves. The other names may have other links to the slave trade.</a:t>
             </a:r>
           </a:p>
         </p:txBody>
@@ -7313,7 +7307,7 @@
     </p:spTree>
     <p:extLst>
       <p:ext uri="{BB962C8B-B14F-4D97-AF65-F5344CB8AC3E}">
-        <p14:creationId xmlns:p14="http://schemas.microsoft.com/office/powerpoint/2010/main" val="741771949"/>
+        <p14:creationId xmlns:p14="http://schemas.microsoft.com/office/powerpoint/2010/main" val="2964064638"/>
       </p:ext>
     </p:extLst>
   </p:cSld>
@@ -8317,20 +8311,20 @@
 </file>
 
 <file path=customXml/item2.xml><?xml version="1.0" encoding="utf-8"?>
+<p:properties xmlns:p="http://schemas.microsoft.com/office/2006/metadata/properties" xmlns:xsi="http://www.w3.org/2001/XMLSchema-instance" xmlns:pc="http://schemas.microsoft.com/office/infopath/2007/PartnerControls">
+  <documentManagement>
+    <MediaServiceKeyPoints xmlns="d9cc2b2a-c808-481a-ab86-5d35f8a2a5f5" xsi:nil="true"/>
+  </documentManagement>
+</p:properties>
+</file>
+
+<file path=customXml/item3.xml><?xml version="1.0" encoding="utf-8"?>
 <?mso-contentType ?>
 <FormTemplates xmlns="http://schemas.microsoft.com/sharepoint/v3/contenttype/forms">
   <Display>DocumentLibraryForm</Display>
   <Edit>DocumentLibraryForm</Edit>
   <New>DocumentLibraryForm</New>
 </FormTemplates>
-</file>
-
-<file path=customXml/item3.xml><?xml version="1.0" encoding="utf-8"?>
-<p:properties xmlns:p="http://schemas.microsoft.com/office/2006/metadata/properties" xmlns:xsi="http://www.w3.org/2001/XMLSchema-instance" xmlns:pc="http://schemas.microsoft.com/office/infopath/2007/PartnerControls">
-  <documentManagement>
-    <MediaServiceKeyPoints xmlns="d9cc2b2a-c808-481a-ab86-5d35f8a2a5f5" xsi:nil="true"/>
-  </documentManagement>
-</p:properties>
 </file>
 
 <file path=customXml/itemProps1.xml><?xml version="1.0" encoding="utf-8"?>
@@ -8352,14 +8346,6 @@
 </file>
 
 <file path=customXml/itemProps2.xml><?xml version="1.0" encoding="utf-8"?>
-<ds:datastoreItem xmlns:ds="http://schemas.openxmlformats.org/officeDocument/2006/customXml" ds:itemID="{38C25A74-1E0C-4362-AFA3-6197BD285F3A}">
-  <ds:schemaRefs>
-    <ds:schemaRef ds:uri="http://schemas.microsoft.com/sharepoint/v3/contenttype/forms"/>
-  </ds:schemaRefs>
-</ds:datastoreItem>
-</file>
-
-<file path=customXml/itemProps3.xml><?xml version="1.0" encoding="utf-8"?>
 <ds:datastoreItem xmlns:ds="http://schemas.openxmlformats.org/officeDocument/2006/customXml" ds:itemID="{0EC94942-C689-461B-8649-1FD863C6BA2B}">
   <ds:schemaRefs>
     <ds:schemaRef ds:uri="http://schemas.microsoft.com/office/2006/metadata/properties"/>
@@ -8367,4 +8353,12 @@
     <ds:schemaRef ds:uri="d9cc2b2a-c808-481a-ab86-5d35f8a2a5f5"/>
   </ds:schemaRefs>
 </ds:datastoreItem>
+</file>
+
+<file path=customXml/itemProps3.xml><?xml version="1.0" encoding="utf-8"?>
+<ds:datastoreItem xmlns:ds="http://schemas.openxmlformats.org/officeDocument/2006/customXml" ds:itemID="{38C25A74-1E0C-4362-AFA3-6197BD285F3A}">
+  <ds:schemaRefs>
+    <ds:schemaRef ds:uri="http://schemas.microsoft.com/sharepoint/v3/contenttype/forms"/>
+  </ds:schemaRefs>
+</ds:datastoreItem>
 </file>
</xml_diff>